<commit_message>
Added "bad" design and removed content from example design
</commit_message>
<xml_diff>
--- a/DesignPlans.pptx
+++ b/DesignPlans.pptx
@@ -5,21 +5,19 @@
     <p:sldMasterId id="2147483654" r:id="rId1"/>
   </p:sldMasterIdLst>
   <p:notesMasterIdLst>
-    <p:notesMasterId r:id="rId14"/>
+    <p:notesMasterId r:id="rId12"/>
   </p:notesMasterIdLst>
   <p:sldIdLst>
     <p:sldId id="256" r:id="rId2"/>
     <p:sldId id="257" r:id="rId3"/>
-    <p:sldId id="258" r:id="rId4"/>
-    <p:sldId id="259" r:id="rId5"/>
+    <p:sldId id="269" r:id="rId4"/>
+    <p:sldId id="270" r:id="rId5"/>
     <p:sldId id="260" r:id="rId6"/>
-    <p:sldId id="261" r:id="rId7"/>
-    <p:sldId id="262" r:id="rId8"/>
-    <p:sldId id="263" r:id="rId9"/>
-    <p:sldId id="264" r:id="rId10"/>
-    <p:sldId id="265" r:id="rId11"/>
-    <p:sldId id="266" r:id="rId12"/>
-    <p:sldId id="267" r:id="rId13"/>
+    <p:sldId id="258" r:id="rId7"/>
+    <p:sldId id="268" r:id="rId8"/>
+    <p:sldId id="265" r:id="rId9"/>
+    <p:sldId id="266" r:id="rId10"/>
+    <p:sldId id="267" r:id="rId11"/>
   </p:sldIdLst>
   <p:sldSz cx="9144000" cy="6858000" type="screen4x3"/>
   <p:notesSz cx="6858000" cy="9144000"/>
@@ -234,6 +232,22 @@
       </a:defRPr>
     </a:lvl9pPr>
   </p:defaultTextStyle>
+  <p:extLst>
+    <p:ext uri="{EFAFB233-063F-42B5-8137-9DF3F51BA10A}">
+      <p15:sldGuideLst xmlns:p15="http://schemas.microsoft.com/office/powerpoint/2012/main">
+        <p15:guide id="1" orient="horz" pos="2160">
+          <p15:clr>
+            <a:srgbClr val="A4A3A4"/>
+          </p15:clr>
+        </p15:guide>
+        <p15:guide id="2" pos="2880">
+          <p15:clr>
+            <a:srgbClr val="A4A3A4"/>
+          </p15:clr>
+        </p15:guide>
+      </p15:sldGuideLst>
+    </p:ext>
+  </p:extLst>
 </p:presentation>
 </file>
 
@@ -546,101 +560,11 @@
         </p:txBody>
       </p:sp>
     </p:spTree>
-  </p:cSld>
-  <p:clrMapOvr>
-    <a:masterClrMapping/>
-  </p:clrMapOvr>
-</p:notes>
-</file>
-
-<file path=ppt/notesSlides/notesSlide10.xml><?xml version="1.0" encoding="utf-8"?>
-<p:notes xmlns:a="http://schemas.openxmlformats.org/drawingml/2006/main" xmlns:r="http://schemas.openxmlformats.org/officeDocument/2006/relationships" xmlns:p="http://schemas.openxmlformats.org/presentationml/2006/main" showMasterSp="0" showMasterPhAnim="0">
-  <p:cSld>
-    <p:spTree>
-      <p:nvGrpSpPr>
-        <p:cNvPr id="1" name="Shape 145"/>
-        <p:cNvGrpSpPr/>
-        <p:nvPr/>
-      </p:nvGrpSpPr>
-      <p:grpSpPr>
-        <a:xfrm>
-          <a:off x="0" y="0"/>
-          <a:ext cx="0" cy="0"/>
-          <a:chOff x="0" y="0"/>
-          <a:chExt cx="0" cy="0"/>
-        </a:xfrm>
-      </p:grpSpPr>
-      <p:sp>
-        <p:nvSpPr>
-          <p:cNvPr id="146" name="Shape 146"/>
-          <p:cNvSpPr>
-            <a:spLocks noGrp="1" noRot="1" noChangeAspect="1"/>
-          </p:cNvSpPr>
-          <p:nvPr>
-            <p:ph type="sldImg" idx="2"/>
-          </p:nvPr>
-        </p:nvSpPr>
-        <p:spPr>
-          <a:xfrm>
-            <a:off x="1143000" y="685800"/>
-            <a:ext cx="4572000" cy="3429000"/>
-          </a:xfrm>
-          <a:custGeom>
-            <a:avLst/>
-            <a:gdLst/>
-            <a:ahLst/>
-            <a:cxnLst/>
-            <a:rect l="0" t="0" r="0" b="0"/>
-            <a:pathLst>
-              <a:path w="120000" h="120000" extrusionOk="0">
-                <a:moveTo>
-                  <a:pt x="0" y="0"/>
-                </a:moveTo>
-                <a:lnTo>
-                  <a:pt x="120000" y="0"/>
-                </a:lnTo>
-                <a:lnTo>
-                  <a:pt x="120000" y="120000"/>
-                </a:lnTo>
-                <a:lnTo>
-                  <a:pt x="0" y="120000"/>
-                </a:lnTo>
-                <a:close/>
-              </a:path>
-            </a:pathLst>
-          </a:custGeom>
-        </p:spPr>
-      </p:sp>
-      <p:sp>
-        <p:nvSpPr>
-          <p:cNvPr id="147" name="Shape 147"/>
-          <p:cNvSpPr txBox="1">
-            <a:spLocks noGrp="1"/>
-          </p:cNvSpPr>
-          <p:nvPr>
-            <p:ph type="body" idx="1"/>
-          </p:nvPr>
-        </p:nvSpPr>
-        <p:spPr>
-          <a:xfrm>
-            <a:off x="685800" y="4343400"/>
-            <a:ext cx="5486399" cy="4114800"/>
-          </a:xfrm>
-          <a:prstGeom prst="rect">
-            <a:avLst/>
-          </a:prstGeom>
-        </p:spPr>
-        <p:txBody>
-          <a:bodyPr lIns="91425" tIns="91425" rIns="91425" bIns="91425" anchor="t" anchorCtr="0">
-            <a:spAutoFit/>
-          </a:bodyPr>
-          <a:lstStyle/>
-          <a:p>
-            <a:endParaRPr/>
-          </a:p>
-        </p:txBody>
-      </p:sp>
-    </p:spTree>
+    <p:extLst>
+      <p:ext uri="{BB962C8B-B14F-4D97-AF65-F5344CB8AC3E}">
+        <p14:creationId xmlns:p14="http://schemas.microsoft.com/office/powerpoint/2010/main" val="2842896091"/>
+      </p:ext>
+    </p:extLst>
   </p:cSld>
   <p:clrMapOvr>
     <a:masterClrMapping/>
@@ -736,6 +660,11 @@
         </p:txBody>
       </p:sp>
     </p:spTree>
+    <p:extLst>
+      <p:ext uri="{BB962C8B-B14F-4D97-AF65-F5344CB8AC3E}">
+        <p14:creationId xmlns:p14="http://schemas.microsoft.com/office/powerpoint/2010/main" val="769192274"/>
+      </p:ext>
+    </p:extLst>
   </p:cSld>
   <p:clrMapOvr>
     <a:masterClrMapping/>
@@ -831,6 +760,11 @@
         </p:txBody>
       </p:sp>
     </p:spTree>
+    <p:extLst>
+      <p:ext uri="{BB962C8B-B14F-4D97-AF65-F5344CB8AC3E}">
+        <p14:creationId xmlns:p14="http://schemas.microsoft.com/office/powerpoint/2010/main" val="2360857356"/>
+      </p:ext>
+    </p:extLst>
   </p:cSld>
   <p:clrMapOvr>
     <a:masterClrMapping/>
@@ -926,6 +860,11 @@
         </p:txBody>
       </p:sp>
     </p:spTree>
+    <p:extLst>
+      <p:ext uri="{BB962C8B-B14F-4D97-AF65-F5344CB8AC3E}">
+        <p14:creationId xmlns:p14="http://schemas.microsoft.com/office/powerpoint/2010/main" val="1862623455"/>
+      </p:ext>
+    </p:extLst>
   </p:cSld>
   <p:clrMapOvr>
     <a:masterClrMapping/>
@@ -1021,6 +960,11 @@
         </p:txBody>
       </p:sp>
     </p:spTree>
+    <p:extLst>
+      <p:ext uri="{BB962C8B-B14F-4D97-AF65-F5344CB8AC3E}">
+        <p14:creationId xmlns:p14="http://schemas.microsoft.com/office/powerpoint/2010/main" val="2588916354"/>
+      </p:ext>
+    </p:extLst>
   </p:cSld>
   <p:clrMapOvr>
     <a:masterClrMapping/>
@@ -1033,7 +977,7 @@
   <p:cSld>
     <p:spTree>
       <p:nvGrpSpPr>
-        <p:cNvPr id="1" name="Shape 122"/>
+        <p:cNvPr id="1" name="Shape 66"/>
         <p:cNvGrpSpPr/>
         <p:nvPr/>
       </p:nvGrpSpPr>
@@ -1047,7 +991,7 @@
       </p:grpSpPr>
       <p:sp>
         <p:nvSpPr>
-          <p:cNvPr id="123" name="Shape 123"/>
+          <p:cNvPr id="67" name="Shape 67"/>
           <p:cNvSpPr>
             <a:spLocks noGrp="1" noRot="1" noChangeAspect="1"/>
           </p:cNvSpPr>
@@ -1088,7 +1032,7 @@
       </p:sp>
       <p:sp>
         <p:nvSpPr>
-          <p:cNvPr id="124" name="Shape 124"/>
+          <p:cNvPr id="68" name="Shape 68"/>
           <p:cNvSpPr txBox="1">
             <a:spLocks noGrp="1"/>
           </p:cNvSpPr>
@@ -1116,6 +1060,11 @@
         </p:txBody>
       </p:sp>
     </p:spTree>
+    <p:extLst>
+      <p:ext uri="{BB962C8B-B14F-4D97-AF65-F5344CB8AC3E}">
+        <p14:creationId xmlns:p14="http://schemas.microsoft.com/office/powerpoint/2010/main" val="2487712097"/>
+      </p:ext>
+    </p:extLst>
   </p:cSld>
   <p:clrMapOvr>
     <a:masterClrMapping/>
@@ -1128,7 +1077,7 @@
   <p:cSld>
     <p:spTree>
       <p:nvGrpSpPr>
-        <p:cNvPr id="1" name="Shape 128"/>
+        <p:cNvPr id="1" name="Shape 71"/>
         <p:cNvGrpSpPr/>
         <p:nvPr/>
       </p:nvGrpSpPr>
@@ -1142,7 +1091,7 @@
       </p:grpSpPr>
       <p:sp>
         <p:nvSpPr>
-          <p:cNvPr id="129" name="Shape 129"/>
+          <p:cNvPr id="72" name="Shape 72"/>
           <p:cNvSpPr>
             <a:spLocks noGrp="1" noRot="1" noChangeAspect="1"/>
           </p:cNvSpPr>
@@ -1183,7 +1132,7 @@
       </p:sp>
       <p:sp>
         <p:nvSpPr>
-          <p:cNvPr id="130" name="Shape 130"/>
+          <p:cNvPr id="73" name="Shape 73"/>
           <p:cNvSpPr txBox="1">
             <a:spLocks noGrp="1"/>
           </p:cNvSpPr>
@@ -1211,6 +1160,11 @@
         </p:txBody>
       </p:sp>
     </p:spTree>
+    <p:extLst>
+      <p:ext uri="{BB962C8B-B14F-4D97-AF65-F5344CB8AC3E}">
+        <p14:creationId xmlns:p14="http://schemas.microsoft.com/office/powerpoint/2010/main" val="2777228066"/>
+      </p:ext>
+    </p:extLst>
   </p:cSld>
   <p:clrMapOvr>
     <a:masterClrMapping/>
@@ -1223,7 +1177,7 @@
   <p:cSld>
     <p:spTree>
       <p:nvGrpSpPr>
-        <p:cNvPr id="1" name="Shape 134"/>
+        <p:cNvPr id="1" name="Shape 145"/>
         <p:cNvGrpSpPr/>
         <p:nvPr/>
       </p:nvGrpSpPr>
@@ -1237,7 +1191,7 @@
       </p:grpSpPr>
       <p:sp>
         <p:nvSpPr>
-          <p:cNvPr id="135" name="Shape 135"/>
+          <p:cNvPr id="146" name="Shape 146"/>
           <p:cNvSpPr>
             <a:spLocks noGrp="1" noRot="1" noChangeAspect="1"/>
           </p:cNvSpPr>
@@ -1278,7 +1232,7 @@
       </p:sp>
       <p:sp>
         <p:nvSpPr>
-          <p:cNvPr id="136" name="Shape 136"/>
+          <p:cNvPr id="147" name="Shape 147"/>
           <p:cNvSpPr txBox="1">
             <a:spLocks noGrp="1"/>
           </p:cNvSpPr>
@@ -1306,101 +1260,11 @@
         </p:txBody>
       </p:sp>
     </p:spTree>
-  </p:cSld>
-  <p:clrMapOvr>
-    <a:masterClrMapping/>
-  </p:clrMapOvr>
-</p:notes>
-</file>
-
-<file path=ppt/notesSlides/notesSlide9.xml><?xml version="1.0" encoding="utf-8"?>
-<p:notes xmlns:a="http://schemas.openxmlformats.org/drawingml/2006/main" xmlns:r="http://schemas.openxmlformats.org/officeDocument/2006/relationships" xmlns:p="http://schemas.openxmlformats.org/presentationml/2006/main" showMasterSp="0" showMasterPhAnim="0">
-  <p:cSld>
-    <p:spTree>
-      <p:nvGrpSpPr>
-        <p:cNvPr id="1" name="Shape 140"/>
-        <p:cNvGrpSpPr/>
-        <p:nvPr/>
-      </p:nvGrpSpPr>
-      <p:grpSpPr>
-        <a:xfrm>
-          <a:off x="0" y="0"/>
-          <a:ext cx="0" cy="0"/>
-          <a:chOff x="0" y="0"/>
-          <a:chExt cx="0" cy="0"/>
-        </a:xfrm>
-      </p:grpSpPr>
-      <p:sp>
-        <p:nvSpPr>
-          <p:cNvPr id="141" name="Shape 141"/>
-          <p:cNvSpPr>
-            <a:spLocks noGrp="1" noRot="1" noChangeAspect="1"/>
-          </p:cNvSpPr>
-          <p:nvPr>
-            <p:ph type="sldImg" idx="2"/>
-          </p:nvPr>
-        </p:nvSpPr>
-        <p:spPr>
-          <a:xfrm>
-            <a:off x="1143000" y="685800"/>
-            <a:ext cx="4572000" cy="3429000"/>
-          </a:xfrm>
-          <a:custGeom>
-            <a:avLst/>
-            <a:gdLst/>
-            <a:ahLst/>
-            <a:cxnLst/>
-            <a:rect l="0" t="0" r="0" b="0"/>
-            <a:pathLst>
-              <a:path w="120000" h="120000" extrusionOk="0">
-                <a:moveTo>
-                  <a:pt x="0" y="0"/>
-                </a:moveTo>
-                <a:lnTo>
-                  <a:pt x="120000" y="0"/>
-                </a:lnTo>
-                <a:lnTo>
-                  <a:pt x="120000" y="120000"/>
-                </a:lnTo>
-                <a:lnTo>
-                  <a:pt x="0" y="120000"/>
-                </a:lnTo>
-                <a:close/>
-              </a:path>
-            </a:pathLst>
-          </a:custGeom>
-        </p:spPr>
-      </p:sp>
-      <p:sp>
-        <p:nvSpPr>
-          <p:cNvPr id="142" name="Shape 142"/>
-          <p:cNvSpPr txBox="1">
-            <a:spLocks noGrp="1"/>
-          </p:cNvSpPr>
-          <p:nvPr>
-            <p:ph type="body" idx="1"/>
-          </p:nvPr>
-        </p:nvSpPr>
-        <p:spPr>
-          <a:xfrm>
-            <a:off x="685800" y="4343400"/>
-            <a:ext cx="5486399" cy="4114800"/>
-          </a:xfrm>
-          <a:prstGeom prst="rect">
-            <a:avLst/>
-          </a:prstGeom>
-        </p:spPr>
-        <p:txBody>
-          <a:bodyPr lIns="91425" tIns="91425" rIns="91425" bIns="91425" anchor="t" anchorCtr="0">
-            <a:spAutoFit/>
-          </a:bodyPr>
-          <a:lstStyle/>
-          <a:p>
-            <a:endParaRPr/>
-          </a:p>
-        </p:txBody>
-      </p:sp>
-    </p:spTree>
+    <p:extLst>
+      <p:ext uri="{BB962C8B-B14F-4D97-AF65-F5344CB8AC3E}">
+        <p14:creationId xmlns:p14="http://schemas.microsoft.com/office/powerpoint/2010/main" val="1460010707"/>
+      </p:ext>
+    </p:extLst>
   </p:cSld>
   <p:clrMapOvr>
     <a:masterClrMapping/>
@@ -3990,7 +3854,7 @@
                   <a:srgbClr val="A88000"/>
                 </a:solidFill>
               </a:rPr>
-              <a:t>System Architectures Example</a:t>
+              <a:t>ProManage System Architecture</a:t>
             </a:r>
             <a:endParaRPr lang="en" sz="3000" b="1" dirty="0">
               <a:solidFill>
@@ -4005,13 +3869,13 @@
   <p:clrMapOvr>
     <a:masterClrMapping/>
   </p:clrMapOvr>
-  <p:transition xmlns:p14="http://schemas.microsoft.com/office/powerpoint/2010/main" spd="slow">
+  <p:transition spd="slow">
     <p:cut/>
   </p:transition>
   <p:timing>
     <p:tnLst>
       <p:par>
-        <p:cTn xmlns:p14="http://schemas.microsoft.com/office/powerpoint/2010/main" id="1" dur="indefinite" restart="never" nodeType="tmRoot"/>
+        <p:cTn id="1" dur="indefinite" restart="never" nodeType="tmRoot"/>
       </p:par>
     </p:tnLst>
   </p:timing>
@@ -4019,155 +3883,6 @@
 </file>
 
 <file path=ppt/slides/slide10.xml><?xml version="1.0" encoding="utf-8"?>
-<p:sld xmlns:a="http://schemas.openxmlformats.org/drawingml/2006/main" xmlns:r="http://schemas.openxmlformats.org/officeDocument/2006/relationships" xmlns:p="http://schemas.openxmlformats.org/presentationml/2006/main">
-  <p:cSld>
-    <p:spTree>
-      <p:nvGrpSpPr>
-        <p:cNvPr id="1" name="Shape 143"/>
-        <p:cNvGrpSpPr/>
-        <p:nvPr/>
-      </p:nvGrpSpPr>
-      <p:grpSpPr>
-        <a:xfrm>
-          <a:off x="0" y="0"/>
-          <a:ext cx="0" cy="0"/>
-          <a:chOff x="0" y="0"/>
-          <a:chExt cx="0" cy="0"/>
-        </a:xfrm>
-      </p:grpSpPr>
-      <p:sp>
-        <p:nvSpPr>
-          <p:cNvPr id="144" name="Shape 144"/>
-          <p:cNvSpPr txBox="1"/>
-          <p:nvPr/>
-        </p:nvSpPr>
-        <p:spPr>
-          <a:xfrm>
-            <a:off x="381000" y="1066800"/>
-            <a:ext cx="8541900" cy="2092850"/>
-          </a:xfrm>
-          <a:prstGeom prst="rect">
-            <a:avLst/>
-          </a:prstGeom>
-          <a:noFill/>
-        </p:spPr>
-        <p:txBody>
-          <a:bodyPr lIns="91425" tIns="91425" rIns="91425" bIns="91425" anchor="t" anchorCtr="0">
-            <a:spAutoFit/>
-          </a:bodyPr>
-          <a:lstStyle/>
-          <a:p>
-            <a:pPr lvl="0" rtl="0">
-              <a:buClr>
-                <a:srgbClr val="000000"/>
-              </a:buClr>
-              <a:buSzPct val="166666"/>
-            </a:pPr>
-            <a:endParaRPr lang="en" sz="2800" dirty="0">
-              <a:solidFill>
-                <a:srgbClr val="FF0000"/>
-              </a:solidFill>
-            </a:endParaRPr>
-          </a:p>
-          <a:p>
-            <a:pPr marL="914400" lvl="1" indent="-457200" rtl="0">
-              <a:buClr>
-                <a:srgbClr val="000000"/>
-              </a:buClr>
-              <a:buSzPct val="150000"/>
-              <a:buFont typeface="Courier New"/>
-              <a:buChar char="o"/>
-            </a:pPr>
-            <a:r>
-              <a:rPr lang="en" sz="2400" dirty="0"/>
-              <a:t>No native client-side code. Usable on any system with internet access and a supported web browser</a:t>
-            </a:r>
-          </a:p>
-          <a:p>
-            <a:pPr marL="914400" lvl="1" indent="-457200" rtl="0">
-              <a:buClr>
-                <a:srgbClr val="000000"/>
-              </a:buClr>
-              <a:buSzPct val="150000"/>
-              <a:buFont typeface="Courier New"/>
-              <a:buChar char="o"/>
-            </a:pPr>
-            <a:r>
-              <a:rPr lang="en" sz="2400" dirty="0"/>
-              <a:t>Updating the system is simpler.</a:t>
-            </a:r>
-          </a:p>
-          <a:p>
-            <a:pPr marL="914400" lvl="1" indent="-457200" rtl="0">
-              <a:buClr>
-                <a:srgbClr val="000000"/>
-              </a:buClr>
-              <a:buSzPct val="150000"/>
-              <a:buFont typeface="Courier New"/>
-              <a:buChar char="o"/>
-            </a:pPr>
-            <a:r>
-              <a:rPr lang="en" sz="2400" dirty="0"/>
-              <a:t>Nearly all work is done using a single domain </a:t>
-            </a:r>
-            <a:r>
-              <a:rPr lang="en" sz="2400" dirty="0" smtClean="0"/>
-              <a:t>model</a:t>
-            </a:r>
-            <a:endParaRPr lang="en" sz="2400" dirty="0"/>
-          </a:p>
-        </p:txBody>
-      </p:sp>
-      <p:sp>
-        <p:nvSpPr>
-          <p:cNvPr id="2" name="TextBox 1"/>
-          <p:cNvSpPr txBox="1"/>
-          <p:nvPr/>
-        </p:nvSpPr>
-        <p:spPr>
-          <a:xfrm>
-            <a:off x="381000" y="485001"/>
-            <a:ext cx="5083443" cy="553998"/>
-          </a:xfrm>
-          <a:prstGeom prst="rect">
-            <a:avLst/>
-          </a:prstGeom>
-          <a:noFill/>
-        </p:spPr>
-        <p:txBody>
-          <a:bodyPr wrap="none" rtlCol="0">
-            <a:spAutoFit/>
-          </a:bodyPr>
-          <a:lstStyle/>
-          <a:p>
-            <a:r>
-              <a:rPr lang="en-US" sz="3000" b="1" dirty="0" smtClean="0">
-                <a:solidFill>
-                  <a:srgbClr val="A88000"/>
-                </a:solidFill>
-              </a:rPr>
-              <a:t>Why Selecting Design Two</a:t>
-            </a:r>
-            <a:endParaRPr lang="en-US" sz="3000" b="1" dirty="0">
-              <a:solidFill>
-                <a:srgbClr val="A88000"/>
-              </a:solidFill>
-            </a:endParaRPr>
-          </a:p>
-        </p:txBody>
-      </p:sp>
-    </p:spTree>
-  </p:cSld>
-  <p:clrMapOvr>
-    <a:masterClrMapping/>
-  </p:clrMapOvr>
-  <p:transition xmlns:p14="http://schemas.microsoft.com/office/powerpoint/2010/main" spd="slow">
-    <p:cut/>
-  </p:transition>
-</p:sld>
-</file>
-
-<file path=ppt/slides/slide11.xml><?xml version="1.0" encoding="utf-8"?>
 <p:sld xmlns:a="http://schemas.openxmlformats.org/drawingml/2006/main" xmlns:r="http://schemas.openxmlformats.org/officeDocument/2006/relationships" xmlns:p="http://schemas.openxmlformats.org/presentationml/2006/main">
   <p:cSld>
     <p:spTree>
@@ -4192,293 +3907,8 @@
         </p:nvSpPr>
         <p:spPr>
           <a:xfrm>
-            <a:off x="914400" y="609600"/>
-            <a:ext cx="6019800" cy="5355312"/>
-          </a:xfrm>
-          <a:prstGeom prst="rect">
-            <a:avLst/>
-          </a:prstGeom>
-        </p:spPr>
-        <p:txBody>
-          <a:bodyPr wrap="square">
-            <a:spAutoFit/>
-          </a:bodyPr>
-          <a:lstStyle/>
-          <a:p>
-            <a:r>
-              <a:rPr lang="en-US" sz="1800" dirty="0"/>
-              <a:t> </a:t>
-            </a:r>
-          </a:p>
-          <a:p>
-            <a:r>
-              <a:rPr lang="en-US" sz="1800" b="1" u="sng" dirty="0">
-                <a:solidFill>
-                  <a:srgbClr val="A88000"/>
-                </a:solidFill>
-              </a:rPr>
-              <a:t>Sprint #1</a:t>
-            </a:r>
-            <a:endParaRPr lang="en-US" sz="1800" u="sng" dirty="0">
-              <a:solidFill>
-                <a:srgbClr val="A88000"/>
-              </a:solidFill>
-            </a:endParaRPr>
-          </a:p>
-          <a:p>
-            <a:pPr marL="579438" lvl="2" indent="-285750">
-              <a:buFont typeface="Arial" panose="020B0604020202020204" pitchFamily="34" charset="0"/>
-              <a:buChar char="•"/>
-            </a:pPr>
-            <a:r>
-              <a:rPr lang="en-US" sz="1800" dirty="0"/>
-              <a:t>Register user accounts</a:t>
-            </a:r>
-          </a:p>
-          <a:p>
-            <a:pPr marL="579438" lvl="2" indent="-285750">
-              <a:buFont typeface="Arial" panose="020B0604020202020204" pitchFamily="34" charset="0"/>
-              <a:buChar char="•"/>
-            </a:pPr>
-            <a:r>
-              <a:rPr lang="en-US" sz="1800" dirty="0"/>
-              <a:t>Log in to website with user account</a:t>
-            </a:r>
-          </a:p>
-          <a:p>
-            <a:pPr marL="579438" lvl="2" indent="-285750">
-              <a:buFont typeface="Arial" panose="020B0604020202020204" pitchFamily="34" charset="0"/>
-              <a:buChar char="•"/>
-            </a:pPr>
-            <a:r>
-              <a:rPr lang="en-US" sz="1800" dirty="0"/>
-              <a:t>Manage user account</a:t>
-            </a:r>
-          </a:p>
-          <a:p>
-            <a:pPr marL="579438" lvl="2" indent="-285750">
-              <a:buFont typeface="Arial" panose="020B0604020202020204" pitchFamily="34" charset="0"/>
-              <a:buChar char="•"/>
-            </a:pPr>
-            <a:r>
-              <a:rPr lang="en-US" sz="1800" dirty="0"/>
-              <a:t>Create, join, and delete bands</a:t>
-            </a:r>
-          </a:p>
-          <a:p>
-            <a:pPr marL="579438" lvl="2" indent="-285750">
-              <a:buFont typeface="Arial" panose="020B0604020202020204" pitchFamily="34" charset="0"/>
-              <a:buChar char="•"/>
-            </a:pPr>
-            <a:r>
-              <a:rPr lang="en-US" sz="1800" dirty="0"/>
-              <a:t>Navigate to application components</a:t>
-            </a:r>
-          </a:p>
-          <a:p>
-            <a:pPr marL="579438" lvl="2" indent="-285750">
-              <a:buFont typeface="Arial" panose="020B0604020202020204" pitchFamily="34" charset="0"/>
-              <a:buChar char="•"/>
-            </a:pPr>
-            <a:r>
-              <a:rPr lang="en-US" sz="1800" dirty="0"/>
-              <a:t>Dashboard message board functionality</a:t>
-            </a:r>
-          </a:p>
-          <a:p>
-            <a:r>
-              <a:rPr lang="en-US" sz="1800" dirty="0"/>
-              <a:t> </a:t>
-            </a:r>
-          </a:p>
-          <a:p>
-            <a:r>
-              <a:rPr lang="en-US" sz="1800" b="1" u="sng" dirty="0">
-                <a:solidFill>
-                  <a:srgbClr val="A88000"/>
-                </a:solidFill>
-              </a:rPr>
-              <a:t>Sprint #2</a:t>
-            </a:r>
-            <a:endParaRPr lang="en-US" sz="1800" u="sng" dirty="0">
-              <a:solidFill>
-                <a:srgbClr val="A88000"/>
-              </a:solidFill>
-            </a:endParaRPr>
-          </a:p>
-          <a:p>
-            <a:pPr marL="579438" lvl="0" indent="-285750">
-              <a:buFont typeface="Arial" panose="020B0604020202020204" pitchFamily="34" charset="0"/>
-              <a:buChar char="•"/>
-            </a:pPr>
-            <a:r>
-              <a:rPr lang="en-US" sz="1800" dirty="0"/>
-              <a:t>Rolodex</a:t>
-            </a:r>
-          </a:p>
-          <a:p>
-            <a:pPr marL="579438" lvl="0" indent="-285750">
-              <a:buFont typeface="Arial" panose="020B0604020202020204" pitchFamily="34" charset="0"/>
-              <a:buChar char="•"/>
-            </a:pPr>
-            <a:r>
-              <a:rPr lang="en-US" sz="1800" dirty="0"/>
-              <a:t>Calendar</a:t>
-            </a:r>
-          </a:p>
-          <a:p>
-            <a:pPr marL="579438" lvl="0" indent="-285750">
-              <a:buFont typeface="Arial" panose="020B0604020202020204" pitchFamily="34" charset="0"/>
-              <a:buChar char="•"/>
-            </a:pPr>
-            <a:r>
-              <a:rPr lang="en-US" sz="1800" dirty="0"/>
-              <a:t>File Cabinet</a:t>
-            </a:r>
-          </a:p>
-          <a:p>
-            <a:r>
-              <a:rPr lang="en-US" sz="1800" dirty="0"/>
-              <a:t> </a:t>
-            </a:r>
-          </a:p>
-          <a:p>
-            <a:r>
-              <a:rPr lang="en-US" sz="1800" b="1" u="sng" dirty="0">
-                <a:solidFill>
-                  <a:srgbClr val="A88000"/>
-                </a:solidFill>
-              </a:rPr>
-              <a:t>Sprint #3</a:t>
-            </a:r>
-          </a:p>
-          <a:p>
-            <a:pPr marL="579438" lvl="0" indent="-285750">
-              <a:buFont typeface="Arial" panose="020B0604020202020204" pitchFamily="34" charset="0"/>
-              <a:buChar char="•"/>
-            </a:pPr>
-            <a:r>
-              <a:rPr lang="en-US" sz="1800" dirty="0"/>
-              <a:t>Online</a:t>
-            </a:r>
-          </a:p>
-          <a:p>
-            <a:pPr marL="579438" lvl="0" indent="-285750">
-              <a:buFont typeface="Arial" panose="020B0604020202020204" pitchFamily="34" charset="0"/>
-              <a:buChar char="•"/>
-            </a:pPr>
-            <a:r>
-              <a:rPr lang="en-US" sz="1800" dirty="0"/>
-              <a:t>Budget</a:t>
-            </a:r>
-          </a:p>
-          <a:p>
-            <a:pPr marL="579438" lvl="0" indent="-285750">
-              <a:buFont typeface="Arial" panose="020B0604020202020204" pitchFamily="34" charset="0"/>
-              <a:buChar char="•"/>
-            </a:pPr>
-            <a:r>
-              <a:rPr lang="en-US" sz="1800" dirty="0"/>
-              <a:t>Look and feel</a:t>
-            </a:r>
-          </a:p>
-          <a:p>
-            <a:pPr marL="579438" lvl="0" indent="-285750">
-              <a:buFont typeface="Arial" panose="020B0604020202020204" pitchFamily="34" charset="0"/>
-              <a:buChar char="•"/>
-            </a:pPr>
-            <a:r>
-              <a:rPr lang="en-US" sz="1800" dirty="0"/>
-              <a:t>Mobile version</a:t>
-            </a:r>
-          </a:p>
-        </p:txBody>
-      </p:sp>
-      <p:sp>
-        <p:nvSpPr>
-          <p:cNvPr id="5" name="TextBox 4"/>
-          <p:cNvSpPr txBox="1"/>
-          <p:nvPr/>
-        </p:nvSpPr>
-        <p:spPr>
-          <a:xfrm>
-            <a:off x="600661" y="152400"/>
-            <a:ext cx="3139001" cy="553998"/>
-          </a:xfrm>
-          <a:prstGeom prst="rect">
-            <a:avLst/>
-          </a:prstGeom>
-          <a:noFill/>
-        </p:spPr>
-        <p:txBody>
-          <a:bodyPr wrap="none" rtlCol="0">
-            <a:spAutoFit/>
-          </a:bodyPr>
-          <a:lstStyle/>
-          <a:p>
-            <a:r>
-              <a:rPr lang="en-US" sz="3000" b="1" dirty="0" smtClean="0">
-                <a:solidFill>
-                  <a:srgbClr val="A88000"/>
-                </a:solidFill>
-              </a:rPr>
-              <a:t>Sprint Planning </a:t>
-            </a:r>
-            <a:endParaRPr lang="en-US" sz="3000" b="1" dirty="0">
-              <a:solidFill>
-                <a:srgbClr val="A88000"/>
-              </a:solidFill>
-            </a:endParaRPr>
-          </a:p>
-        </p:txBody>
-      </p:sp>
-    </p:spTree>
-    <p:extLst>
-      <p:ext uri="{BB962C8B-B14F-4D97-AF65-F5344CB8AC3E}">
-        <p14:creationId xmlns:p14="http://schemas.microsoft.com/office/powerpoint/2010/main" val="2007122357"/>
-      </p:ext>
-    </p:extLst>
-  </p:cSld>
-  <p:clrMapOvr>
-    <a:masterClrMapping/>
-  </p:clrMapOvr>
-  <p:timing>
-    <p:tnLst>
-      <p:par>
-        <p:cTn xmlns:p14="http://schemas.microsoft.com/office/powerpoint/2010/main" id="1" dur="indefinite" restart="never" nodeType="tmRoot"/>
-      </p:par>
-    </p:tnLst>
-  </p:timing>
-</p:sld>
-</file>
-
-<file path=ppt/slides/slide12.xml><?xml version="1.0" encoding="utf-8"?>
-<p:sld xmlns:a="http://schemas.openxmlformats.org/drawingml/2006/main" xmlns:r="http://schemas.openxmlformats.org/officeDocument/2006/relationships" xmlns:p="http://schemas.openxmlformats.org/presentationml/2006/main">
-  <p:cSld>
-    <p:spTree>
-      <p:nvGrpSpPr>
-        <p:cNvPr id="1" name=""/>
-        <p:cNvGrpSpPr/>
-        <p:nvPr/>
-      </p:nvGrpSpPr>
-      <p:grpSpPr>
-        <a:xfrm>
-          <a:off x="0" y="0"/>
-          <a:ext cx="0" cy="0"/>
-          <a:chOff x="0" y="0"/>
-          <a:chExt cx="0" cy="0"/>
-        </a:xfrm>
-      </p:grpSpPr>
-      <p:sp>
-        <p:nvSpPr>
-          <p:cNvPr id="4" name="Rectangle 3"/>
-          <p:cNvSpPr/>
-          <p:nvPr/>
-        </p:nvSpPr>
-        <p:spPr>
-          <a:xfrm>
             <a:off x="762000" y="1752600"/>
-            <a:ext cx="6705600" cy="2308324"/>
+            <a:ext cx="6705600" cy="2092881"/>
           </a:xfrm>
           <a:prstGeom prst="rect">
             <a:avLst/>
@@ -4510,75 +3940,26 @@
           <a:p>
             <a:r>
               <a:rPr lang="en-US" sz="2000" b="1" dirty="0" smtClean="0"/>
-              <a:t>Team Member 1: </a:t>
+              <a:t>Erik: </a:t>
             </a:r>
-            <a:r>
-              <a:rPr lang="en-US" sz="2000" dirty="0"/>
-              <a:t>user interface, programming</a:t>
-            </a:r>
-          </a:p>
-          <a:p>
-            <a:r>
-              <a:rPr lang="en-US" sz="2000" b="1" dirty="0"/>
-              <a:t>Team Member </a:t>
-            </a:r>
+          </a:p>
+          <a:p>
             <a:r>
               <a:rPr lang="en-US" sz="2000" b="1" dirty="0" smtClean="0"/>
-              <a:t>2: </a:t>
+              <a:t>Jacob: </a:t>
             </a:r>
-            <a:r>
-              <a:rPr lang="en-US" sz="2000" dirty="0" smtClean="0"/>
-              <a:t>main engine</a:t>
-            </a:r>
-            <a:endParaRPr lang="en-US" sz="2000" dirty="0"/>
-          </a:p>
-          <a:p>
-            <a:r>
-              <a:rPr lang="en-US" sz="2000" b="1" dirty="0"/>
-              <a:t>Team Member </a:t>
-            </a:r>
+          </a:p>
+          <a:p>
             <a:r>
               <a:rPr lang="en-US" sz="2000" b="1" dirty="0" smtClean="0"/>
-              <a:t>3: </a:t>
+              <a:t>Ken: </a:t>
             </a:r>
-            <a:r>
-              <a:rPr lang="en-US" sz="2000" dirty="0" smtClean="0"/>
-              <a:t>database</a:t>
-            </a:r>
-            <a:r>
-              <a:rPr lang="en-US" sz="2000" dirty="0"/>
-              <a:t>, </a:t>
-            </a:r>
-            <a:r>
-              <a:rPr lang="en-US" sz="2000" dirty="0" smtClean="0"/>
-              <a:t>interface layer, engine </a:t>
-            </a:r>
-            <a:endParaRPr lang="en-US" sz="2000" dirty="0"/>
-          </a:p>
-          <a:p>
-            <a:r>
-              <a:rPr lang="en-US" sz="2000" b="1" dirty="0"/>
-              <a:t>Team Member </a:t>
-            </a:r>
+          </a:p>
+          <a:p>
             <a:r>
               <a:rPr lang="en-US" sz="2000" b="1" dirty="0" smtClean="0"/>
-              <a:t>4: </a:t>
+              <a:t>Thaddeus: </a:t>
             </a:r>
-            <a:r>
-              <a:rPr lang="en-US" sz="2000" dirty="0" smtClean="0"/>
-              <a:t>database</a:t>
-            </a:r>
-            <a:r>
-              <a:rPr lang="en-US" sz="2000" dirty="0"/>
-              <a:t> </a:t>
-            </a:r>
-            <a:r>
-              <a:rPr lang="en-US" sz="2000" dirty="0" smtClean="0"/>
-              <a:t>creation and management </a:t>
-            </a:r>
-            <a:endParaRPr lang="en-US" sz="2000" dirty="0"/>
-          </a:p>
-          <a:p>
             <a:r>
               <a:rPr lang="en-US" dirty="0"/>
               <a:t> </a:t>
@@ -4599,7 +3980,7 @@
   <p:timing>
     <p:tnLst>
       <p:par>
-        <p:cTn xmlns:p14="http://schemas.microsoft.com/office/powerpoint/2010/main" id="1" dur="indefinite" restart="never" nodeType="tmRoot"/>
+        <p:cTn id="1" dur="indefinite" restart="never" nodeType="tmRoot"/>
       </p:par>
     </p:tnLst>
   </p:timing>
@@ -5798,13 +5179,13 @@
   <p:clrMapOvr>
     <a:masterClrMapping/>
   </p:clrMapOvr>
-  <p:transition xmlns:p14="http://schemas.microsoft.com/office/powerpoint/2010/main" spd="slow">
+  <p:transition spd="slow">
     <p:cut/>
   </p:transition>
   <p:timing>
     <p:tnLst>
       <p:par>
-        <p:cTn xmlns:p14="http://schemas.microsoft.com/office/powerpoint/2010/main" id="1" dur="indefinite" restart="never" nodeType="tmRoot"/>
+        <p:cTn id="1" dur="indefinite" restart="never" nodeType="tmRoot"/>
       </p:par>
     </p:tnLst>
   </p:timing>
@@ -5841,7 +5222,7 @@
         <p:spPr>
           <a:xfrm>
             <a:off x="457200" y="1600200"/>
-            <a:ext cx="8229600" cy="3570178"/>
+            <a:ext cx="8229600" cy="492412"/>
           </a:xfrm>
           <a:prstGeom prst="rect">
             <a:avLst/>
@@ -5861,156 +5242,7 @@
               <a:buFont typeface="Arial"/>
               <a:buChar char="•"/>
             </a:pPr>
-            <a:r>
-              <a:rPr lang="en" sz="2000" dirty="0">
-                <a:solidFill>
-                  <a:srgbClr val="A88000"/>
-                </a:solidFill>
-              </a:rPr>
-              <a:t>Service Client</a:t>
-            </a:r>
-          </a:p>
-          <a:p>
-            <a:pPr marL="914400" lvl="1" indent="-381000" algn="l" rtl="0">
-              <a:buClr>
-                <a:schemeClr val="dk1"/>
-              </a:buClr>
-              <a:buSzPct val="80000"/>
-              <a:buFont typeface="Courier New"/>
-              <a:buChar char="o"/>
-            </a:pPr>
-            <a:r>
-              <a:rPr lang="en" sz="2000" dirty="0"/>
-              <a:t>Used the client application software to consume the web service.</a:t>
-            </a:r>
-          </a:p>
-          <a:p>
-            <a:pPr marL="457200" lvl="0" indent="-419100" algn="l" rtl="0">
-              <a:buClr>
-                <a:schemeClr val="dk1"/>
-              </a:buClr>
-              <a:buSzPct val="166666"/>
-              <a:buFont typeface="Arial"/>
-              <a:buChar char="•"/>
-            </a:pPr>
-            <a:r>
-              <a:rPr lang="en" sz="2000" dirty="0">
-                <a:solidFill>
-                  <a:srgbClr val="A88000"/>
-                </a:solidFill>
-              </a:rPr>
-              <a:t>Listeners</a:t>
-            </a:r>
-          </a:p>
-          <a:p>
-            <a:pPr marL="914400" lvl="1" indent="-381000" algn="l" rtl="0">
-              <a:buClr>
-                <a:schemeClr val="dk1"/>
-              </a:buClr>
-              <a:buSzPct val="80000"/>
-              <a:buFont typeface="Courier New"/>
-              <a:buChar char="o"/>
-            </a:pPr>
-            <a:r>
-              <a:rPr lang="en" sz="2000" dirty="0"/>
-              <a:t>Listen for user interaction, and call corresponding functionality</a:t>
-            </a:r>
-          </a:p>
-          <a:p>
-            <a:pPr marL="457200" lvl="0" indent="-419100" algn="l" rtl="0">
-              <a:buClr>
-                <a:schemeClr val="dk1"/>
-              </a:buClr>
-              <a:buSzPct val="166666"/>
-              <a:buFont typeface="Arial"/>
-              <a:buChar char="•"/>
-            </a:pPr>
-            <a:r>
-              <a:rPr lang="en" sz="2000" dirty="0">
-                <a:solidFill>
-                  <a:srgbClr val="A88000"/>
-                </a:solidFill>
-              </a:rPr>
-              <a:t>RESTful Web Service manager</a:t>
-            </a:r>
-          </a:p>
-          <a:p>
-            <a:pPr marL="914400" lvl="1" indent="-381000" algn="l" rtl="0">
-              <a:buClr>
-                <a:schemeClr val="dk1"/>
-              </a:buClr>
-              <a:buSzPct val="80000"/>
-              <a:buFont typeface="Courier New"/>
-              <a:buChar char="o"/>
-            </a:pPr>
-            <a:r>
-              <a:rPr lang="en" sz="2000" dirty="0"/>
-              <a:t>Direct Requests to the appropriate service</a:t>
-            </a:r>
-          </a:p>
-          <a:p>
-            <a:pPr marL="457200" lvl="0" indent="-419100" algn="l" rtl="0">
-              <a:buClr>
-                <a:schemeClr val="dk1"/>
-              </a:buClr>
-              <a:buSzPct val="166666"/>
-              <a:buFont typeface="Arial"/>
-              <a:buChar char="•"/>
-            </a:pPr>
-            <a:r>
-              <a:rPr lang="en" sz="2000" dirty="0">
-                <a:solidFill>
-                  <a:srgbClr val="A88000"/>
-                </a:solidFill>
-              </a:rPr>
-              <a:t>Web Services</a:t>
-            </a:r>
-          </a:p>
-          <a:p>
-            <a:pPr marL="914400" lvl="1" indent="-381000" algn="l" rtl="0">
-              <a:buClr>
-                <a:schemeClr val="dk1"/>
-              </a:buClr>
-              <a:buSzPct val="80000"/>
-              <a:buFont typeface="Courier New"/>
-              <a:buChar char="o"/>
-            </a:pPr>
-            <a:r>
-              <a:rPr lang="en" sz="2000" dirty="0"/>
-              <a:t>Manage data flow into and out of the database</a:t>
-            </a:r>
-          </a:p>
-          <a:p>
-            <a:pPr marL="457200" lvl="0" indent="-419100" algn="l" rtl="0">
-              <a:buClr>
-                <a:schemeClr val="dk1"/>
-              </a:buClr>
-              <a:buSzPct val="166666"/>
-              <a:buFont typeface="Arial"/>
-              <a:buChar char="•"/>
-            </a:pPr>
-            <a:r>
-              <a:rPr lang="en" sz="2000" dirty="0">
-                <a:solidFill>
-                  <a:srgbClr val="A88000"/>
-                </a:solidFill>
-              </a:rPr>
-              <a:t>Requests/Response</a:t>
-            </a:r>
-          </a:p>
-          <a:p>
-            <a:pPr marL="914400" lvl="1" indent="-381000" algn="l" rtl="0">
-              <a:buClr>
-                <a:schemeClr val="dk1"/>
-              </a:buClr>
-              <a:buSzPct val="80000"/>
-              <a:buFont typeface="Courier New"/>
-              <a:buChar char="o"/>
-            </a:pPr>
-            <a:r>
-              <a:rPr lang="en" sz="2000" dirty="0"/>
-              <a:t>Well formatted data in XML or JSON structure</a:t>
-            </a:r>
+            <a:endParaRPr lang="en" sz="2000" dirty="0"/>
           </a:p>
         </p:txBody>
       </p:sp>
@@ -6023,7 +5255,7 @@
         <p:spPr>
           <a:xfrm>
             <a:off x="457200" y="689875"/>
-            <a:ext cx="3975899" cy="738633"/>
+            <a:ext cx="5715000" cy="738633"/>
           </a:xfrm>
           <a:prstGeom prst="rect">
             <a:avLst/>
@@ -6031,7 +5263,7 @@
           <a:noFill/>
         </p:spPr>
         <p:txBody>
-          <a:bodyPr lIns="91425" tIns="91425" rIns="91425" bIns="91425" anchor="t" anchorCtr="0">
+          <a:bodyPr wrap="square" lIns="91425" tIns="91425" rIns="91425" bIns="91425" anchor="t" anchorCtr="0">
             <a:spAutoFit/>
           </a:bodyPr>
           <a:lstStyle/>
@@ -6045,7 +5277,7 @@
                   <a:srgbClr val="A88000"/>
                 </a:solidFill>
               </a:rPr>
-              <a:t>C</a:t>
+              <a:t>Design One C</a:t>
             </a:r>
             <a:r>
               <a:rPr lang="en-US" sz="3600" b="1" u="sng" dirty="0" smtClean="0">
@@ -6072,17 +5304,22 @@
         </p:txBody>
       </p:sp>
     </p:spTree>
+    <p:extLst>
+      <p:ext uri="{BB962C8B-B14F-4D97-AF65-F5344CB8AC3E}">
+        <p14:creationId xmlns:p14="http://schemas.microsoft.com/office/powerpoint/2010/main" val="1037964348"/>
+      </p:ext>
+    </p:extLst>
   </p:cSld>
   <p:clrMapOvr>
     <a:masterClrMapping/>
   </p:clrMapOvr>
-  <p:transition xmlns:p14="http://schemas.microsoft.com/office/powerpoint/2010/main" spd="slow">
+  <p:transition spd="slow">
     <p:cut/>
   </p:transition>
   <p:timing>
     <p:tnLst>
       <p:par>
-        <p:cTn xmlns:p14="http://schemas.microsoft.com/office/powerpoint/2010/main" id="1" dur="indefinite" restart="never" nodeType="tmRoot"/>
+        <p:cTn id="1" dur="indefinite" restart="never" nodeType="tmRoot"/>
       </p:par>
     </p:tnLst>
   </p:timing>
@@ -6115,7 +5352,7 @@
         <p:spPr>
           <a:xfrm>
             <a:off x="278311" y="262575"/>
-            <a:ext cx="8541900" cy="5355282"/>
+            <a:ext cx="8541900" cy="1661963"/>
           </a:xfrm>
           <a:prstGeom prst="rect">
             <a:avLst/>
@@ -6137,55 +5374,18 @@
               <a:buChar char="•"/>
             </a:pPr>
             <a:r>
-              <a:rPr lang="en" sz="3600" dirty="0">
+              <a:rPr lang="en" sz="3600" dirty="0" smtClean="0">
                 <a:solidFill>
                   <a:srgbClr val="FF0000"/>
                 </a:solidFill>
               </a:rPr>
-              <a:t>Pros</a:t>
+              <a:t>Pros of Design One</a:t>
             </a:r>
-          </a:p>
-          <a:p>
-            <a:pPr marL="914400" lvl="1" indent="-457200" rtl="0">
-              <a:buClr>
-                <a:srgbClr val="000000"/>
-              </a:buClr>
-              <a:buSzPct val="150000"/>
-              <a:buFont typeface="Courier New"/>
-              <a:buChar char="o"/>
-            </a:pPr>
-            <a:r>
-              <a:rPr lang="en" sz="2400" dirty="0"/>
-              <a:t>Decentralized workload (less work done on the server)</a:t>
-            </a:r>
-          </a:p>
-          <a:p>
-            <a:pPr marL="914400" lvl="1" indent="-457200" rtl="0">
-              <a:buClr>
-                <a:srgbClr val="000000"/>
-              </a:buClr>
-              <a:buSzPct val="150000"/>
-              <a:buFont typeface="Courier New"/>
-              <a:buChar char="o"/>
-            </a:pPr>
-            <a:r>
-              <a:rPr lang="en" sz="2400" dirty="0"/>
-              <a:t>Requires less bandwidth to operate (just the data, not the data + markup)</a:t>
-            </a:r>
-          </a:p>
-          <a:p>
-            <a:pPr marL="914400" lvl="1" indent="-457200" rtl="0">
-              <a:buClr>
-                <a:srgbClr val="000000"/>
-              </a:buClr>
-              <a:buSzPct val="150000"/>
-              <a:buFont typeface="Courier New"/>
-              <a:buChar char="o"/>
-            </a:pPr>
-            <a:r>
-              <a:rPr lang="en" sz="2400" dirty="0"/>
-              <a:t>Avoid cross-browser compatibility issues</a:t>
-            </a:r>
+            <a:endParaRPr lang="en" sz="3600" dirty="0">
+              <a:solidFill>
+                <a:srgbClr val="FF0000"/>
+              </a:solidFill>
+            </a:endParaRPr>
           </a:p>
           <a:p>
             <a:pPr marL="457200" lvl="0" indent="-457200" rtl="0">
@@ -6197,54 +5397,12 @@
               <a:buChar char="•"/>
             </a:pPr>
             <a:r>
-              <a:rPr lang="en" sz="3600" dirty="0">
+              <a:rPr lang="en" sz="3600" dirty="0" smtClean="0">
                 <a:solidFill>
                   <a:srgbClr val="FF0000"/>
                 </a:solidFill>
               </a:rPr>
-              <a:t>Cons</a:t>
-            </a:r>
-          </a:p>
-          <a:p>
-            <a:pPr marL="914400" lvl="1" indent="-457200" rtl="0">
-              <a:buClr>
-                <a:srgbClr val="000000"/>
-              </a:buClr>
-              <a:buSzPct val="150000"/>
-              <a:buFont typeface="Courier New"/>
-              <a:buChar char="o"/>
-            </a:pPr>
-            <a:r>
-              <a:rPr lang="en" sz="2400" dirty="0"/>
-              <a:t>Client-side would be native code which would have to be ported to every target platform.</a:t>
-            </a:r>
-          </a:p>
-          <a:p>
-            <a:pPr marL="914400" lvl="1" indent="-457200" rtl="0">
-              <a:buClr>
-                <a:srgbClr val="000000"/>
-              </a:buClr>
-              <a:buSzPct val="150000"/>
-              <a:buFont typeface="Courier New"/>
-              <a:buChar char="o"/>
-            </a:pPr>
-            <a:r>
-              <a:rPr lang="en" sz="2400" dirty="0"/>
-              <a:t>Changes to the system have to be released with both an updated API and updated native clients.</a:t>
-            </a:r>
-          </a:p>
-          <a:p>
-            <a:pPr marL="914400" lvl="1" indent="-457200" rtl="0">
-              <a:buClr>
-                <a:srgbClr val="000000"/>
-              </a:buClr>
-              <a:buSzPct val="150000"/>
-              <a:buFont typeface="Courier New"/>
-              <a:buChar char="o"/>
-            </a:pPr>
-            <a:r>
-              <a:rPr lang="en" sz="2400" dirty="0"/>
-              <a:t>Requires domain modeling across two separate systems (Web services and client-side app)</a:t>
+              <a:t>Cons of Design One</a:t>
             </a:r>
           </a:p>
           <a:p>
@@ -6253,17 +5411,22 @@
         </p:txBody>
       </p:sp>
     </p:spTree>
+    <p:extLst>
+      <p:ext uri="{BB962C8B-B14F-4D97-AF65-F5344CB8AC3E}">
+        <p14:creationId xmlns:p14="http://schemas.microsoft.com/office/powerpoint/2010/main" val="2027417680"/>
+      </p:ext>
+    </p:extLst>
   </p:cSld>
   <p:clrMapOvr>
     <a:masterClrMapping/>
   </p:clrMapOvr>
-  <p:transition xmlns:p14="http://schemas.microsoft.com/office/powerpoint/2010/main" spd="slow">
+  <p:transition spd="slow">
     <p:cut/>
   </p:transition>
   <p:timing>
     <p:tnLst>
       <p:par>
-        <p:cTn xmlns:p14="http://schemas.microsoft.com/office/powerpoint/2010/main" id="1" dur="indefinite" restart="never" nodeType="tmRoot"/>
+        <p:cTn id="1" dur="indefinite" restart="never" nodeType="tmRoot"/>
       </p:par>
     </p:tnLst>
   </p:timing>
@@ -6289,93 +5452,20 @@
       </p:grpSpPr>
       <p:sp>
         <p:nvSpPr>
-          <p:cNvPr id="75" name="Shape 75"/>
+          <p:cNvPr id="116" name="Shape 28"/>
           <p:cNvSpPr/>
           <p:nvPr/>
         </p:nvSpPr>
         <p:spPr>
           <a:xfrm>
-            <a:off x="1069475" y="367129"/>
-            <a:ext cx="5802899" cy="1555200"/>
-          </a:xfrm>
-          <a:prstGeom prst="rect">
-            <a:avLst/>
-          </a:prstGeom>
-          <a:noFill/>
-          <a:ln w="19050" cap="flat">
-            <a:solidFill>
-              <a:srgbClr val="3C78D8"/>
-            </a:solidFill>
-            <a:prstDash val="solid"/>
-            <a:round/>
-            <a:headEnd type="none" w="med" len="med"/>
-            <a:tailEnd type="none" w="med" len="med"/>
-          </a:ln>
-        </p:spPr>
-        <p:txBody>
-          <a:bodyPr lIns="91425" tIns="91425" rIns="91425" bIns="91425" anchor="ctr" anchorCtr="0">
-            <a:spAutoFit/>
-          </a:bodyPr>
-          <a:lstStyle/>
-          <a:p>
-            <a:endParaRPr/>
-          </a:p>
-        </p:txBody>
-      </p:sp>
-      <p:sp>
-        <p:nvSpPr>
-          <p:cNvPr id="76" name="Shape 76"/>
-          <p:cNvSpPr/>
-          <p:nvPr/>
-        </p:nvSpPr>
-        <p:spPr>
-          <a:xfrm>
-            <a:off x="579365" y="2648864"/>
-            <a:ext cx="5040299" cy="1302599"/>
-          </a:xfrm>
-          <a:prstGeom prst="arc">
-            <a:avLst>
-              <a:gd name="adj1" fmla="val 10773501"/>
-              <a:gd name="adj2" fmla="val 67144"/>
-            </a:avLst>
-          </a:prstGeom>
-          <a:noFill/>
-          <a:ln w="19050" cap="flat">
-            <a:solidFill>
-              <a:schemeClr val="dk2"/>
-            </a:solidFill>
-            <a:prstDash val="solid"/>
-            <a:round/>
-            <a:headEnd type="triangle" w="med" len="med"/>
-            <a:tailEnd type="triangle" w="med" len="med"/>
-          </a:ln>
-        </p:spPr>
-        <p:txBody>
-          <a:bodyPr lIns="91425" tIns="91425" rIns="91425" bIns="91425" anchor="ctr" anchorCtr="0">
-            <a:spAutoFit/>
-          </a:bodyPr>
-          <a:lstStyle/>
-          <a:p>
-            <a:endParaRPr/>
-          </a:p>
-        </p:txBody>
-      </p:sp>
-      <p:sp>
-        <p:nvSpPr>
-          <p:cNvPr id="77" name="Shape 77"/>
-          <p:cNvSpPr/>
-          <p:nvPr/>
-        </p:nvSpPr>
-        <p:spPr>
-          <a:xfrm>
-            <a:off x="1179675" y="1207348"/>
-            <a:ext cx="1261500" cy="538800"/>
-          </a:xfrm>
-          <a:prstGeom prst="rect">
+            <a:off x="1254218" y="708520"/>
+            <a:ext cx="5845885" cy="1523918"/>
+          </a:xfrm>
+          <a:prstGeom prst="cloud">
             <a:avLst/>
           </a:prstGeom>
           <a:solidFill>
-            <a:schemeClr val="lt2"/>
+            <a:srgbClr val="EFEFEF"/>
           </a:solidFill>
           <a:ln w="19050" cap="flat">
             <a:solidFill>
@@ -6388,1305 +5478,15 @@
           </a:ln>
         </p:spPr>
         <p:txBody>
-          <a:bodyPr lIns="91425" tIns="91425" rIns="91425" bIns="91425" anchor="ctr" anchorCtr="0">
+          <a:bodyPr wrap="square" lIns="91425" tIns="91425" rIns="91425" bIns="91425" anchor="ctr" anchorCtr="0">
             <a:spAutoFit/>
           </a:bodyPr>
           <a:lstStyle/>
           <a:p>
-            <a:pPr lvl="0" algn="ctr" rtl="0">
-              <a:buNone/>
-            </a:pPr>
-            <a:r>
-              <a:rPr lang="en"/>
-              <a:t>User Service</a:t>
-            </a:r>
+            <a:endParaRPr/>
           </a:p>
         </p:txBody>
       </p:sp>
-      <p:sp>
-        <p:nvSpPr>
-          <p:cNvPr id="78" name="Shape 78"/>
-          <p:cNvSpPr/>
-          <p:nvPr/>
-        </p:nvSpPr>
-        <p:spPr>
-          <a:xfrm>
-            <a:off x="5147625" y="1182898"/>
-            <a:ext cx="1506299" cy="587699"/>
-          </a:xfrm>
-          <a:prstGeom prst="rect">
-            <a:avLst/>
-          </a:prstGeom>
-          <a:solidFill>
-            <a:schemeClr val="lt2"/>
-          </a:solidFill>
-          <a:ln w="19050" cap="flat">
-            <a:solidFill>
-              <a:schemeClr val="dk2"/>
-            </a:solidFill>
-            <a:prstDash val="solid"/>
-            <a:round/>
-            <a:headEnd type="none" w="med" len="med"/>
-            <a:tailEnd type="none" w="med" len="med"/>
-          </a:ln>
-        </p:spPr>
-        <p:txBody>
-          <a:bodyPr lIns="91425" tIns="91425" rIns="91425" bIns="91425" anchor="ctr" anchorCtr="0">
-            <a:spAutoFit/>
-          </a:bodyPr>
-          <a:lstStyle/>
-          <a:p>
-            <a:pPr lvl="0" algn="ctr" rtl="0">
-              <a:buNone/>
-            </a:pPr>
-            <a:r>
-              <a:rPr lang="en"/>
-              <a:t>System Service</a:t>
-            </a:r>
-          </a:p>
-        </p:txBody>
-      </p:sp>
-      <p:sp>
-        <p:nvSpPr>
-          <p:cNvPr id="79" name="Shape 79"/>
-          <p:cNvSpPr/>
-          <p:nvPr/>
-        </p:nvSpPr>
-        <p:spPr>
-          <a:xfrm>
-            <a:off x="2882075" y="1164448"/>
-            <a:ext cx="1824600" cy="624599"/>
-          </a:xfrm>
-          <a:prstGeom prst="rect">
-            <a:avLst/>
-          </a:prstGeom>
-          <a:solidFill>
-            <a:schemeClr val="lt2"/>
-          </a:solidFill>
-          <a:ln w="19050" cap="flat">
-            <a:solidFill>
-              <a:schemeClr val="dk2"/>
-            </a:solidFill>
-            <a:prstDash val="solid"/>
-            <a:round/>
-            <a:headEnd type="none" w="med" len="med"/>
-            <a:tailEnd type="none" w="med" len="med"/>
-          </a:ln>
-        </p:spPr>
-        <p:txBody>
-          <a:bodyPr lIns="91425" tIns="91425" rIns="91425" bIns="91425" anchor="ctr" anchorCtr="0">
-            <a:spAutoFit/>
-          </a:bodyPr>
-          <a:lstStyle/>
-          <a:p>
-            <a:pPr algn="ctr">
-              <a:buNone/>
-            </a:pPr>
-            <a:r>
-              <a:rPr lang="en"/>
-              <a:t>Recipe/Ingredient service</a:t>
-            </a:r>
-          </a:p>
-        </p:txBody>
-      </p:sp>
-      <p:cxnSp>
-        <p:nvCxnSpPr>
-          <p:cNvPr id="80" name="Shape 80"/>
-          <p:cNvCxnSpPr>
-            <a:stCxn id="79" idx="1"/>
-            <a:endCxn id="77" idx="3"/>
-          </p:cNvCxnSpPr>
-          <p:nvPr/>
-        </p:nvCxnSpPr>
-        <p:spPr>
-          <a:xfrm flipH="1">
-            <a:off x="2441175" y="1476748"/>
-            <a:ext cx="440899" cy="0"/>
-          </a:xfrm>
-          <a:prstGeom prst="straightConnector1">
-            <a:avLst/>
-          </a:prstGeom>
-          <a:noFill/>
-          <a:ln w="19050" cap="flat">
-            <a:solidFill>
-              <a:schemeClr val="dk2"/>
-            </a:solidFill>
-            <a:prstDash val="solid"/>
-            <a:round/>
-            <a:headEnd type="triangle" w="lg" len="lg"/>
-            <a:tailEnd type="triangle" w="lg" len="lg"/>
-          </a:ln>
-        </p:spPr>
-      </p:cxnSp>
-      <p:cxnSp>
-        <p:nvCxnSpPr>
-          <p:cNvPr id="81" name="Shape 81"/>
-          <p:cNvCxnSpPr>
-            <a:stCxn id="78" idx="1"/>
-            <a:endCxn id="79" idx="3"/>
-          </p:cNvCxnSpPr>
-          <p:nvPr/>
-        </p:nvCxnSpPr>
-        <p:spPr>
-          <a:xfrm rot="10800000">
-            <a:off x="4706675" y="1476748"/>
-            <a:ext cx="440949" cy="0"/>
-          </a:xfrm>
-          <a:prstGeom prst="straightConnector1">
-            <a:avLst/>
-          </a:prstGeom>
-          <a:noFill/>
-          <a:ln w="19050" cap="flat">
-            <a:solidFill>
-              <a:schemeClr val="dk2"/>
-            </a:solidFill>
-            <a:prstDash val="solid"/>
-            <a:round/>
-            <a:headEnd type="triangle" w="lg" len="lg"/>
-            <a:tailEnd type="triangle" w="lg" len="lg"/>
-          </a:ln>
-        </p:spPr>
-      </p:cxnSp>
-      <p:sp>
-        <p:nvSpPr>
-          <p:cNvPr id="82" name="Shape 82"/>
-          <p:cNvSpPr/>
-          <p:nvPr/>
-        </p:nvSpPr>
-        <p:spPr>
-          <a:xfrm>
-            <a:off x="1974650" y="977539"/>
-            <a:ext cx="3857699" cy="402000"/>
-          </a:xfrm>
-          <a:prstGeom prst="arc">
-            <a:avLst>
-              <a:gd name="adj1" fmla="val 10811025"/>
-              <a:gd name="adj2" fmla="val 21562496"/>
-            </a:avLst>
-          </a:prstGeom>
-          <a:noFill/>
-          <a:ln w="19050" cap="flat">
-            <a:solidFill>
-              <a:schemeClr val="dk2"/>
-            </a:solidFill>
-            <a:prstDash val="solid"/>
-            <a:round/>
-            <a:headEnd type="triangle" w="med" len="med"/>
-            <a:tailEnd type="triangle" w="med" len="med"/>
-          </a:ln>
-        </p:spPr>
-        <p:txBody>
-          <a:bodyPr lIns="91425" tIns="91425" rIns="91425" bIns="91425" anchor="ctr" anchorCtr="0">
-            <a:spAutoFit/>
-          </a:bodyPr>
-          <a:lstStyle/>
-          <a:p>
-            <a:endParaRPr/>
-          </a:p>
-        </p:txBody>
-      </p:sp>
-      <p:sp>
-        <p:nvSpPr>
-          <p:cNvPr id="83" name="Shape 83"/>
-          <p:cNvSpPr/>
-          <p:nvPr/>
-        </p:nvSpPr>
-        <p:spPr>
-          <a:xfrm>
-            <a:off x="346875" y="3313673"/>
-            <a:ext cx="832799" cy="563400"/>
-          </a:xfrm>
-          <a:prstGeom prst="rect">
-            <a:avLst/>
-          </a:prstGeom>
-          <a:solidFill>
-            <a:schemeClr val="lt2"/>
-          </a:solidFill>
-          <a:ln w="19050" cap="flat">
-            <a:solidFill>
-              <a:schemeClr val="dk2"/>
-            </a:solidFill>
-            <a:prstDash val="solid"/>
-            <a:round/>
-            <a:headEnd type="none" w="med" len="med"/>
-            <a:tailEnd type="none" w="med" len="med"/>
-          </a:ln>
-        </p:spPr>
-        <p:txBody>
-          <a:bodyPr lIns="91425" tIns="91425" rIns="91425" bIns="91425" anchor="ctr" anchorCtr="0">
-            <a:spAutoFit/>
-          </a:bodyPr>
-          <a:lstStyle/>
-          <a:p>
-            <a:pPr lvl="0" algn="ctr" rtl="0">
-              <a:buNone/>
-            </a:pPr>
-            <a:r>
-              <a:rPr lang="en"/>
-              <a:t>User</a:t>
-            </a:r>
-          </a:p>
-        </p:txBody>
-      </p:sp>
-      <p:cxnSp>
-        <p:nvCxnSpPr>
-          <p:cNvPr id="84" name="Shape 84"/>
-          <p:cNvCxnSpPr/>
-          <p:nvPr/>
-        </p:nvCxnSpPr>
-        <p:spPr>
-          <a:xfrm flipH="1">
-            <a:off x="463875" y="1746473"/>
-            <a:ext cx="720299" cy="1536900"/>
-          </a:xfrm>
-          <a:prstGeom prst="straightConnector1">
-            <a:avLst/>
-          </a:prstGeom>
-          <a:noFill/>
-          <a:ln w="19050" cap="flat">
-            <a:solidFill>
-              <a:schemeClr val="dk2"/>
-            </a:solidFill>
-            <a:prstDash val="solid"/>
-            <a:round/>
-            <a:headEnd type="none" w="lg" len="lg"/>
-            <a:tailEnd type="triangle" w="lg" len="lg"/>
-          </a:ln>
-        </p:spPr>
-      </p:cxnSp>
-      <p:sp>
-        <p:nvSpPr>
-          <p:cNvPr id="85" name="Shape 85"/>
-          <p:cNvSpPr/>
-          <p:nvPr/>
-        </p:nvSpPr>
-        <p:spPr>
-          <a:xfrm>
-            <a:off x="4617855" y="3325973"/>
-            <a:ext cx="1345799" cy="538800"/>
-          </a:xfrm>
-          <a:prstGeom prst="rect">
-            <a:avLst/>
-          </a:prstGeom>
-          <a:solidFill>
-            <a:schemeClr val="lt2"/>
-          </a:solidFill>
-          <a:ln w="19050" cap="flat">
-            <a:solidFill>
-              <a:schemeClr val="dk2"/>
-            </a:solidFill>
-            <a:prstDash val="solid"/>
-            <a:round/>
-            <a:headEnd type="none" w="med" len="med"/>
-            <a:tailEnd type="none" w="med" len="med"/>
-          </a:ln>
-        </p:spPr>
-        <p:txBody>
-          <a:bodyPr lIns="91425" tIns="91425" rIns="91425" bIns="91425" anchor="ctr" anchorCtr="0">
-            <a:spAutoFit/>
-          </a:bodyPr>
-          <a:lstStyle/>
-          <a:p>
-            <a:pPr algn="ctr">
-              <a:buNone/>
-            </a:pPr>
-            <a:r>
-              <a:rPr lang="en"/>
-              <a:t>Ingredients</a:t>
-            </a:r>
-          </a:p>
-        </p:txBody>
-      </p:sp>
-      <p:cxnSp>
-        <p:nvCxnSpPr>
-          <p:cNvPr id="86" name="Shape 86"/>
-          <p:cNvCxnSpPr/>
-          <p:nvPr/>
-        </p:nvCxnSpPr>
-        <p:spPr>
-          <a:xfrm>
-            <a:off x="4684175" y="1782725"/>
-            <a:ext cx="1173299" cy="1564499"/>
-          </a:xfrm>
-          <a:prstGeom prst="straightConnector1">
-            <a:avLst/>
-          </a:prstGeom>
-          <a:noFill/>
-          <a:ln w="19050" cap="flat">
-            <a:solidFill>
-              <a:schemeClr val="dk2"/>
-            </a:solidFill>
-            <a:prstDash val="solid"/>
-            <a:round/>
-            <a:headEnd type="none" w="lg" len="lg"/>
-            <a:tailEnd type="triangle" w="lg" len="lg"/>
-          </a:ln>
-        </p:spPr>
-      </p:cxnSp>
-      <p:sp>
-        <p:nvSpPr>
-          <p:cNvPr id="87" name="Shape 87"/>
-          <p:cNvSpPr/>
-          <p:nvPr/>
-        </p:nvSpPr>
-        <p:spPr>
-          <a:xfrm>
-            <a:off x="1623225" y="3313673"/>
-            <a:ext cx="1176300" cy="563400"/>
-          </a:xfrm>
-          <a:prstGeom prst="rect">
-            <a:avLst/>
-          </a:prstGeom>
-          <a:solidFill>
-            <a:schemeClr val="lt2"/>
-          </a:solidFill>
-          <a:ln w="19050" cap="flat">
-            <a:solidFill>
-              <a:schemeClr val="dk2"/>
-            </a:solidFill>
-            <a:prstDash val="solid"/>
-            <a:round/>
-            <a:headEnd type="none" w="med" len="med"/>
-            <a:tailEnd type="none" w="med" len="med"/>
-          </a:ln>
-        </p:spPr>
-        <p:txBody>
-          <a:bodyPr lIns="91425" tIns="91425" rIns="91425" bIns="91425" anchor="ctr" anchorCtr="0">
-            <a:spAutoFit/>
-          </a:bodyPr>
-          <a:lstStyle/>
-          <a:p>
-            <a:pPr algn="ctr">
-              <a:buNone/>
-            </a:pPr>
-            <a:r>
-              <a:rPr lang="en"/>
-              <a:t>Refrigerator Contents</a:t>
-            </a:r>
-          </a:p>
-        </p:txBody>
-      </p:sp>
-      <p:sp>
-        <p:nvSpPr>
-          <p:cNvPr id="88" name="Shape 88"/>
-          <p:cNvSpPr/>
-          <p:nvPr/>
-        </p:nvSpPr>
-        <p:spPr>
-          <a:xfrm>
-            <a:off x="2927775" y="3305873"/>
-            <a:ext cx="1253400" cy="579000"/>
-          </a:xfrm>
-          <a:prstGeom prst="rect">
-            <a:avLst/>
-          </a:prstGeom>
-          <a:solidFill>
-            <a:schemeClr val="lt2"/>
-          </a:solidFill>
-          <a:ln w="19050" cap="flat">
-            <a:solidFill>
-              <a:schemeClr val="dk2"/>
-            </a:solidFill>
-            <a:prstDash val="solid"/>
-            <a:round/>
-            <a:headEnd type="none" w="med" len="med"/>
-            <a:tailEnd type="none" w="med" len="med"/>
-          </a:ln>
-        </p:spPr>
-        <p:txBody>
-          <a:bodyPr lIns="91425" tIns="91425" rIns="91425" bIns="91425" anchor="ctr" anchorCtr="0">
-            <a:spAutoFit/>
-          </a:bodyPr>
-          <a:lstStyle/>
-          <a:p>
-            <a:pPr algn="ctr">
-              <a:buNone/>
-            </a:pPr>
-            <a:r>
-              <a:rPr lang="en"/>
-              <a:t>Recipe Contents</a:t>
-            </a:r>
-          </a:p>
-        </p:txBody>
-      </p:sp>
-      <p:sp>
-        <p:nvSpPr>
-          <p:cNvPr id="89" name="Shape 89"/>
-          <p:cNvSpPr/>
-          <p:nvPr/>
-        </p:nvSpPr>
-        <p:spPr>
-          <a:xfrm>
-            <a:off x="6714215" y="3187523"/>
-            <a:ext cx="1725899" cy="815699"/>
-          </a:xfrm>
-          <a:prstGeom prst="rect">
-            <a:avLst/>
-          </a:prstGeom>
-          <a:solidFill>
-            <a:srgbClr val="434343"/>
-          </a:solidFill>
-          <a:ln w="19050" cap="flat">
-            <a:solidFill>
-              <a:srgbClr val="999999"/>
-            </a:solidFill>
-            <a:prstDash val="solid"/>
-            <a:round/>
-            <a:headEnd type="none" w="med" len="med"/>
-            <a:tailEnd type="none" w="med" len="med"/>
-          </a:ln>
-        </p:spPr>
-        <p:txBody>
-          <a:bodyPr lIns="91425" tIns="91425" rIns="91425" bIns="91425" anchor="ctr" anchorCtr="0">
-            <a:spAutoFit/>
-          </a:bodyPr>
-          <a:lstStyle/>
-          <a:p>
-            <a:pPr algn="ctr">
-              <a:buNone/>
-            </a:pPr>
-            <a:r>
-              <a:rPr lang="en" sz="2400">
-                <a:solidFill>
-                  <a:srgbClr val="F3F3F3"/>
-                </a:solidFill>
-              </a:rPr>
-              <a:t>Server</a:t>
-            </a:r>
-          </a:p>
-        </p:txBody>
-      </p:sp>
-      <p:cxnSp>
-        <p:nvCxnSpPr>
-          <p:cNvPr id="90" name="Shape 90"/>
-          <p:cNvCxnSpPr>
-            <a:stCxn id="75" idx="3"/>
-            <a:endCxn id="89" idx="0"/>
-          </p:cNvCxnSpPr>
-          <p:nvPr/>
-        </p:nvCxnSpPr>
-        <p:spPr>
-          <a:xfrm>
-            <a:off x="6872374" y="1144729"/>
-            <a:ext cx="704790" cy="2042793"/>
-          </a:xfrm>
-          <a:prstGeom prst="straightConnector1">
-            <a:avLst/>
-          </a:prstGeom>
-          <a:noFill/>
-          <a:ln w="19050" cap="flat">
-            <a:solidFill>
-              <a:schemeClr val="dk2"/>
-            </a:solidFill>
-            <a:prstDash val="solid"/>
-            <a:round/>
-            <a:headEnd type="triangle" w="lg" len="lg"/>
-            <a:tailEnd type="triangle" w="lg" len="lg"/>
-          </a:ln>
-        </p:spPr>
-      </p:cxnSp>
-      <p:sp>
-        <p:nvSpPr>
-          <p:cNvPr id="91" name="Shape 91"/>
-          <p:cNvSpPr txBox="1"/>
-          <p:nvPr/>
-        </p:nvSpPr>
-        <p:spPr>
-          <a:xfrm>
-            <a:off x="1184175" y="331726"/>
-            <a:ext cx="1656899" cy="293400"/>
-          </a:xfrm>
-          <a:prstGeom prst="rect">
-            <a:avLst/>
-          </a:prstGeom>
-          <a:noFill/>
-        </p:spPr>
-        <p:txBody>
-          <a:bodyPr lIns="91425" tIns="91425" rIns="91425" bIns="91425" anchor="t" anchorCtr="0">
-            <a:spAutoFit/>
-          </a:bodyPr>
-          <a:lstStyle/>
-          <a:p>
-            <a:pPr>
-              <a:buNone/>
-            </a:pPr>
-            <a:r>
-              <a:rPr lang="en"/>
-              <a:t>Session Instance</a:t>
-            </a:r>
-          </a:p>
-        </p:txBody>
-      </p:sp>
-      <p:sp>
-        <p:nvSpPr>
-          <p:cNvPr id="92" name="Shape 92"/>
-          <p:cNvSpPr/>
-          <p:nvPr/>
-        </p:nvSpPr>
-        <p:spPr>
-          <a:xfrm>
-            <a:off x="1561025" y="6148550"/>
-            <a:ext cx="2201099" cy="518400"/>
-          </a:xfrm>
-          <a:prstGeom prst="can">
-            <a:avLst>
-              <a:gd name="adj" fmla="val 25000"/>
-            </a:avLst>
-          </a:prstGeom>
-          <a:solidFill>
-            <a:schemeClr val="lt2"/>
-          </a:solidFill>
-          <a:ln w="19050" cap="flat">
-            <a:solidFill>
-              <a:schemeClr val="dk2"/>
-            </a:solidFill>
-            <a:prstDash val="solid"/>
-            <a:round/>
-            <a:headEnd type="none" w="med" len="med"/>
-            <a:tailEnd type="none" w="med" len="med"/>
-          </a:ln>
-        </p:spPr>
-        <p:txBody>
-          <a:bodyPr lIns="91425" tIns="91425" rIns="91425" bIns="91425" anchor="ctr" anchorCtr="0">
-            <a:spAutoFit/>
-          </a:bodyPr>
-          <a:lstStyle/>
-          <a:p>
-            <a:endParaRPr/>
-          </a:p>
-        </p:txBody>
-      </p:sp>
-      <p:sp>
-        <p:nvSpPr>
-          <p:cNvPr id="93" name="Shape 93"/>
-          <p:cNvSpPr/>
-          <p:nvPr/>
-        </p:nvSpPr>
-        <p:spPr>
-          <a:xfrm>
-            <a:off x="1561025" y="5791600"/>
-            <a:ext cx="2201099" cy="518400"/>
-          </a:xfrm>
-          <a:prstGeom prst="can">
-            <a:avLst>
-              <a:gd name="adj" fmla="val 44295"/>
-            </a:avLst>
-          </a:prstGeom>
-          <a:solidFill>
-            <a:srgbClr val="5243BB"/>
-          </a:solidFill>
-          <a:ln w="19050" cap="flat">
-            <a:solidFill>
-              <a:schemeClr val="dk2"/>
-            </a:solidFill>
-            <a:prstDash val="solid"/>
-            <a:round/>
-            <a:headEnd type="none" w="med" len="med"/>
-            <a:tailEnd type="none" w="med" len="med"/>
-          </a:ln>
-        </p:spPr>
-        <p:txBody>
-          <a:bodyPr lIns="91425" tIns="91425" rIns="91425" bIns="91425" anchor="ctr" anchorCtr="0">
-            <a:spAutoFit/>
-          </a:bodyPr>
-          <a:lstStyle/>
-          <a:p>
-            <a:endParaRPr/>
-          </a:p>
-        </p:txBody>
-      </p:sp>
-      <p:sp>
-        <p:nvSpPr>
-          <p:cNvPr id="94" name="Shape 94"/>
-          <p:cNvSpPr/>
-          <p:nvPr/>
-        </p:nvSpPr>
-        <p:spPr>
-          <a:xfrm>
-            <a:off x="1561025" y="5507400"/>
-            <a:ext cx="2201099" cy="518400"/>
-          </a:xfrm>
-          <a:prstGeom prst="can">
-            <a:avLst>
-              <a:gd name="adj" fmla="val 41213"/>
-            </a:avLst>
-          </a:prstGeom>
-          <a:solidFill>
-            <a:schemeClr val="lt2"/>
-          </a:solidFill>
-          <a:ln w="19050" cap="flat">
-            <a:solidFill>
-              <a:schemeClr val="dk2"/>
-            </a:solidFill>
-            <a:prstDash val="solid"/>
-            <a:round/>
-            <a:headEnd type="none" w="med" len="med"/>
-            <a:tailEnd type="none" w="med" len="med"/>
-          </a:ln>
-        </p:spPr>
-        <p:txBody>
-          <a:bodyPr lIns="91425" tIns="91425" rIns="91425" bIns="91425" anchor="ctr" anchorCtr="0">
-            <a:spAutoFit/>
-          </a:bodyPr>
-          <a:lstStyle/>
-          <a:p>
-            <a:endParaRPr/>
-          </a:p>
-        </p:txBody>
-      </p:sp>
-      <p:cxnSp>
-        <p:nvCxnSpPr>
-          <p:cNvPr id="95" name="Shape 95"/>
-          <p:cNvCxnSpPr>
-            <a:stCxn id="87" idx="1"/>
-            <a:endCxn id="87" idx="1"/>
-          </p:cNvCxnSpPr>
-          <p:nvPr/>
-        </p:nvCxnSpPr>
-        <p:spPr>
-          <a:xfrm>
-            <a:off x="1623225" y="3595373"/>
-            <a:ext cx="0" cy="0"/>
-          </a:xfrm>
-          <a:prstGeom prst="straightConnector1">
-            <a:avLst/>
-          </a:prstGeom>
-          <a:noFill/>
-          <a:ln w="19050" cap="flat">
-            <a:solidFill>
-              <a:schemeClr val="dk2"/>
-            </a:solidFill>
-            <a:prstDash val="solid"/>
-            <a:round/>
-            <a:headEnd type="none" w="lg" len="lg"/>
-            <a:tailEnd type="none" w="lg" len="lg"/>
-          </a:ln>
-        </p:spPr>
-      </p:cxnSp>
-      <p:cxnSp>
-        <p:nvCxnSpPr>
-          <p:cNvPr id="96" name="Shape 96"/>
-          <p:cNvCxnSpPr>
-            <a:stCxn id="87" idx="1"/>
-            <a:endCxn id="83" idx="3"/>
-          </p:cNvCxnSpPr>
-          <p:nvPr/>
-        </p:nvCxnSpPr>
-        <p:spPr>
-          <a:xfrm rot="10800000">
-            <a:off x="1179674" y="3595373"/>
-            <a:ext cx="443550" cy="0"/>
-          </a:xfrm>
-          <a:prstGeom prst="straightConnector1">
-            <a:avLst/>
-          </a:prstGeom>
-          <a:noFill/>
-          <a:ln w="19050" cap="flat">
-            <a:solidFill>
-              <a:schemeClr val="dk2"/>
-            </a:solidFill>
-            <a:prstDash val="solid"/>
-            <a:round/>
-            <a:headEnd type="triangle" w="lg" len="lg"/>
-            <a:tailEnd type="triangle" w="lg" len="lg"/>
-          </a:ln>
-        </p:spPr>
-      </p:cxnSp>
-      <p:cxnSp>
-        <p:nvCxnSpPr>
-          <p:cNvPr id="97" name="Shape 97"/>
-          <p:cNvCxnSpPr>
-            <a:stCxn id="85" idx="1"/>
-            <a:endCxn id="88" idx="3"/>
-          </p:cNvCxnSpPr>
-          <p:nvPr/>
-        </p:nvCxnSpPr>
-        <p:spPr>
-          <a:xfrm flipH="1">
-            <a:off x="4181175" y="3595373"/>
-            <a:ext cx="436680" cy="0"/>
-          </a:xfrm>
-          <a:prstGeom prst="straightConnector1">
-            <a:avLst/>
-          </a:prstGeom>
-          <a:noFill/>
-          <a:ln w="19050" cap="flat">
-            <a:solidFill>
-              <a:schemeClr val="dk2"/>
-            </a:solidFill>
-            <a:prstDash val="solid"/>
-            <a:round/>
-            <a:headEnd type="none" w="lg" len="lg"/>
-            <a:tailEnd type="none" w="lg" len="lg"/>
-          </a:ln>
-        </p:spPr>
-      </p:cxnSp>
-      <p:cxnSp>
-        <p:nvCxnSpPr>
-          <p:cNvPr id="98" name="Shape 98"/>
-          <p:cNvCxnSpPr/>
-          <p:nvPr/>
-        </p:nvCxnSpPr>
-        <p:spPr>
-          <a:xfrm rot="10800000">
-            <a:off x="4181174" y="3595373"/>
-            <a:ext cx="443700" cy="0"/>
-          </a:xfrm>
-          <a:prstGeom prst="straightConnector1">
-            <a:avLst/>
-          </a:prstGeom>
-          <a:noFill/>
-          <a:ln w="19050" cap="flat">
-            <a:solidFill>
-              <a:schemeClr val="dk2"/>
-            </a:solidFill>
-            <a:prstDash val="solid"/>
-            <a:round/>
-            <a:headEnd type="triangle" w="lg" len="lg"/>
-            <a:tailEnd type="triangle" w="lg" len="lg"/>
-          </a:ln>
-        </p:spPr>
-      </p:cxnSp>
-      <p:cxnSp>
-        <p:nvCxnSpPr>
-          <p:cNvPr id="99" name="Shape 99"/>
-          <p:cNvCxnSpPr>
-            <a:stCxn id="83" idx="2"/>
-            <a:endCxn id="100" idx="1"/>
-          </p:cNvCxnSpPr>
-          <p:nvPr/>
-        </p:nvCxnSpPr>
-        <p:spPr>
-          <a:xfrm>
-            <a:off x="763274" y="3877073"/>
-            <a:ext cx="1025150" cy="966299"/>
-          </a:xfrm>
-          <a:prstGeom prst="straightConnector1">
-            <a:avLst/>
-          </a:prstGeom>
-          <a:noFill/>
-          <a:ln w="19050" cap="flat">
-            <a:solidFill>
-              <a:schemeClr val="dk2"/>
-            </a:solidFill>
-            <a:prstDash val="solid"/>
-            <a:round/>
-            <a:headEnd type="triangle" w="lg" len="lg"/>
-            <a:tailEnd type="triangle" w="lg" len="lg"/>
-          </a:ln>
-        </p:spPr>
-      </p:cxnSp>
-      <p:cxnSp>
-        <p:nvCxnSpPr>
-          <p:cNvPr id="101" name="Shape 101"/>
-          <p:cNvCxnSpPr>
-            <a:stCxn id="87" idx="2"/>
-          </p:cNvCxnSpPr>
-          <p:nvPr/>
-        </p:nvCxnSpPr>
-        <p:spPr>
-          <a:xfrm>
-            <a:off x="2211375" y="3877073"/>
-            <a:ext cx="162600" cy="798000"/>
-          </a:xfrm>
-          <a:prstGeom prst="straightConnector1">
-            <a:avLst/>
-          </a:prstGeom>
-          <a:noFill/>
-          <a:ln w="19050" cap="flat">
-            <a:solidFill>
-              <a:schemeClr val="dk2"/>
-            </a:solidFill>
-            <a:prstDash val="solid"/>
-            <a:round/>
-            <a:headEnd type="triangle" w="lg" len="lg"/>
-            <a:tailEnd type="triangle" w="lg" len="lg"/>
-          </a:ln>
-        </p:spPr>
-      </p:cxnSp>
-      <p:cxnSp>
-        <p:nvCxnSpPr>
-          <p:cNvPr id="102" name="Shape 102"/>
-          <p:cNvCxnSpPr>
-            <a:stCxn id="88" idx="2"/>
-          </p:cNvCxnSpPr>
-          <p:nvPr/>
-        </p:nvCxnSpPr>
-        <p:spPr>
-          <a:xfrm flipH="1">
-            <a:off x="3101475" y="3884873"/>
-            <a:ext cx="452999" cy="781199"/>
-          </a:xfrm>
-          <a:prstGeom prst="straightConnector1">
-            <a:avLst/>
-          </a:prstGeom>
-          <a:noFill/>
-          <a:ln w="19050" cap="flat">
-            <a:solidFill>
-              <a:schemeClr val="dk2"/>
-            </a:solidFill>
-            <a:prstDash val="solid"/>
-            <a:round/>
-            <a:headEnd type="triangle" w="lg" len="lg"/>
-            <a:tailEnd type="triangle" w="lg" len="lg"/>
-          </a:ln>
-        </p:spPr>
-      </p:cxnSp>
-      <p:cxnSp>
-        <p:nvCxnSpPr>
-          <p:cNvPr id="103" name="Shape 103"/>
-          <p:cNvCxnSpPr>
-            <a:stCxn id="85" idx="2"/>
-            <a:endCxn id="100" idx="3"/>
-          </p:cNvCxnSpPr>
-          <p:nvPr/>
-        </p:nvCxnSpPr>
-        <p:spPr>
-          <a:xfrm flipH="1">
-            <a:off x="3534724" y="3864773"/>
-            <a:ext cx="1756030" cy="978599"/>
-          </a:xfrm>
-          <a:prstGeom prst="straightConnector1">
-            <a:avLst/>
-          </a:prstGeom>
-          <a:noFill/>
-          <a:ln w="19050" cap="flat">
-            <a:solidFill>
-              <a:schemeClr val="dk2"/>
-            </a:solidFill>
-            <a:prstDash val="solid"/>
-            <a:round/>
-            <a:headEnd type="triangle" w="lg" len="lg"/>
-            <a:tailEnd type="triangle" w="lg" len="lg"/>
-          </a:ln>
-        </p:spPr>
-      </p:cxnSp>
-      <p:sp>
-        <p:nvSpPr>
-          <p:cNvPr id="104" name="Shape 104"/>
-          <p:cNvSpPr txBox="1"/>
-          <p:nvPr/>
-        </p:nvSpPr>
-        <p:spPr>
-          <a:xfrm>
-            <a:off x="2137925" y="5691350"/>
-            <a:ext cx="1047299" cy="457200"/>
-          </a:xfrm>
-          <a:prstGeom prst="rect">
-            <a:avLst/>
-          </a:prstGeom>
-          <a:noFill/>
-        </p:spPr>
-        <p:txBody>
-          <a:bodyPr lIns="91425" tIns="91425" rIns="91425" bIns="91425" anchor="t" anchorCtr="0">
-            <a:spAutoFit/>
-          </a:bodyPr>
-          <a:lstStyle/>
-          <a:p>
-            <a:pPr>
-              <a:buNone/>
-            </a:pPr>
-            <a:r>
-              <a:rPr lang="en"/>
-              <a:t>Database</a:t>
-            </a:r>
-          </a:p>
-        </p:txBody>
-      </p:sp>
-      <p:sp>
-        <p:nvSpPr>
-          <p:cNvPr id="100" name="Shape 100"/>
-          <p:cNvSpPr/>
-          <p:nvPr/>
-        </p:nvSpPr>
-        <p:spPr>
-          <a:xfrm>
-            <a:off x="1788425" y="4675073"/>
-            <a:ext cx="1746299" cy="336599"/>
-          </a:xfrm>
-          <a:prstGeom prst="roundRect">
-            <a:avLst>
-              <a:gd name="adj" fmla="val 16667"/>
-            </a:avLst>
-          </a:prstGeom>
-          <a:solidFill>
-            <a:schemeClr val="lt2"/>
-          </a:solidFill>
-          <a:ln w="19050" cap="flat">
-            <a:solidFill>
-              <a:schemeClr val="dk2"/>
-            </a:solidFill>
-            <a:prstDash val="solid"/>
-            <a:round/>
-            <a:headEnd type="none" w="med" len="med"/>
-            <a:tailEnd type="none" w="med" len="med"/>
-          </a:ln>
-        </p:spPr>
-        <p:txBody>
-          <a:bodyPr lIns="91425" tIns="91425" rIns="91425" bIns="91425" anchor="ctr" anchorCtr="0">
-            <a:spAutoFit/>
-          </a:bodyPr>
-          <a:lstStyle/>
-          <a:p>
-            <a:pPr algn="ctr">
-              <a:buNone/>
-            </a:pPr>
-            <a:r>
-              <a:rPr lang="en"/>
-              <a:t>ORM Manager</a:t>
-            </a:r>
-          </a:p>
-        </p:txBody>
-      </p:sp>
-      <p:cxnSp>
-        <p:nvCxnSpPr>
-          <p:cNvPr id="105" name="Shape 105"/>
-          <p:cNvCxnSpPr>
-            <a:stCxn id="94" idx="1"/>
-          </p:cNvCxnSpPr>
-          <p:nvPr/>
-        </p:nvCxnSpPr>
-        <p:spPr>
-          <a:xfrm rot="10800000" flipH="1">
-            <a:off x="2661574" y="5011500"/>
-            <a:ext cx="3299" cy="495899"/>
-          </a:xfrm>
-          <a:prstGeom prst="straightConnector1">
-            <a:avLst/>
-          </a:prstGeom>
-          <a:noFill/>
-          <a:ln w="19050" cap="flat">
-            <a:solidFill>
-              <a:schemeClr val="dk2"/>
-            </a:solidFill>
-            <a:prstDash val="solid"/>
-            <a:round/>
-            <a:headEnd type="stealth" w="lg" len="lg"/>
-            <a:tailEnd type="stealth" w="lg" len="lg"/>
-          </a:ln>
-        </p:spPr>
-      </p:cxnSp>
-      <p:sp>
-        <p:nvSpPr>
-          <p:cNvPr id="106" name="Shape 106"/>
-          <p:cNvSpPr/>
-          <p:nvPr/>
-        </p:nvSpPr>
-        <p:spPr>
-          <a:xfrm>
-            <a:off x="2253207" y="2826164"/>
-            <a:ext cx="3230099" cy="948000"/>
-          </a:xfrm>
-          <a:prstGeom prst="arc">
-            <a:avLst>
-              <a:gd name="adj1" fmla="val 10811025"/>
-              <a:gd name="adj2" fmla="val 67144"/>
-            </a:avLst>
-          </a:prstGeom>
-          <a:noFill/>
-          <a:ln w="19050" cap="flat">
-            <a:solidFill>
-              <a:schemeClr val="dk2"/>
-            </a:solidFill>
-            <a:prstDash val="solid"/>
-            <a:round/>
-            <a:headEnd type="triangle" w="med" len="med"/>
-            <a:tailEnd type="triangle" w="med" len="med"/>
-          </a:ln>
-        </p:spPr>
-        <p:txBody>
-          <a:bodyPr lIns="91425" tIns="91425" rIns="91425" bIns="91425" anchor="ctr" anchorCtr="0">
-            <a:spAutoFit/>
-          </a:bodyPr>
-          <a:lstStyle/>
-          <a:p>
-            <a:endParaRPr/>
-          </a:p>
-        </p:txBody>
-      </p:sp>
-      <p:sp>
-        <p:nvSpPr>
-          <p:cNvPr id="107" name="Shape 107"/>
-          <p:cNvSpPr/>
-          <p:nvPr/>
-        </p:nvSpPr>
-        <p:spPr>
-          <a:xfrm>
-            <a:off x="759975" y="2826164"/>
-            <a:ext cx="2902799" cy="820800"/>
-          </a:xfrm>
-          <a:prstGeom prst="arc">
-            <a:avLst>
-              <a:gd name="adj1" fmla="val 10593542"/>
-              <a:gd name="adj2" fmla="val 196686"/>
-            </a:avLst>
-          </a:prstGeom>
-          <a:noFill/>
-          <a:ln w="19050" cap="flat">
-            <a:solidFill>
-              <a:schemeClr val="dk2"/>
-            </a:solidFill>
-            <a:prstDash val="solid"/>
-            <a:round/>
-            <a:headEnd type="triangle" w="med" len="med"/>
-            <a:tailEnd type="triangle" w="med" len="med"/>
-          </a:ln>
-        </p:spPr>
-        <p:txBody>
-          <a:bodyPr lIns="91425" tIns="91425" rIns="91425" bIns="91425" anchor="ctr" anchorCtr="0">
-            <a:spAutoFit/>
-          </a:bodyPr>
-          <a:lstStyle/>
-          <a:p>
-            <a:endParaRPr/>
-          </a:p>
-        </p:txBody>
-      </p:sp>
-      <p:sp>
-        <p:nvSpPr>
-          <p:cNvPr id="109" name="Shape 109"/>
-          <p:cNvSpPr/>
-          <p:nvPr/>
-        </p:nvSpPr>
-        <p:spPr>
-          <a:xfrm>
-            <a:off x="6756065" y="5691350"/>
-            <a:ext cx="1642199" cy="917700"/>
-          </a:xfrm>
-          <a:prstGeom prst="rect">
-            <a:avLst/>
-          </a:prstGeom>
-          <a:solidFill>
-            <a:schemeClr val="lt2"/>
-          </a:solidFill>
-          <a:ln w="19050" cap="flat">
-            <a:solidFill>
-              <a:schemeClr val="dk2"/>
-            </a:solidFill>
-            <a:prstDash val="solid"/>
-            <a:round/>
-            <a:headEnd type="none" w="med" len="med"/>
-            <a:tailEnd type="none" w="med" len="med"/>
-          </a:ln>
-        </p:spPr>
-        <p:txBody>
-          <a:bodyPr lIns="91425" tIns="91425" rIns="91425" bIns="91425" anchor="ctr" anchorCtr="0">
-            <a:spAutoFit/>
-          </a:bodyPr>
-          <a:lstStyle/>
-          <a:p>
-            <a:pPr algn="ctr">
-              <a:buNone/>
-            </a:pPr>
-            <a:r>
-              <a:rPr lang="en"/>
-              <a:t>Client Web Browser</a:t>
-            </a:r>
-          </a:p>
-        </p:txBody>
-      </p:sp>
-      <p:sp>
-        <p:nvSpPr>
-          <p:cNvPr id="110" name="Shape 110"/>
-          <p:cNvSpPr/>
-          <p:nvPr/>
-        </p:nvSpPr>
-        <p:spPr>
-          <a:xfrm>
-            <a:off x="7666950" y="4576025"/>
-            <a:ext cx="1448699" cy="567599"/>
-          </a:xfrm>
-          <a:prstGeom prst="rect">
-            <a:avLst/>
-          </a:prstGeom>
-          <a:solidFill>
-            <a:schemeClr val="lt2"/>
-          </a:solidFill>
-          <a:ln w="19050" cap="flat">
-            <a:solidFill>
-              <a:schemeClr val="dk2"/>
-            </a:solidFill>
-            <a:prstDash val="solid"/>
-            <a:round/>
-            <a:headEnd type="none" w="med" len="med"/>
-            <a:tailEnd type="none" w="med" len="med"/>
-          </a:ln>
-        </p:spPr>
-        <p:txBody>
-          <a:bodyPr lIns="91425" tIns="91425" rIns="91425" bIns="91425" anchor="ctr" anchorCtr="0">
-            <a:spAutoFit/>
-          </a:bodyPr>
-          <a:lstStyle/>
-          <a:p>
-            <a:pPr algn="ctr">
-              <a:buNone/>
-            </a:pPr>
-            <a:r>
-              <a:rPr lang="en"/>
-              <a:t>HTTP Request</a:t>
-            </a:r>
-          </a:p>
-        </p:txBody>
-      </p:sp>
-      <p:sp>
-        <p:nvSpPr>
-          <p:cNvPr id="111" name="Shape 111"/>
-          <p:cNvSpPr/>
-          <p:nvPr/>
-        </p:nvSpPr>
-        <p:spPr>
-          <a:xfrm>
-            <a:off x="5783425" y="4576026"/>
-            <a:ext cx="1557600" cy="567299"/>
-          </a:xfrm>
-          <a:prstGeom prst="rect">
-            <a:avLst/>
-          </a:prstGeom>
-          <a:solidFill>
-            <a:schemeClr val="lt2"/>
-          </a:solidFill>
-          <a:ln w="19050" cap="flat">
-            <a:solidFill>
-              <a:schemeClr val="dk2"/>
-            </a:solidFill>
-            <a:prstDash val="solid"/>
-            <a:round/>
-            <a:headEnd type="none" w="med" len="med"/>
-            <a:tailEnd type="none" w="med" len="med"/>
-          </a:ln>
-        </p:spPr>
-        <p:txBody>
-          <a:bodyPr lIns="91425" tIns="91425" rIns="91425" bIns="91425" anchor="ctr" anchorCtr="0">
-            <a:spAutoFit/>
-          </a:bodyPr>
-          <a:lstStyle/>
-          <a:p>
-            <a:pPr algn="ctr">
-              <a:buNone/>
-            </a:pPr>
-            <a:r>
-              <a:rPr lang="en"/>
-              <a:t>Response (view)</a:t>
-            </a:r>
-          </a:p>
-        </p:txBody>
-      </p:sp>
-      <p:cxnSp>
-        <p:nvCxnSpPr>
-          <p:cNvPr id="112" name="Shape 112"/>
-          <p:cNvCxnSpPr>
-            <a:stCxn id="110" idx="0"/>
-            <a:endCxn id="89" idx="2"/>
-          </p:cNvCxnSpPr>
-          <p:nvPr/>
-        </p:nvCxnSpPr>
-        <p:spPr>
-          <a:xfrm rot="10800000">
-            <a:off x="7577165" y="4003223"/>
-            <a:ext cx="814134" cy="572801"/>
-          </a:xfrm>
-          <a:prstGeom prst="straightConnector1">
-            <a:avLst/>
-          </a:prstGeom>
-          <a:noFill/>
-          <a:ln w="19050" cap="flat">
-            <a:solidFill>
-              <a:schemeClr val="dk2"/>
-            </a:solidFill>
-            <a:prstDash val="solid"/>
-            <a:round/>
-            <a:headEnd type="none" w="lg" len="lg"/>
-            <a:tailEnd type="triangle" w="lg" len="lg"/>
-          </a:ln>
-        </p:spPr>
-      </p:cxnSp>
-      <p:cxnSp>
-        <p:nvCxnSpPr>
-          <p:cNvPr id="113" name="Shape 113"/>
-          <p:cNvCxnSpPr>
-            <a:stCxn id="109" idx="0"/>
-            <a:endCxn id="110" idx="2"/>
-          </p:cNvCxnSpPr>
-          <p:nvPr/>
-        </p:nvCxnSpPr>
-        <p:spPr>
-          <a:xfrm rot="10800000" flipH="1">
-            <a:off x="7577165" y="5143624"/>
-            <a:ext cx="814134" cy="547725"/>
-          </a:xfrm>
-          <a:prstGeom prst="straightConnector1">
-            <a:avLst/>
-          </a:prstGeom>
-          <a:noFill/>
-          <a:ln w="19050" cap="flat">
-            <a:solidFill>
-              <a:schemeClr val="dk2"/>
-            </a:solidFill>
-            <a:prstDash val="solid"/>
-            <a:round/>
-            <a:headEnd type="none" w="lg" len="lg"/>
-            <a:tailEnd type="triangle" w="lg" len="lg"/>
-          </a:ln>
-        </p:spPr>
-      </p:cxnSp>
-      <p:cxnSp>
-        <p:nvCxnSpPr>
-          <p:cNvPr id="114" name="Shape 114"/>
-          <p:cNvCxnSpPr>
-            <a:stCxn id="89" idx="2"/>
-            <a:endCxn id="111" idx="0"/>
-          </p:cNvCxnSpPr>
-          <p:nvPr/>
-        </p:nvCxnSpPr>
-        <p:spPr>
-          <a:xfrm flipH="1">
-            <a:off x="6562225" y="4003223"/>
-            <a:ext cx="1014940" cy="572803"/>
-          </a:xfrm>
-          <a:prstGeom prst="straightConnector1">
-            <a:avLst/>
-          </a:prstGeom>
-          <a:noFill/>
-          <a:ln w="19050" cap="flat">
-            <a:solidFill>
-              <a:schemeClr val="dk2"/>
-            </a:solidFill>
-            <a:prstDash val="solid"/>
-            <a:round/>
-            <a:headEnd type="none" w="lg" len="lg"/>
-            <a:tailEnd type="triangle" w="lg" len="lg"/>
-          </a:ln>
-        </p:spPr>
-      </p:cxnSp>
-      <p:cxnSp>
-        <p:nvCxnSpPr>
-          <p:cNvPr id="115" name="Shape 115"/>
-          <p:cNvCxnSpPr>
-            <a:stCxn id="111" idx="2"/>
-            <a:endCxn id="109" idx="0"/>
-          </p:cNvCxnSpPr>
-          <p:nvPr/>
-        </p:nvCxnSpPr>
-        <p:spPr>
-          <a:xfrm>
-            <a:off x="6562225" y="5143326"/>
-            <a:ext cx="1014940" cy="548023"/>
-          </a:xfrm>
-          <a:prstGeom prst="straightConnector1">
-            <a:avLst/>
-          </a:prstGeom>
-          <a:noFill/>
-          <a:ln w="19050" cap="flat">
-            <a:solidFill>
-              <a:schemeClr val="dk2"/>
-            </a:solidFill>
-            <a:prstDash val="solid"/>
-            <a:round/>
-            <a:headEnd type="none" w="lg" len="lg"/>
-            <a:tailEnd type="triangle" w="lg" len="lg"/>
-          </a:ln>
-        </p:spPr>
-      </p:cxnSp>
       <p:sp>
         <p:nvSpPr>
           <p:cNvPr id="44" name="TextBox 43"/>
@@ -7734,26 +5534,1042 @@
                   <a:schemeClr val="bg1"/>
                 </a:solidFill>
               </a:rPr>
-              <a:t>Design TOO</a:t>
+              <a:t>Design </a:t>
             </a:r>
+            <a:r>
+              <a:rPr lang="en-US" sz="3200" b="1" dirty="0" smtClean="0">
+                <a:solidFill>
+                  <a:schemeClr val="bg1"/>
+                </a:solidFill>
+              </a:rPr>
+              <a:t>TWO</a:t>
+            </a:r>
+            <a:endParaRPr lang="en-US" sz="3200" b="1" dirty="0" smtClean="0">
+              <a:solidFill>
+                <a:schemeClr val="bg1"/>
+              </a:solidFill>
+            </a:endParaRPr>
           </a:p>
           <a:p>
             <a:endParaRPr lang="en-US" dirty="0"/>
           </a:p>
         </p:txBody>
       </p:sp>
+      <p:sp>
+        <p:nvSpPr>
+          <p:cNvPr id="45" name="Shape 29"/>
+          <p:cNvSpPr/>
+          <p:nvPr/>
+        </p:nvSpPr>
+        <p:spPr>
+          <a:xfrm>
+            <a:off x="3505200" y="5153638"/>
+            <a:ext cx="1345799" cy="400079"/>
+          </a:xfrm>
+          <a:prstGeom prst="rect">
+            <a:avLst/>
+          </a:prstGeom>
+          <a:solidFill>
+            <a:schemeClr val="lt2"/>
+          </a:solidFill>
+          <a:ln w="19050" cap="flat">
+            <a:solidFill>
+              <a:schemeClr val="dk2"/>
+            </a:solidFill>
+            <a:prstDash val="solid"/>
+            <a:round/>
+            <a:headEnd type="none" w="med" len="med"/>
+            <a:tailEnd type="none" w="med" len="med"/>
+          </a:ln>
+        </p:spPr>
+        <p:txBody>
+          <a:bodyPr lIns="91425" tIns="91425" rIns="91425" bIns="91425" anchor="ctr" anchorCtr="0">
+            <a:spAutoFit/>
+          </a:bodyPr>
+          <a:lstStyle/>
+          <a:p>
+            <a:pPr lvl="0" algn="ctr" rtl="0">
+              <a:buNone/>
+            </a:pPr>
+            <a:r>
+              <a:rPr lang="en-US" dirty="0" smtClean="0"/>
+              <a:t>Contacts</a:t>
+            </a:r>
+            <a:endParaRPr lang="en" dirty="0"/>
+          </a:p>
+        </p:txBody>
+      </p:sp>
+      <p:sp>
+        <p:nvSpPr>
+          <p:cNvPr id="46" name="Shape 30"/>
+          <p:cNvSpPr/>
+          <p:nvPr/>
+        </p:nvSpPr>
+        <p:spPr>
+          <a:xfrm>
+            <a:off x="527554" y="5153638"/>
+            <a:ext cx="1176300" cy="400079"/>
+          </a:xfrm>
+          <a:prstGeom prst="rect">
+            <a:avLst/>
+          </a:prstGeom>
+          <a:solidFill>
+            <a:schemeClr val="lt2"/>
+          </a:solidFill>
+          <a:ln w="19050" cap="flat">
+            <a:solidFill>
+              <a:schemeClr val="dk2"/>
+            </a:solidFill>
+            <a:prstDash val="solid"/>
+            <a:round/>
+            <a:headEnd type="none" w="med" len="med"/>
+            <a:tailEnd type="none" w="med" len="med"/>
+          </a:ln>
+        </p:spPr>
+        <p:txBody>
+          <a:bodyPr lIns="91425" tIns="91425" rIns="91425" bIns="91425" anchor="ctr" anchorCtr="0">
+            <a:spAutoFit/>
+          </a:bodyPr>
+          <a:lstStyle/>
+          <a:p>
+            <a:pPr lvl="0" algn="ctr" rtl="0">
+              <a:buNone/>
+            </a:pPr>
+            <a:r>
+              <a:rPr lang="en-US" dirty="0" smtClean="0"/>
+              <a:t>Users</a:t>
+            </a:r>
+            <a:endParaRPr lang="en" dirty="0"/>
+          </a:p>
+        </p:txBody>
+      </p:sp>
+      <p:sp>
+        <p:nvSpPr>
+          <p:cNvPr id="47" name="Shape 31"/>
+          <p:cNvSpPr/>
+          <p:nvPr/>
+        </p:nvSpPr>
+        <p:spPr>
+          <a:xfrm>
+            <a:off x="1981200" y="5153638"/>
+            <a:ext cx="1253400" cy="400079"/>
+          </a:xfrm>
+          <a:prstGeom prst="rect">
+            <a:avLst/>
+          </a:prstGeom>
+          <a:solidFill>
+            <a:schemeClr val="lt2"/>
+          </a:solidFill>
+          <a:ln w="19050" cap="flat">
+            <a:solidFill>
+              <a:schemeClr val="dk2"/>
+            </a:solidFill>
+            <a:prstDash val="solid"/>
+            <a:round/>
+            <a:headEnd type="none" w="med" len="med"/>
+            <a:tailEnd type="none" w="med" len="med"/>
+          </a:ln>
+        </p:spPr>
+        <p:txBody>
+          <a:bodyPr lIns="91425" tIns="91425" rIns="91425" bIns="91425" anchor="ctr" anchorCtr="0">
+            <a:spAutoFit/>
+          </a:bodyPr>
+          <a:lstStyle/>
+          <a:p>
+            <a:pPr lvl="0" algn="ctr" rtl="0">
+              <a:buNone/>
+            </a:pPr>
+            <a:r>
+              <a:rPr lang="en-US" dirty="0" err="1" smtClean="0"/>
+              <a:t>WorkOrders</a:t>
+            </a:r>
+            <a:endParaRPr lang="en" dirty="0"/>
+          </a:p>
+        </p:txBody>
+      </p:sp>
+      <p:cxnSp>
+        <p:nvCxnSpPr>
+          <p:cNvPr id="48" name="Shape 35"/>
+          <p:cNvCxnSpPr>
+            <a:stCxn id="46" idx="1"/>
+            <a:endCxn id="46" idx="1"/>
+          </p:cNvCxnSpPr>
+          <p:nvPr/>
+        </p:nvCxnSpPr>
+        <p:spPr>
+          <a:xfrm>
+            <a:off x="527554" y="5353678"/>
+            <a:ext cx="0" cy="0"/>
+          </a:xfrm>
+          <a:prstGeom prst="straightConnector1">
+            <a:avLst/>
+          </a:prstGeom>
+          <a:noFill/>
+          <a:ln w="19050" cap="flat">
+            <a:solidFill>
+              <a:schemeClr val="dk2"/>
+            </a:solidFill>
+            <a:prstDash val="solid"/>
+            <a:round/>
+            <a:headEnd type="none" w="lg" len="lg"/>
+            <a:tailEnd type="none" w="lg" len="lg"/>
+          </a:ln>
+        </p:spPr>
+      </p:cxnSp>
+      <p:sp>
+        <p:nvSpPr>
+          <p:cNvPr id="49" name="Shape 56"/>
+          <p:cNvSpPr/>
+          <p:nvPr/>
+        </p:nvSpPr>
+        <p:spPr>
+          <a:xfrm>
+            <a:off x="2608840" y="6300198"/>
+            <a:ext cx="1278299" cy="400079"/>
+          </a:xfrm>
+          <a:prstGeom prst="rect">
+            <a:avLst/>
+          </a:prstGeom>
+          <a:solidFill>
+            <a:schemeClr val="lt2"/>
+          </a:solidFill>
+          <a:ln w="19050" cap="flat">
+            <a:solidFill>
+              <a:schemeClr val="dk2"/>
+            </a:solidFill>
+            <a:prstDash val="solid"/>
+            <a:round/>
+            <a:headEnd type="none" w="med" len="med"/>
+            <a:tailEnd type="none" w="med" len="med"/>
+          </a:ln>
+        </p:spPr>
+        <p:txBody>
+          <a:bodyPr lIns="91425" tIns="91425" rIns="91425" bIns="91425" anchor="ctr" anchorCtr="0">
+            <a:spAutoFit/>
+          </a:bodyPr>
+          <a:lstStyle/>
+          <a:p>
+            <a:pPr>
+              <a:buNone/>
+            </a:pPr>
+            <a:r>
+              <a:rPr lang="en" dirty="0" smtClean="0"/>
+              <a:t>Client side UI</a:t>
+            </a:r>
+            <a:endParaRPr lang="en" dirty="0"/>
+          </a:p>
+        </p:txBody>
+      </p:sp>
+      <p:sp>
+        <p:nvSpPr>
+          <p:cNvPr id="53" name="Shape 56"/>
+          <p:cNvSpPr/>
+          <p:nvPr/>
+        </p:nvSpPr>
+        <p:spPr>
+          <a:xfrm>
+            <a:off x="5181600" y="5153638"/>
+            <a:ext cx="1278299" cy="400079"/>
+          </a:xfrm>
+          <a:prstGeom prst="rect">
+            <a:avLst/>
+          </a:prstGeom>
+          <a:solidFill>
+            <a:schemeClr val="lt2"/>
+          </a:solidFill>
+          <a:ln w="19050" cap="flat">
+            <a:solidFill>
+              <a:schemeClr val="dk2"/>
+            </a:solidFill>
+            <a:prstDash val="solid"/>
+            <a:round/>
+            <a:headEnd type="none" w="med" len="med"/>
+            <a:tailEnd type="none" w="med" len="med"/>
+          </a:ln>
+        </p:spPr>
+        <p:txBody>
+          <a:bodyPr lIns="91425" tIns="91425" rIns="91425" bIns="91425" anchor="ctr" anchorCtr="0">
+            <a:spAutoFit/>
+          </a:bodyPr>
+          <a:lstStyle/>
+          <a:p>
+            <a:pPr>
+              <a:buNone/>
+            </a:pPr>
+            <a:r>
+              <a:rPr lang="en-US" smtClean="0"/>
+              <a:t>Properties</a:t>
+            </a:r>
+            <a:endParaRPr lang="en" dirty="0"/>
+          </a:p>
+        </p:txBody>
+      </p:sp>
+      <p:sp>
+        <p:nvSpPr>
+          <p:cNvPr id="67" name="Shape 51"/>
+          <p:cNvSpPr/>
+          <p:nvPr/>
+        </p:nvSpPr>
+        <p:spPr>
+          <a:xfrm>
+            <a:off x="2286000" y="2509317"/>
+            <a:ext cx="2438400" cy="442641"/>
+          </a:xfrm>
+          <a:prstGeom prst="roundRect">
+            <a:avLst>
+              <a:gd name="adj" fmla="val 16667"/>
+            </a:avLst>
+          </a:prstGeom>
+          <a:solidFill>
+            <a:schemeClr val="lt2"/>
+          </a:solidFill>
+          <a:ln w="19050" cap="flat">
+            <a:solidFill>
+              <a:schemeClr val="dk2"/>
+            </a:solidFill>
+            <a:prstDash val="solid"/>
+            <a:round/>
+            <a:headEnd type="none" w="med" len="med"/>
+            <a:tailEnd type="none" w="med" len="med"/>
+          </a:ln>
+        </p:spPr>
+        <p:txBody>
+          <a:bodyPr wrap="square" lIns="91425" tIns="91425" rIns="91425" bIns="91425" anchor="ctr" anchorCtr="0">
+            <a:spAutoFit/>
+          </a:bodyPr>
+          <a:lstStyle/>
+          <a:p>
+            <a:pPr algn="ctr">
+              <a:buNone/>
+            </a:pPr>
+            <a:r>
+              <a:rPr lang="en" dirty="0" smtClean="0"/>
+              <a:t>Request/Response</a:t>
+            </a:r>
+          </a:p>
+        </p:txBody>
+      </p:sp>
+      <p:sp>
+        <p:nvSpPr>
+          <p:cNvPr id="68" name="Shape 32"/>
+          <p:cNvSpPr/>
+          <p:nvPr/>
+        </p:nvSpPr>
+        <p:spPr>
+          <a:xfrm>
+            <a:off x="6553200" y="1545394"/>
+            <a:ext cx="1837199" cy="393299"/>
+          </a:xfrm>
+          <a:prstGeom prst="can">
+            <a:avLst>
+              <a:gd name="adj" fmla="val 25000"/>
+            </a:avLst>
+          </a:prstGeom>
+          <a:solidFill>
+            <a:schemeClr val="lt2"/>
+          </a:solidFill>
+          <a:ln w="19050" cap="flat">
+            <a:solidFill>
+              <a:schemeClr val="dk2"/>
+            </a:solidFill>
+            <a:prstDash val="solid"/>
+            <a:round/>
+            <a:headEnd type="none" w="med" len="med"/>
+            <a:tailEnd type="none" w="med" len="med"/>
+          </a:ln>
+        </p:spPr>
+        <p:txBody>
+          <a:bodyPr lIns="91425" tIns="91425" rIns="91425" bIns="91425" anchor="ctr" anchorCtr="0">
+            <a:spAutoFit/>
+          </a:bodyPr>
+          <a:lstStyle/>
+          <a:p>
+            <a:endParaRPr/>
+          </a:p>
+        </p:txBody>
+      </p:sp>
+      <p:sp>
+        <p:nvSpPr>
+          <p:cNvPr id="69" name="Shape 33"/>
+          <p:cNvSpPr/>
+          <p:nvPr/>
+        </p:nvSpPr>
+        <p:spPr>
+          <a:xfrm>
+            <a:off x="6553201" y="1282815"/>
+            <a:ext cx="1837199" cy="393299"/>
+          </a:xfrm>
+          <a:prstGeom prst="can">
+            <a:avLst>
+              <a:gd name="adj" fmla="val 44295"/>
+            </a:avLst>
+          </a:prstGeom>
+          <a:solidFill>
+            <a:srgbClr val="5243BB"/>
+          </a:solidFill>
+          <a:ln w="19050" cap="flat">
+            <a:solidFill>
+              <a:schemeClr val="dk2"/>
+            </a:solidFill>
+            <a:prstDash val="solid"/>
+            <a:round/>
+            <a:headEnd type="none" w="med" len="med"/>
+            <a:tailEnd type="none" w="med" len="med"/>
+          </a:ln>
+        </p:spPr>
+        <p:txBody>
+          <a:bodyPr lIns="91425" tIns="91425" rIns="91425" bIns="91425" anchor="ctr" anchorCtr="0">
+            <a:spAutoFit/>
+          </a:bodyPr>
+          <a:lstStyle/>
+          <a:p>
+            <a:endParaRPr/>
+          </a:p>
+        </p:txBody>
+      </p:sp>
+      <p:sp>
+        <p:nvSpPr>
+          <p:cNvPr id="70" name="Shape 34"/>
+          <p:cNvSpPr/>
+          <p:nvPr/>
+        </p:nvSpPr>
+        <p:spPr>
+          <a:xfrm>
+            <a:off x="6553201" y="1067322"/>
+            <a:ext cx="1837199" cy="393299"/>
+          </a:xfrm>
+          <a:prstGeom prst="can">
+            <a:avLst>
+              <a:gd name="adj" fmla="val 41213"/>
+            </a:avLst>
+          </a:prstGeom>
+          <a:solidFill>
+            <a:schemeClr val="lt2"/>
+          </a:solidFill>
+          <a:ln w="19050" cap="flat">
+            <a:solidFill>
+              <a:schemeClr val="dk2"/>
+            </a:solidFill>
+            <a:prstDash val="solid"/>
+            <a:round/>
+            <a:headEnd type="none" w="med" len="med"/>
+            <a:tailEnd type="none" w="med" len="med"/>
+          </a:ln>
+        </p:spPr>
+        <p:txBody>
+          <a:bodyPr lIns="91425" tIns="91425" rIns="91425" bIns="91425" anchor="ctr" anchorCtr="0">
+            <a:spAutoFit/>
+          </a:bodyPr>
+          <a:lstStyle/>
+          <a:p>
+            <a:endParaRPr/>
+          </a:p>
+        </p:txBody>
+      </p:sp>
+      <p:sp>
+        <p:nvSpPr>
+          <p:cNvPr id="71" name="Shape 43"/>
+          <p:cNvSpPr txBox="1"/>
+          <p:nvPr/>
+        </p:nvSpPr>
+        <p:spPr>
+          <a:xfrm>
+            <a:off x="6980100" y="1152095"/>
+            <a:ext cx="983400" cy="346799"/>
+          </a:xfrm>
+          <a:prstGeom prst="rect">
+            <a:avLst/>
+          </a:prstGeom>
+          <a:noFill/>
+        </p:spPr>
+        <p:txBody>
+          <a:bodyPr lIns="91425" tIns="91425" rIns="91425" bIns="91425" anchor="t" anchorCtr="0">
+            <a:spAutoFit/>
+          </a:bodyPr>
+          <a:lstStyle/>
+          <a:p>
+            <a:pPr lvl="0" rtl="0">
+              <a:buNone/>
+            </a:pPr>
+            <a:r>
+              <a:rPr lang="en"/>
+              <a:t>Database</a:t>
+            </a:r>
+          </a:p>
+        </p:txBody>
+      </p:sp>
+      <p:cxnSp>
+        <p:nvCxnSpPr>
+          <p:cNvPr id="11" name="Straight Arrow Connector 10"/>
+          <p:cNvCxnSpPr>
+            <a:stCxn id="46" idx="0"/>
+          </p:cNvCxnSpPr>
+          <p:nvPr/>
+        </p:nvCxnSpPr>
+        <p:spPr>
+          <a:xfrm flipV="1">
+            <a:off x="1115704" y="4557441"/>
+            <a:ext cx="1368190" cy="596197"/>
+          </a:xfrm>
+          <a:prstGeom prst="straightConnector1">
+            <a:avLst/>
+          </a:prstGeom>
+          <a:ln>
+            <a:headEnd type="triangle"/>
+            <a:tailEnd type="triangle"/>
+          </a:ln>
+        </p:spPr>
+        <p:style>
+          <a:lnRef idx="1">
+            <a:schemeClr val="accent1"/>
+          </a:lnRef>
+          <a:fillRef idx="0">
+            <a:schemeClr val="accent1"/>
+          </a:fillRef>
+          <a:effectRef idx="0">
+            <a:schemeClr val="accent1"/>
+          </a:effectRef>
+          <a:fontRef idx="minor">
+            <a:schemeClr val="tx1"/>
+          </a:fontRef>
+        </p:style>
+      </p:cxnSp>
+      <p:cxnSp>
+        <p:nvCxnSpPr>
+          <p:cNvPr id="13" name="Straight Arrow Connector 12"/>
+          <p:cNvCxnSpPr>
+            <a:stCxn id="47" idx="0"/>
+          </p:cNvCxnSpPr>
+          <p:nvPr/>
+        </p:nvCxnSpPr>
+        <p:spPr>
+          <a:xfrm flipV="1">
+            <a:off x="2607900" y="4557441"/>
+            <a:ext cx="263211" cy="596197"/>
+          </a:xfrm>
+          <a:prstGeom prst="straightConnector1">
+            <a:avLst/>
+          </a:prstGeom>
+          <a:ln>
+            <a:headEnd type="triangle"/>
+            <a:tailEnd type="triangle"/>
+          </a:ln>
+        </p:spPr>
+        <p:style>
+          <a:lnRef idx="1">
+            <a:schemeClr val="accent1"/>
+          </a:lnRef>
+          <a:fillRef idx="0">
+            <a:schemeClr val="accent1"/>
+          </a:fillRef>
+          <a:effectRef idx="0">
+            <a:schemeClr val="accent1"/>
+          </a:effectRef>
+          <a:fontRef idx="minor">
+            <a:schemeClr val="tx1"/>
+          </a:fontRef>
+        </p:style>
+      </p:cxnSp>
+      <p:cxnSp>
+        <p:nvCxnSpPr>
+          <p:cNvPr id="15" name="Straight Arrow Connector 14"/>
+          <p:cNvCxnSpPr>
+            <a:stCxn id="45" idx="0"/>
+          </p:cNvCxnSpPr>
+          <p:nvPr/>
+        </p:nvCxnSpPr>
+        <p:spPr>
+          <a:xfrm flipH="1" flipV="1">
+            <a:off x="3956183" y="4557441"/>
+            <a:ext cx="221917" cy="596197"/>
+          </a:xfrm>
+          <a:prstGeom prst="straightConnector1">
+            <a:avLst/>
+          </a:prstGeom>
+          <a:ln>
+            <a:headEnd type="triangle"/>
+            <a:tailEnd type="triangle"/>
+          </a:ln>
+        </p:spPr>
+        <p:style>
+          <a:lnRef idx="1">
+            <a:schemeClr val="accent1"/>
+          </a:lnRef>
+          <a:fillRef idx="0">
+            <a:schemeClr val="accent1"/>
+          </a:fillRef>
+          <a:effectRef idx="0">
+            <a:schemeClr val="accent1"/>
+          </a:effectRef>
+          <a:fontRef idx="minor">
+            <a:schemeClr val="tx1"/>
+          </a:fontRef>
+        </p:style>
+      </p:cxnSp>
+      <p:cxnSp>
+        <p:nvCxnSpPr>
+          <p:cNvPr id="17" name="Straight Arrow Connector 16"/>
+          <p:cNvCxnSpPr/>
+          <p:nvPr/>
+        </p:nvCxnSpPr>
+        <p:spPr>
+          <a:xfrm flipH="1" flipV="1">
+            <a:off x="4629083" y="4557441"/>
+            <a:ext cx="1195089" cy="616831"/>
+          </a:xfrm>
+          <a:prstGeom prst="straightConnector1">
+            <a:avLst/>
+          </a:prstGeom>
+          <a:ln>
+            <a:headEnd type="triangle"/>
+            <a:tailEnd type="triangle"/>
+          </a:ln>
+        </p:spPr>
+        <p:style>
+          <a:lnRef idx="1">
+            <a:schemeClr val="accent1"/>
+          </a:lnRef>
+          <a:fillRef idx="0">
+            <a:schemeClr val="accent1"/>
+          </a:fillRef>
+          <a:effectRef idx="0">
+            <a:schemeClr val="accent1"/>
+          </a:effectRef>
+          <a:fontRef idx="minor">
+            <a:schemeClr val="tx1"/>
+          </a:fontRef>
+        </p:style>
+      </p:cxnSp>
+      <p:sp>
+        <p:nvSpPr>
+          <p:cNvPr id="117" name="Shape 51"/>
+          <p:cNvSpPr/>
+          <p:nvPr/>
+        </p:nvSpPr>
+        <p:spPr>
+          <a:xfrm>
+            <a:off x="2286000" y="4114800"/>
+            <a:ext cx="2438400" cy="442641"/>
+          </a:xfrm>
+          <a:prstGeom prst="roundRect">
+            <a:avLst>
+              <a:gd name="adj" fmla="val 16667"/>
+            </a:avLst>
+          </a:prstGeom>
+          <a:solidFill>
+            <a:schemeClr val="lt2"/>
+          </a:solidFill>
+          <a:ln w="19050" cap="flat">
+            <a:solidFill>
+              <a:schemeClr val="dk2"/>
+            </a:solidFill>
+            <a:prstDash val="solid"/>
+            <a:round/>
+            <a:headEnd type="none" w="med" len="med"/>
+            <a:tailEnd type="none" w="med" len="med"/>
+          </a:ln>
+        </p:spPr>
+        <p:txBody>
+          <a:bodyPr wrap="square" lIns="91425" tIns="91425" rIns="91425" bIns="91425" anchor="ctr" anchorCtr="0">
+            <a:spAutoFit/>
+          </a:bodyPr>
+          <a:lstStyle/>
+          <a:p>
+            <a:pPr algn="ctr">
+              <a:buNone/>
+            </a:pPr>
+            <a:r>
+              <a:rPr lang="en" dirty="0" smtClean="0"/>
+              <a:t>Event Listeners</a:t>
+            </a:r>
+          </a:p>
+        </p:txBody>
+      </p:sp>
+      <p:sp>
+        <p:nvSpPr>
+          <p:cNvPr id="118" name="Shape 51"/>
+          <p:cNvSpPr/>
+          <p:nvPr/>
+        </p:nvSpPr>
+        <p:spPr>
+          <a:xfrm>
+            <a:off x="2286000" y="3289380"/>
+            <a:ext cx="2438400" cy="442641"/>
+          </a:xfrm>
+          <a:prstGeom prst="roundRect">
+            <a:avLst>
+              <a:gd name="adj" fmla="val 16667"/>
+            </a:avLst>
+          </a:prstGeom>
+          <a:solidFill>
+            <a:schemeClr val="lt2"/>
+          </a:solidFill>
+          <a:ln w="19050" cap="flat">
+            <a:solidFill>
+              <a:schemeClr val="dk2"/>
+            </a:solidFill>
+            <a:prstDash val="solid"/>
+            <a:round/>
+            <a:headEnd type="none" w="med" len="med"/>
+            <a:tailEnd type="none" w="med" len="med"/>
+          </a:ln>
+        </p:spPr>
+        <p:txBody>
+          <a:bodyPr wrap="square" lIns="91425" tIns="91425" rIns="91425" bIns="91425" anchor="ctr" anchorCtr="0">
+            <a:spAutoFit/>
+          </a:bodyPr>
+          <a:lstStyle/>
+          <a:p>
+            <a:pPr algn="ctr">
+              <a:buNone/>
+            </a:pPr>
+            <a:r>
+              <a:rPr lang="en" dirty="0" smtClean="0"/>
+              <a:t>Event Handler</a:t>
+            </a:r>
+          </a:p>
+        </p:txBody>
+      </p:sp>
+      <p:cxnSp>
+        <p:nvCxnSpPr>
+          <p:cNvPr id="27" name="Straight Arrow Connector 26"/>
+          <p:cNvCxnSpPr>
+            <a:stCxn id="117" idx="0"/>
+            <a:endCxn id="118" idx="2"/>
+          </p:cNvCxnSpPr>
+          <p:nvPr/>
+        </p:nvCxnSpPr>
+        <p:spPr>
+          <a:xfrm flipV="1">
+            <a:off x="3505200" y="3732021"/>
+            <a:ext cx="0" cy="382779"/>
+          </a:xfrm>
+          <a:prstGeom prst="straightConnector1">
+            <a:avLst/>
+          </a:prstGeom>
+          <a:ln>
+            <a:headEnd type="triangle"/>
+            <a:tailEnd type="triangle"/>
+          </a:ln>
+        </p:spPr>
+        <p:style>
+          <a:lnRef idx="1">
+            <a:schemeClr val="accent1"/>
+          </a:lnRef>
+          <a:fillRef idx="0">
+            <a:schemeClr val="accent1"/>
+          </a:fillRef>
+          <a:effectRef idx="0">
+            <a:schemeClr val="accent1"/>
+          </a:effectRef>
+          <a:fontRef idx="minor">
+            <a:schemeClr val="tx1"/>
+          </a:fontRef>
+        </p:style>
+      </p:cxnSp>
+      <p:cxnSp>
+        <p:nvCxnSpPr>
+          <p:cNvPr id="29" name="Straight Arrow Connector 28"/>
+          <p:cNvCxnSpPr>
+            <a:stCxn id="67" idx="2"/>
+            <a:endCxn id="118" idx="0"/>
+          </p:cNvCxnSpPr>
+          <p:nvPr/>
+        </p:nvCxnSpPr>
+        <p:spPr>
+          <a:xfrm>
+            <a:off x="3505200" y="2951958"/>
+            <a:ext cx="0" cy="337422"/>
+          </a:xfrm>
+          <a:prstGeom prst="straightConnector1">
+            <a:avLst/>
+          </a:prstGeom>
+          <a:ln>
+            <a:tailEnd type="triangle"/>
+          </a:ln>
+        </p:spPr>
+        <p:style>
+          <a:lnRef idx="1">
+            <a:schemeClr val="accent1"/>
+          </a:lnRef>
+          <a:fillRef idx="0">
+            <a:schemeClr val="accent1"/>
+          </a:fillRef>
+          <a:effectRef idx="0">
+            <a:schemeClr val="accent1"/>
+          </a:effectRef>
+          <a:fontRef idx="minor">
+            <a:schemeClr val="tx1"/>
+          </a:fontRef>
+        </p:style>
+      </p:cxnSp>
+      <p:sp>
+        <p:nvSpPr>
+          <p:cNvPr id="119" name="Shape 51"/>
+          <p:cNvSpPr/>
+          <p:nvPr/>
+        </p:nvSpPr>
+        <p:spPr>
+          <a:xfrm>
+            <a:off x="2286000" y="1289700"/>
+            <a:ext cx="2438400" cy="442641"/>
+          </a:xfrm>
+          <a:prstGeom prst="roundRect">
+            <a:avLst>
+              <a:gd name="adj" fmla="val 16667"/>
+            </a:avLst>
+          </a:prstGeom>
+          <a:solidFill>
+            <a:schemeClr val="lt2"/>
+          </a:solidFill>
+          <a:ln w="19050" cap="flat">
+            <a:solidFill>
+              <a:schemeClr val="dk2"/>
+            </a:solidFill>
+            <a:prstDash val="solid"/>
+            <a:round/>
+            <a:headEnd type="none" w="med" len="med"/>
+            <a:tailEnd type="none" w="med" len="med"/>
+          </a:ln>
+        </p:spPr>
+        <p:txBody>
+          <a:bodyPr wrap="square" lIns="91425" tIns="91425" rIns="91425" bIns="91425" anchor="ctr" anchorCtr="0">
+            <a:spAutoFit/>
+          </a:bodyPr>
+          <a:lstStyle/>
+          <a:p>
+            <a:pPr algn="ctr">
+              <a:buNone/>
+            </a:pPr>
+            <a:r>
+              <a:rPr lang="en" dirty="0" smtClean="0"/>
+              <a:t>Web Services</a:t>
+            </a:r>
+          </a:p>
+        </p:txBody>
+      </p:sp>
+      <p:cxnSp>
+        <p:nvCxnSpPr>
+          <p:cNvPr id="31" name="Straight Arrow Connector 30"/>
+          <p:cNvCxnSpPr>
+            <a:endCxn id="69" idx="2"/>
+          </p:cNvCxnSpPr>
+          <p:nvPr/>
+        </p:nvCxnSpPr>
+        <p:spPr>
+          <a:xfrm flipV="1">
+            <a:off x="4724400" y="1479465"/>
+            <a:ext cx="1828801" cy="19429"/>
+          </a:xfrm>
+          <a:prstGeom prst="straightConnector1">
+            <a:avLst/>
+          </a:prstGeom>
+          <a:ln>
+            <a:headEnd type="triangle"/>
+            <a:tailEnd type="triangle"/>
+          </a:ln>
+        </p:spPr>
+        <p:style>
+          <a:lnRef idx="1">
+            <a:schemeClr val="accent1"/>
+          </a:lnRef>
+          <a:fillRef idx="0">
+            <a:schemeClr val="accent1"/>
+          </a:fillRef>
+          <a:effectRef idx="0">
+            <a:schemeClr val="accent1"/>
+          </a:effectRef>
+          <a:fontRef idx="minor">
+            <a:schemeClr val="tx1"/>
+          </a:fontRef>
+        </p:style>
+      </p:cxnSp>
+      <p:cxnSp>
+        <p:nvCxnSpPr>
+          <p:cNvPr id="33" name="Straight Arrow Connector 32"/>
+          <p:cNvCxnSpPr>
+            <a:stCxn id="67" idx="0"/>
+            <a:endCxn id="119" idx="2"/>
+          </p:cNvCxnSpPr>
+          <p:nvPr/>
+        </p:nvCxnSpPr>
+        <p:spPr>
+          <a:xfrm flipV="1">
+            <a:off x="3505200" y="1732341"/>
+            <a:ext cx="0" cy="776976"/>
+          </a:xfrm>
+          <a:prstGeom prst="straightConnector1">
+            <a:avLst/>
+          </a:prstGeom>
+          <a:ln>
+            <a:tailEnd type="triangle"/>
+          </a:ln>
+        </p:spPr>
+        <p:style>
+          <a:lnRef idx="1">
+            <a:schemeClr val="accent1"/>
+          </a:lnRef>
+          <a:fillRef idx="0">
+            <a:schemeClr val="accent1"/>
+          </a:fillRef>
+          <a:effectRef idx="0">
+            <a:schemeClr val="accent1"/>
+          </a:effectRef>
+          <a:fontRef idx="minor">
+            <a:schemeClr val="tx1"/>
+          </a:fontRef>
+        </p:style>
+      </p:cxnSp>
+      <p:cxnSp>
+        <p:nvCxnSpPr>
+          <p:cNvPr id="35" name="Straight Arrow Connector 34"/>
+          <p:cNvCxnSpPr/>
+          <p:nvPr/>
+        </p:nvCxnSpPr>
+        <p:spPr>
+          <a:xfrm flipH="1" flipV="1">
+            <a:off x="1254218" y="5553717"/>
+            <a:ext cx="1353682" cy="746481"/>
+          </a:xfrm>
+          <a:prstGeom prst="straightConnector1">
+            <a:avLst/>
+          </a:prstGeom>
+          <a:ln>
+            <a:headEnd type="triangle"/>
+            <a:tailEnd type="triangle"/>
+          </a:ln>
+        </p:spPr>
+        <p:style>
+          <a:lnRef idx="1">
+            <a:schemeClr val="accent1"/>
+          </a:lnRef>
+          <a:fillRef idx="0">
+            <a:schemeClr val="accent1"/>
+          </a:fillRef>
+          <a:effectRef idx="0">
+            <a:schemeClr val="accent1"/>
+          </a:effectRef>
+          <a:fontRef idx="minor">
+            <a:schemeClr val="tx1"/>
+          </a:fontRef>
+        </p:style>
+      </p:cxnSp>
+      <p:cxnSp>
+        <p:nvCxnSpPr>
+          <p:cNvPr id="37" name="Straight Arrow Connector 36"/>
+          <p:cNvCxnSpPr/>
+          <p:nvPr/>
+        </p:nvCxnSpPr>
+        <p:spPr>
+          <a:xfrm flipH="1" flipV="1">
+            <a:off x="2743200" y="5553717"/>
+            <a:ext cx="228600" cy="746481"/>
+          </a:xfrm>
+          <a:prstGeom prst="straightConnector1">
+            <a:avLst/>
+          </a:prstGeom>
+          <a:ln>
+            <a:headEnd type="triangle"/>
+            <a:tailEnd type="triangle"/>
+          </a:ln>
+        </p:spPr>
+        <p:style>
+          <a:lnRef idx="1">
+            <a:schemeClr val="accent1"/>
+          </a:lnRef>
+          <a:fillRef idx="0">
+            <a:schemeClr val="accent1"/>
+          </a:fillRef>
+          <a:effectRef idx="0">
+            <a:schemeClr val="accent1"/>
+          </a:effectRef>
+          <a:fontRef idx="minor">
+            <a:schemeClr val="tx1"/>
+          </a:fontRef>
+        </p:style>
+      </p:cxnSp>
+      <p:cxnSp>
+        <p:nvCxnSpPr>
+          <p:cNvPr id="39" name="Straight Arrow Connector 38"/>
+          <p:cNvCxnSpPr>
+            <a:stCxn id="49" idx="0"/>
+          </p:cNvCxnSpPr>
+          <p:nvPr/>
+        </p:nvCxnSpPr>
+        <p:spPr>
+          <a:xfrm flipV="1">
+            <a:off x="3247990" y="5553717"/>
+            <a:ext cx="708193" cy="746481"/>
+          </a:xfrm>
+          <a:prstGeom prst="straightConnector1">
+            <a:avLst/>
+          </a:prstGeom>
+          <a:ln>
+            <a:headEnd type="triangle"/>
+            <a:tailEnd type="triangle"/>
+          </a:ln>
+        </p:spPr>
+        <p:style>
+          <a:lnRef idx="1">
+            <a:schemeClr val="accent1"/>
+          </a:lnRef>
+          <a:fillRef idx="0">
+            <a:schemeClr val="accent1"/>
+          </a:fillRef>
+          <a:effectRef idx="0">
+            <a:schemeClr val="accent1"/>
+          </a:effectRef>
+          <a:fontRef idx="minor">
+            <a:schemeClr val="tx1"/>
+          </a:fontRef>
+        </p:style>
+      </p:cxnSp>
+      <p:cxnSp>
+        <p:nvCxnSpPr>
+          <p:cNvPr id="41" name="Straight Arrow Connector 40"/>
+          <p:cNvCxnSpPr/>
+          <p:nvPr/>
+        </p:nvCxnSpPr>
+        <p:spPr>
+          <a:xfrm flipV="1">
+            <a:off x="3810000" y="5553717"/>
+            <a:ext cx="1676400" cy="746481"/>
+          </a:xfrm>
+          <a:prstGeom prst="straightConnector1">
+            <a:avLst/>
+          </a:prstGeom>
+          <a:ln>
+            <a:headEnd type="triangle"/>
+            <a:tailEnd type="triangle"/>
+          </a:ln>
+        </p:spPr>
+        <p:style>
+          <a:lnRef idx="1">
+            <a:schemeClr val="accent1"/>
+          </a:lnRef>
+          <a:fillRef idx="0">
+            <a:schemeClr val="accent1"/>
+          </a:fillRef>
+          <a:effectRef idx="0">
+            <a:schemeClr val="accent1"/>
+          </a:effectRef>
+          <a:fontRef idx="minor">
+            <a:schemeClr val="tx1"/>
+          </a:fontRef>
+        </p:style>
+      </p:cxnSp>
     </p:spTree>
   </p:cSld>
   <p:clrMapOvr>
     <a:masterClrMapping/>
   </p:clrMapOvr>
-  <p:transition xmlns:p14="http://schemas.microsoft.com/office/powerpoint/2010/main" spd="slow">
+  <p:transition spd="slow">
     <p:cut/>
   </p:transition>
   <p:timing>
     <p:tnLst>
       <p:par>
-        <p:cTn xmlns:p14="http://schemas.microsoft.com/office/powerpoint/2010/main" id="1" dur="indefinite" restart="never" nodeType="tmRoot"/>
+        <p:cTn id="1" dur="indefinite" restart="never" nodeType="tmRoot"/>
       </p:par>
     </p:tnLst>
   </p:timing>
@@ -7765,7 +6581,7 @@
   <p:cSld>
     <p:spTree>
       <p:nvGrpSpPr>
-        <p:cNvPr id="1" name="Shape 119"/>
+        <p:cNvPr id="1" name="Shape 63"/>
         <p:cNvGrpSpPr/>
         <p:nvPr/>
       </p:nvGrpSpPr>
@@ -7779,7 +6595,7 @@
       </p:grpSpPr>
       <p:sp>
         <p:nvSpPr>
-          <p:cNvPr id="120" name="Shape 120"/>
+          <p:cNvPr id="64" name="Shape 64"/>
           <p:cNvSpPr txBox="1">
             <a:spLocks noGrp="1"/>
           </p:cNvSpPr>
@@ -7790,7 +6606,7 @@
         <p:spPr>
           <a:xfrm>
             <a:off x="457200" y="1600200"/>
-            <a:ext cx="8229600" cy="3057217"/>
+            <a:ext cx="8229600" cy="3877954"/>
           </a:xfrm>
           <a:prstGeom prst="rect">
             <a:avLst/>
@@ -7802,7 +6618,82 @@
           </a:bodyPr>
           <a:lstStyle/>
           <a:p>
-            <a:pPr marL="457200" lvl="0" indent="-419100" rtl="0">
+            <a:pPr marL="457200" lvl="0" indent="-419100" algn="l" rtl="0">
+              <a:buClr>
+                <a:schemeClr val="dk1"/>
+              </a:buClr>
+              <a:buSzPct val="166666"/>
+              <a:buFont typeface="Arial"/>
+              <a:buChar char="•"/>
+            </a:pPr>
+            <a:r>
+              <a:rPr lang="en" sz="2000" dirty="0" smtClean="0">
+                <a:solidFill>
+                  <a:srgbClr val="A88000"/>
+                </a:solidFill>
+              </a:rPr>
+              <a:t>Client side UI</a:t>
+            </a:r>
+            <a:endParaRPr lang="en" sz="2000" dirty="0">
+              <a:solidFill>
+                <a:srgbClr val="A88000"/>
+              </a:solidFill>
+            </a:endParaRPr>
+          </a:p>
+          <a:p>
+            <a:pPr marL="914400" lvl="1" indent="-381000" algn="l" rtl="0">
+              <a:buClr>
+                <a:schemeClr val="dk1"/>
+              </a:buClr>
+              <a:buSzPct val="80000"/>
+              <a:buFont typeface="Courier New"/>
+              <a:buChar char="o"/>
+            </a:pPr>
+            <a:r>
+              <a:rPr lang="en" sz="2000" dirty="0" smtClean="0"/>
+              <a:t>Client side application for interacting with user events</a:t>
+            </a:r>
+            <a:endParaRPr lang="en" sz="2000" dirty="0"/>
+          </a:p>
+          <a:p>
+            <a:pPr marL="457200" lvl="0" indent="-419100" algn="l" rtl="0">
+              <a:buClr>
+                <a:schemeClr val="dk1"/>
+              </a:buClr>
+              <a:buSzPct val="166666"/>
+              <a:buFont typeface="Arial"/>
+              <a:buChar char="•"/>
+            </a:pPr>
+            <a:r>
+              <a:rPr lang="en" sz="2000" dirty="0" smtClean="0">
+                <a:solidFill>
+                  <a:srgbClr val="A88000"/>
+                </a:solidFill>
+              </a:rPr>
+              <a:t>Event Listeners</a:t>
+            </a:r>
+            <a:endParaRPr lang="en" sz="2000" dirty="0">
+              <a:solidFill>
+                <a:srgbClr val="A88000"/>
+              </a:solidFill>
+            </a:endParaRPr>
+          </a:p>
+          <a:p>
+            <a:pPr marL="914400" lvl="1" indent="-381000" algn="l" rtl="0">
+              <a:buClr>
+                <a:schemeClr val="dk1"/>
+              </a:buClr>
+              <a:buSzPct val="80000"/>
+              <a:buFont typeface="Courier New"/>
+              <a:buChar char="o"/>
+            </a:pPr>
+            <a:r>
+              <a:rPr lang="en" sz="2000" dirty="0" smtClean="0"/>
+              <a:t>Listen for user events (clicking an “update” button, etc.) and sends appropriate request to web service</a:t>
+            </a:r>
+          </a:p>
+          <a:p>
+            <a:pPr marL="457200" lvl="0" indent="-419100" algn="l">
               <a:buClr>
                 <a:schemeClr val="dk1"/>
               </a:buClr>
@@ -7816,11 +6707,24 @@
                   <a:srgbClr val="A88000"/>
                 </a:solidFill>
               </a:rPr>
-              <a:t>Services</a:t>
+              <a:t>Event </a:t>
             </a:r>
-          </a:p>
-          <a:p>
-            <a:pPr marL="914400" lvl="1" indent="-381000" rtl="0">
+            <a:r>
+              <a:rPr lang="en" sz="2000" dirty="0" smtClean="0">
+                <a:solidFill>
+                  <a:srgbClr val="A88000"/>
+                </a:solidFill>
+              </a:rPr>
+              <a:t>Handler</a:t>
+            </a:r>
+            <a:endParaRPr lang="en" sz="2000" dirty="0">
+              <a:solidFill>
+                <a:srgbClr val="A88000"/>
+              </a:solidFill>
+            </a:endParaRPr>
+          </a:p>
+          <a:p>
+            <a:pPr marL="914400" lvl="1" indent="-381000" algn="l">
               <a:buClr>
                 <a:schemeClr val="dk1"/>
               </a:buClr>
@@ -7829,12 +6733,12 @@
               <a:buChar char="o"/>
             </a:pPr>
             <a:r>
-              <a:rPr lang="en" sz="2000" dirty="0"/>
-              <a:t>Control the ability to redirect and call logical functionality</a:t>
+              <a:rPr lang="en" sz="2000" dirty="0" smtClean="0"/>
+              <a:t>Interprets events and sends request to RESTful web services</a:t>
             </a:r>
           </a:p>
           <a:p>
-            <a:pPr marL="457200" lvl="0" indent="-419100" rtl="0">
+            <a:pPr marL="457200" lvl="0" indent="-419100" algn="l">
               <a:buClr>
                 <a:schemeClr val="dk1"/>
               </a:buClr>
@@ -7843,16 +6747,21 @@
               <a:buChar char="•"/>
             </a:pPr>
             <a:r>
-              <a:rPr lang="en" sz="2000" dirty="0">
+              <a:rPr lang="en" sz="2000" dirty="0" smtClean="0">
                 <a:solidFill>
                   <a:srgbClr val="A88000"/>
                 </a:solidFill>
               </a:rPr>
-              <a:t>Domain</a:t>
+              <a:t>Request/Response</a:t>
             </a:r>
-          </a:p>
-          <a:p>
-            <a:pPr marL="914400" lvl="1" indent="-381000" rtl="0">
+            <a:endParaRPr lang="en" sz="2000" dirty="0">
+              <a:solidFill>
+                <a:srgbClr val="A88000"/>
+              </a:solidFill>
+            </a:endParaRPr>
+          </a:p>
+          <a:p>
+            <a:pPr marL="914400" lvl="1" indent="-381000" algn="l">
               <a:buClr>
                 <a:schemeClr val="dk1"/>
               </a:buClr>
@@ -7861,12 +6770,38 @@
               <a:buChar char="o"/>
             </a:pPr>
             <a:r>
-              <a:rPr lang="en" sz="2000" dirty="0"/>
-              <a:t>Used to access and map data stored in the database</a:t>
+              <a:rPr lang="en" sz="2000" dirty="0" smtClean="0"/>
+              <a:t>Standardized JSON-formatted strings</a:t>
             </a:r>
           </a:p>
           <a:p>
-            <a:pPr marL="914400" lvl="1" indent="-381000" rtl="0">
+            <a:pPr marL="457200" lvl="0" indent="-419100" algn="l" rtl="0">
+              <a:buClr>
+                <a:schemeClr val="dk1"/>
+              </a:buClr>
+              <a:buSzPct val="166666"/>
+              <a:buFont typeface="Arial"/>
+              <a:buChar char="•"/>
+            </a:pPr>
+            <a:r>
+              <a:rPr lang="en" sz="2000" dirty="0" smtClean="0">
+                <a:solidFill>
+                  <a:srgbClr val="A88000"/>
+                </a:solidFill>
+              </a:rPr>
+              <a:t>Web </a:t>
+            </a:r>
+            <a:r>
+              <a:rPr lang="en" sz="2000" dirty="0">
+                <a:solidFill>
+                  <a:srgbClr val="A88000"/>
+                </a:solidFill>
+              </a:rPr>
+              <a:t>Services</a:t>
+            </a:r>
+          </a:p>
+          <a:p>
+            <a:pPr marL="914400" lvl="1" indent="-381000" algn="l" rtl="0">
               <a:buClr>
                 <a:schemeClr val="dk1"/>
               </a:buClr>
@@ -7875,54 +6810,23 @@
               <a:buChar char="o"/>
             </a:pPr>
             <a:r>
-              <a:rPr lang="en" sz="2000" dirty="0"/>
-              <a:t>Used by the services to establish system functionality</a:t>
+              <a:rPr lang="en" sz="2000" dirty="0" smtClean="0"/>
+              <a:t>Handles communication with client and interaction with database</a:t>
             </a:r>
-          </a:p>
-          <a:p>
-            <a:pPr marL="457200" lvl="0" indent="-419100" rtl="0">
-              <a:buClr>
-                <a:schemeClr val="dk1"/>
-              </a:buClr>
-              <a:buSzPct val="166666"/>
-              <a:buFont typeface="Arial"/>
-              <a:buChar char="•"/>
-            </a:pPr>
-            <a:r>
-              <a:rPr lang="en" sz="2000" dirty="0">
-                <a:solidFill>
-                  <a:srgbClr val="A88000"/>
-                </a:solidFill>
-              </a:rPr>
-              <a:t>Views (Pages)</a:t>
-            </a:r>
-          </a:p>
-          <a:p>
-            <a:pPr marL="914400" lvl="1" indent="-381000">
-              <a:buClr>
-                <a:schemeClr val="dk1"/>
-              </a:buClr>
-              <a:buSzPct val="80000"/>
-              <a:buFont typeface="Courier New"/>
-              <a:buChar char="o"/>
-            </a:pPr>
-            <a:r>
-              <a:rPr lang="en" sz="2000" dirty="0"/>
-              <a:t>Allows to users to control the services and in turn model the domain</a:t>
-            </a:r>
+            <a:endParaRPr lang="en" sz="2000" dirty="0"/>
           </a:p>
         </p:txBody>
       </p:sp>
       <p:sp>
         <p:nvSpPr>
-          <p:cNvPr id="121" name="Shape 121"/>
+          <p:cNvPr id="65" name="Shape 65"/>
           <p:cNvSpPr txBox="1"/>
           <p:nvPr/>
         </p:nvSpPr>
         <p:spPr>
           <a:xfrm>
             <a:off x="457200" y="689875"/>
-            <a:ext cx="3975899" cy="1292631"/>
+            <a:ext cx="5715000" cy="738633"/>
           </a:xfrm>
           <a:prstGeom prst="rect">
             <a:avLst/>
@@ -7930,22 +6834,24 @@
           <a:noFill/>
         </p:spPr>
         <p:txBody>
-          <a:bodyPr lIns="91425" tIns="91425" rIns="91425" bIns="91425" anchor="t" anchorCtr="0">
+          <a:bodyPr wrap="square" lIns="91425" tIns="91425" rIns="91425" bIns="91425" anchor="t" anchorCtr="0">
             <a:spAutoFit/>
           </a:bodyPr>
           <a:lstStyle/>
           <a:p>
-            <a:pPr lvl="0"/>
+            <a:pPr lvl="0" rtl="0">
+              <a:buNone/>
+            </a:pPr>
             <a:r>
-              <a:rPr lang="en" sz="3600" b="1" u="sng" dirty="0">
+              <a:rPr lang="en" sz="3600" b="1" u="sng" dirty="0" smtClean="0">
                 <a:solidFill>
                   <a:srgbClr val="A88000"/>
                 </a:solidFill>
               </a:rPr>
-              <a:t>C</a:t>
+              <a:t>Design Two C</a:t>
             </a:r>
             <a:r>
-              <a:rPr lang="en-US" sz="3600" b="1" u="sng" dirty="0">
+              <a:rPr lang="en-US" sz="3600" b="1" u="sng" dirty="0" smtClean="0">
                 <a:solidFill>
                   <a:srgbClr val="A88000"/>
                 </a:solidFill>
@@ -7953,18 +6859,13 @@
               <a:t>o</a:t>
             </a:r>
             <a:r>
-              <a:rPr lang="en" sz="3600" b="1" u="sng" dirty="0">
+              <a:rPr lang="en" sz="3600" b="1" u="sng" dirty="0" smtClean="0">
                 <a:solidFill>
                   <a:srgbClr val="A88000"/>
                 </a:solidFill>
               </a:rPr>
               <a:t>mponents</a:t>
             </a:r>
-          </a:p>
-          <a:p>
-            <a:pPr>
-              <a:buNone/>
-            </a:pPr>
             <a:endParaRPr lang="en" sz="3600" b="1" u="sng" dirty="0">
               <a:solidFill>
                 <a:srgbClr val="A88000"/>
@@ -7978,13 +6879,13 @@
   <p:clrMapOvr>
     <a:masterClrMapping/>
   </p:clrMapOvr>
-  <p:transition xmlns:p14="http://schemas.microsoft.com/office/powerpoint/2010/main" spd="slow">
+  <p:transition spd="slow">
     <p:cut/>
   </p:transition>
   <p:timing>
     <p:tnLst>
       <p:par>
-        <p:cTn xmlns:p14="http://schemas.microsoft.com/office/powerpoint/2010/main" id="1" dur="indefinite" restart="never" nodeType="tmRoot"/>
+        <p:cTn id="1" dur="indefinite" restart="never" nodeType="tmRoot"/>
       </p:par>
     </p:tnLst>
   </p:timing>
@@ -7996,7 +6897,7 @@
   <p:cSld>
     <p:spTree>
       <p:nvGrpSpPr>
-        <p:cNvPr id="1" name="Shape 125"/>
+        <p:cNvPr id="1" name="Shape 69"/>
         <p:cNvGrpSpPr/>
         <p:nvPr/>
       </p:nvGrpSpPr>
@@ -8010,74 +6911,19 @@
       </p:grpSpPr>
       <p:sp>
         <p:nvSpPr>
-          <p:cNvPr id="126" name="Shape 126"/>
-          <p:cNvSpPr txBox="1">
-            <a:spLocks noGrp="1"/>
-          </p:cNvSpPr>
-          <p:nvPr>
-            <p:ph type="title"/>
-          </p:nvPr>
+          <p:cNvPr id="70" name="Shape 70"/>
+          <p:cNvSpPr txBox="1"/>
+          <p:nvPr/>
         </p:nvSpPr>
         <p:spPr>
           <a:xfrm>
-            <a:off x="457200" y="863669"/>
-            <a:ext cx="8229600" cy="553968"/>
+            <a:off x="278311" y="262575"/>
+            <a:ext cx="8541900" cy="5724614"/>
           </a:xfrm>
           <a:prstGeom prst="rect">
             <a:avLst/>
           </a:prstGeom>
-        </p:spPr>
-        <p:txBody>
-          <a:bodyPr lIns="91425" tIns="91425" rIns="91425" bIns="91425" anchor="b" anchorCtr="0">
-            <a:spAutoFit/>
-          </a:bodyPr>
-          <a:lstStyle/>
-          <a:p>
-            <a:pPr>
-              <a:buNone/>
-            </a:pPr>
-            <a:r>
-              <a:rPr lang="en" sz="2400" dirty="0">
-                <a:solidFill>
-                  <a:srgbClr val="A88000"/>
-                </a:solidFill>
-              </a:rPr>
-              <a:t>User </a:t>
-            </a:r>
-            <a:r>
-              <a:rPr lang="en" sz="2400" u="sng" dirty="0" smtClean="0">
-                <a:solidFill>
-                  <a:srgbClr val="A88000"/>
-                </a:solidFill>
-              </a:rPr>
-              <a:t>Service</a:t>
-            </a:r>
-            <a:endParaRPr lang="en" sz="2400" u="sng" dirty="0">
-              <a:solidFill>
-                <a:srgbClr val="A88000"/>
-              </a:solidFill>
-            </a:endParaRPr>
-          </a:p>
-        </p:txBody>
-      </p:sp>
-      <p:sp>
-        <p:nvSpPr>
-          <p:cNvPr id="127" name="Shape 127"/>
-          <p:cNvSpPr txBox="1">
-            <a:spLocks noGrp="1"/>
-          </p:cNvSpPr>
-          <p:nvPr>
-            <p:ph type="body" idx="1"/>
-          </p:nvPr>
-        </p:nvSpPr>
-        <p:spPr>
-          <a:xfrm>
-            <a:off x="457200" y="1600200"/>
-            <a:ext cx="8229600" cy="4967700"/>
-          </a:xfrm>
-          <a:prstGeom prst="rect">
-            <a:avLst/>
-          </a:prstGeom>
+          <a:noFill/>
         </p:spPr>
         <p:txBody>
           <a:bodyPr lIns="91425" tIns="91425" rIns="91425" bIns="91425" anchor="t" anchorCtr="0">
@@ -8085,75 +6931,141 @@
           </a:bodyPr>
           <a:lstStyle/>
           <a:p>
-            <a:pPr marL="457200" lvl="0" indent="-419100" rtl="0">
+            <a:pPr marL="457200" lvl="0" indent="-457200" rtl="0">
               <a:buClr>
-                <a:schemeClr val="dk1"/>
+                <a:srgbClr val="000000"/>
               </a:buClr>
               <a:buSzPct val="166666"/>
               <a:buFont typeface="Arial"/>
               <a:buChar char="•"/>
             </a:pPr>
             <a:r>
-              <a:rPr lang="en"/>
-              <a:t>Controls</a:t>
+              <a:rPr lang="en" sz="3600" dirty="0" smtClean="0">
+                <a:solidFill>
+                  <a:srgbClr val="FF0000"/>
+                </a:solidFill>
+              </a:rPr>
+              <a:t>Pros of Design Two</a:t>
             </a:r>
-          </a:p>
-          <a:p>
-            <a:pPr marL="914400" lvl="1" indent="-381000" rtl="0">
+            <a:endParaRPr lang="en" sz="3600" dirty="0">
+              <a:solidFill>
+                <a:srgbClr val="FF0000"/>
+              </a:solidFill>
+            </a:endParaRPr>
+          </a:p>
+          <a:p>
+            <a:pPr marL="914400" lvl="1" indent="-457200" rtl="0">
               <a:buClr>
-                <a:schemeClr val="dk1"/>
+                <a:srgbClr val="000000"/>
               </a:buClr>
-              <a:buSzPct val="80000"/>
+              <a:buSzPct val="150000"/>
               <a:buFont typeface="Courier New"/>
               <a:buChar char="o"/>
             </a:pPr>
             <a:r>
-              <a:rPr lang="en"/>
-              <a:t>login functionality</a:t>
+              <a:rPr lang="en" sz="2400" dirty="0" smtClean="0"/>
+              <a:t>Work done primarily on client side, freeing up server resources</a:t>
             </a:r>
-          </a:p>
-          <a:p>
-            <a:pPr marL="914400" lvl="1" indent="-381000" rtl="0">
+            <a:endParaRPr lang="en" sz="2400" dirty="0"/>
+          </a:p>
+          <a:p>
+            <a:pPr marL="914400" lvl="1" indent="-457200" rtl="0">
               <a:buClr>
-                <a:schemeClr val="dk1"/>
+                <a:srgbClr val="000000"/>
               </a:buClr>
-              <a:buSzPct val="80000"/>
+              <a:buSzPct val="150000"/>
               <a:buFont typeface="Courier New"/>
               <a:buChar char="o"/>
             </a:pPr>
             <a:r>
-              <a:rPr lang="en"/>
-              <a:t>Account creation</a:t>
+              <a:rPr lang="en" sz="2400" dirty="0" smtClean="0"/>
+              <a:t>Standard look and feel throughout all versions of application </a:t>
             </a:r>
           </a:p>
           <a:p>
-            <a:pPr marL="914400" lvl="1" indent="-381000">
+            <a:pPr marL="457200" lvl="0" indent="-457200" rtl="0">
               <a:buClr>
-                <a:schemeClr val="dk1"/>
+                <a:srgbClr val="000000"/>
               </a:buClr>
-              <a:buSzPct val="80000"/>
+              <a:buSzPct val="166666"/>
+              <a:buFont typeface="Arial"/>
+              <a:buChar char="•"/>
+            </a:pPr>
+            <a:r>
+              <a:rPr lang="en" sz="3600" dirty="0" smtClean="0">
+                <a:solidFill>
+                  <a:srgbClr val="FF0000"/>
+                </a:solidFill>
+              </a:rPr>
+              <a:t>Cons of Design Two</a:t>
+            </a:r>
+          </a:p>
+          <a:p>
+            <a:pPr marL="914400" lvl="1" indent="-457200" rtl="0">
+              <a:buClr>
+                <a:srgbClr val="000000"/>
+              </a:buClr>
+              <a:buSzPct val="150000"/>
               <a:buFont typeface="Courier New"/>
               <a:buChar char="o"/>
             </a:pPr>
             <a:r>
-              <a:rPr lang="en"/>
-              <a:t>Account modification</a:t>
+              <a:rPr lang="en" sz="2400" dirty="0" smtClean="0"/>
+              <a:t>Must have different code to support several different user platforms—more work</a:t>
             </a:r>
+            <a:endParaRPr lang="en" sz="2400" dirty="0"/>
+          </a:p>
+          <a:p>
+            <a:pPr marL="914400" lvl="1" indent="-457200" rtl="0">
+              <a:buClr>
+                <a:srgbClr val="000000"/>
+              </a:buClr>
+              <a:buSzPct val="150000"/>
+              <a:buFont typeface="Courier New"/>
+              <a:buChar char="o"/>
+            </a:pPr>
+            <a:r>
+              <a:rPr lang="en" sz="2400" dirty="0" smtClean="0"/>
+              <a:t>Difficult to maintain due to requiring updates for all user platforms when new functionality is introduced or bugs are fixed</a:t>
+            </a:r>
+          </a:p>
+          <a:p>
+            <a:pPr marL="914400" lvl="1" indent="-457200" rtl="0">
+              <a:buClr>
+                <a:srgbClr val="000000"/>
+              </a:buClr>
+              <a:buSzPct val="150000"/>
+              <a:buFont typeface="Courier New"/>
+              <a:buChar char="o"/>
+            </a:pPr>
+            <a:r>
+              <a:rPr lang="en" sz="2400" dirty="0" smtClean="0"/>
+              <a:t>Poor security due to data being manipulated on client side</a:t>
+            </a:r>
+            <a:endParaRPr lang="en" sz="2400" dirty="0"/>
+          </a:p>
+          <a:p>
+            <a:endParaRPr lang="en" sz="2400" dirty="0"/>
           </a:p>
         </p:txBody>
       </p:sp>
     </p:spTree>
+    <p:extLst>
+      <p:ext uri="{BB962C8B-B14F-4D97-AF65-F5344CB8AC3E}">
+        <p14:creationId xmlns:p14="http://schemas.microsoft.com/office/powerpoint/2010/main" val="274914681"/>
+      </p:ext>
+    </p:extLst>
   </p:cSld>
   <p:clrMapOvr>
     <a:masterClrMapping/>
   </p:clrMapOvr>
-  <p:transition xmlns:p14="http://schemas.microsoft.com/office/powerpoint/2010/main" spd="slow">
+  <p:transition spd="slow">
     <p:cut/>
   </p:transition>
   <p:timing>
     <p:tnLst>
       <p:par>
-        <p:cTn xmlns:p14="http://schemas.microsoft.com/office/powerpoint/2010/main" id="1" dur="indefinite" restart="never" nodeType="tmRoot"/>
+        <p:cTn id="1" dur="indefinite" restart="never" nodeType="tmRoot"/>
       </p:par>
     </p:tnLst>
   </p:timing>
@@ -8165,7 +7077,7 @@
   <p:cSld>
     <p:spTree>
       <p:nvGrpSpPr>
-        <p:cNvPr id="1" name="Shape 131"/>
+        <p:cNvPr id="1" name="Shape 143"/>
         <p:cNvGrpSpPr/>
         <p:nvPr/>
       </p:nvGrpSpPr>
@@ -8179,188 +7091,39 @@
       </p:grpSpPr>
       <p:sp>
         <p:nvSpPr>
-          <p:cNvPr id="132" name="Shape 132"/>
-          <p:cNvSpPr txBox="1">
-            <a:spLocks noGrp="1"/>
-          </p:cNvSpPr>
-          <p:nvPr>
-            <p:ph type="title"/>
-          </p:nvPr>
+          <p:cNvPr id="2" name="TextBox 1"/>
+          <p:cNvSpPr txBox="1"/>
+          <p:nvPr/>
         </p:nvSpPr>
         <p:spPr>
           <a:xfrm>
-            <a:off x="457200" y="863669"/>
-            <a:ext cx="8229600" cy="553968"/>
+            <a:off x="381000" y="485001"/>
+            <a:ext cx="6470041" cy="553998"/>
           </a:xfrm>
           <a:prstGeom prst="rect">
             <a:avLst/>
           </a:prstGeom>
+          <a:noFill/>
         </p:spPr>
         <p:txBody>
-          <a:bodyPr lIns="91425" tIns="91425" rIns="91425" bIns="91425" anchor="b" anchorCtr="0">
+          <a:bodyPr wrap="none" rtlCol="0">
             <a:spAutoFit/>
           </a:bodyPr>
           <a:lstStyle/>
           <a:p>
             <a:r>
-              <a:rPr lang="en" sz="2400" dirty="0" smtClean="0">
+              <a:rPr lang="en-US" sz="3000" b="1" dirty="0" smtClean="0">
                 <a:solidFill>
                   <a:srgbClr val="A88000"/>
                 </a:solidFill>
               </a:rPr>
-              <a:t>Recipe/Ingredient </a:t>
+              <a:t>Reasons for Selecting Design One</a:t>
             </a:r>
-            <a:r>
-              <a:rPr lang="en" sz="2400" u="sng" dirty="0" smtClean="0">
-                <a:solidFill>
-                  <a:srgbClr val="A88000"/>
-                </a:solidFill>
-              </a:rPr>
-              <a:t>Service</a:t>
-            </a:r>
-            <a:endParaRPr lang="en" sz="2400" u="sng" dirty="0">
+            <a:endParaRPr lang="en-US" sz="3000" b="1" dirty="0">
               <a:solidFill>
                 <a:srgbClr val="A88000"/>
               </a:solidFill>
             </a:endParaRPr>
-          </a:p>
-        </p:txBody>
-      </p:sp>
-      <p:sp>
-        <p:nvSpPr>
-          <p:cNvPr id="133" name="Shape 133"/>
-          <p:cNvSpPr txBox="1">
-            <a:spLocks noGrp="1"/>
-          </p:cNvSpPr>
-          <p:nvPr>
-            <p:ph type="body" idx="1"/>
-          </p:nvPr>
-        </p:nvSpPr>
-        <p:spPr>
-          <a:xfrm>
-            <a:off x="457200" y="1600200"/>
-            <a:ext cx="8229600" cy="4967700"/>
-          </a:xfrm>
-          <a:prstGeom prst="rect">
-            <a:avLst/>
-          </a:prstGeom>
-        </p:spPr>
-        <p:txBody>
-          <a:bodyPr lIns="91425" tIns="91425" rIns="91425" bIns="91425" anchor="t" anchorCtr="0">
-            <a:spAutoFit/>
-          </a:bodyPr>
-          <a:lstStyle/>
-          <a:p>
-            <a:pPr marL="457200" lvl="0" indent="-419100" rtl="0">
-              <a:buClr>
-                <a:schemeClr val="dk1"/>
-              </a:buClr>
-              <a:buSzPct val="166666"/>
-              <a:buFont typeface="Arial"/>
-              <a:buChar char="•"/>
-            </a:pPr>
-            <a:r>
-              <a:rPr lang="en" dirty="0"/>
-              <a:t>Controls</a:t>
-            </a:r>
-          </a:p>
-          <a:p>
-            <a:pPr marL="914400" lvl="1" indent="-381000" rtl="0">
-              <a:buClr>
-                <a:schemeClr val="dk1"/>
-              </a:buClr>
-              <a:buSzPct val="80000"/>
-              <a:buFont typeface="Courier New"/>
-              <a:buChar char="o"/>
-            </a:pPr>
-            <a:r>
-              <a:rPr lang="en" dirty="0"/>
-              <a:t>Recipe viewing</a:t>
-            </a:r>
-          </a:p>
-          <a:p>
-            <a:pPr marL="914400" lvl="1" indent="-381000" rtl="0">
-              <a:buClr>
-                <a:schemeClr val="dk1"/>
-              </a:buClr>
-              <a:buSzPct val="80000"/>
-              <a:buFont typeface="Courier New"/>
-              <a:buChar char="o"/>
-            </a:pPr>
-            <a:r>
-              <a:rPr lang="en" dirty="0"/>
-              <a:t>Recipe Creation</a:t>
-            </a:r>
-          </a:p>
-          <a:p>
-            <a:pPr marL="914400" lvl="1" indent="-381000" rtl="0">
-              <a:buClr>
-                <a:schemeClr val="dk1"/>
-              </a:buClr>
-              <a:buSzPct val="80000"/>
-              <a:buFont typeface="Courier New"/>
-              <a:buChar char="o"/>
-            </a:pPr>
-            <a:r>
-              <a:rPr lang="en" dirty="0"/>
-              <a:t>Recipe Modification</a:t>
-            </a:r>
-          </a:p>
-          <a:p>
-            <a:pPr marL="914400" lvl="1" indent="-381000" rtl="0">
-              <a:buClr>
-                <a:schemeClr val="dk1"/>
-              </a:buClr>
-              <a:buSzPct val="80000"/>
-              <a:buFont typeface="Courier New"/>
-              <a:buChar char="o"/>
-            </a:pPr>
-            <a:r>
-              <a:rPr lang="en" dirty="0"/>
-              <a:t>Recipe Removal</a:t>
-            </a:r>
-          </a:p>
-          <a:p>
-            <a:pPr marL="914400" lvl="1" indent="-381000" rtl="0">
-              <a:buClr>
-                <a:schemeClr val="dk1"/>
-              </a:buClr>
-              <a:buSzPct val="80000"/>
-              <a:buFont typeface="Courier New"/>
-              <a:buChar char="o"/>
-            </a:pPr>
-            <a:r>
-              <a:rPr lang="en" dirty="0"/>
-              <a:t>Ingredient Viewing</a:t>
-            </a:r>
-          </a:p>
-          <a:p>
-            <a:pPr marL="914400" lvl="1" indent="-381000" rtl="0">
-              <a:buClr>
-                <a:schemeClr val="dk1"/>
-              </a:buClr>
-              <a:buSzPct val="80000"/>
-              <a:buFont typeface="Courier New"/>
-              <a:buChar char="o"/>
-            </a:pPr>
-            <a:r>
-              <a:rPr lang="en" dirty="0"/>
-              <a:t>Ingredient Adding</a:t>
-            </a:r>
-          </a:p>
-          <a:p>
-            <a:pPr marL="914400" lvl="1" indent="-381000" rtl="0">
-              <a:buClr>
-                <a:schemeClr val="dk1"/>
-              </a:buClr>
-              <a:buSzPct val="80000"/>
-              <a:buFont typeface="Courier New"/>
-              <a:buChar char="o"/>
-            </a:pPr>
-            <a:r>
-              <a:rPr lang="en" dirty="0"/>
-              <a:t>Ingredient Removal</a:t>
-            </a:r>
           </a:p>
         </p:txBody>
       </p:sp>
@@ -8369,16 +7132,9 @@
   <p:clrMapOvr>
     <a:masterClrMapping/>
   </p:clrMapOvr>
-  <p:transition xmlns:p14="http://schemas.microsoft.com/office/powerpoint/2010/main" spd="slow">
+  <p:transition spd="slow">
     <p:cut/>
   </p:transition>
-  <p:timing>
-    <p:tnLst>
-      <p:par>
-        <p:cTn xmlns:p14="http://schemas.microsoft.com/office/powerpoint/2010/main" id="1" dur="indefinite" restart="never" nodeType="tmRoot"/>
-      </p:par>
-    </p:tnLst>
-  </p:timing>
 </p:sld>
 </file>
 
@@ -8387,7 +7143,7 @@
   <p:cSld>
     <p:spTree>
       <p:nvGrpSpPr>
-        <p:cNvPr id="1" name="Shape 137"/>
+        <p:cNvPr id="1" name=""/>
         <p:cNvGrpSpPr/>
         <p:nvPr/>
       </p:nvGrpSpPr>
@@ -8401,131 +7157,149 @@
       </p:grpSpPr>
       <p:sp>
         <p:nvSpPr>
-          <p:cNvPr id="138" name="Shape 138"/>
-          <p:cNvSpPr txBox="1">
-            <a:spLocks noGrp="1"/>
-          </p:cNvSpPr>
-          <p:nvPr>
-            <p:ph type="title"/>
-          </p:nvPr>
+          <p:cNvPr id="4" name="Rectangle 3"/>
+          <p:cNvSpPr/>
+          <p:nvPr/>
         </p:nvSpPr>
         <p:spPr>
           <a:xfrm>
-            <a:off x="457200" y="863669"/>
-            <a:ext cx="8229600" cy="553968"/>
+            <a:off x="914400" y="609600"/>
+            <a:ext cx="6019800" cy="1754326"/>
           </a:xfrm>
           <a:prstGeom prst="rect">
             <a:avLst/>
           </a:prstGeom>
         </p:spPr>
         <p:txBody>
-          <a:bodyPr lIns="91425" tIns="91425" rIns="91425" bIns="91425" anchor="b" anchorCtr="0">
+          <a:bodyPr wrap="square">
             <a:spAutoFit/>
           </a:bodyPr>
           <a:lstStyle/>
           <a:p>
-            <a:pPr>
-              <a:buNone/>
-            </a:pPr>
             <a:r>
-              <a:rPr lang="en" sz="2400" dirty="0">
+              <a:rPr lang="en-US" sz="1800" dirty="0"/>
+              <a:t> </a:t>
+            </a:r>
+          </a:p>
+          <a:p>
+            <a:r>
+              <a:rPr lang="en-US" sz="1800" b="1" u="sng" dirty="0">
                 <a:solidFill>
                   <a:srgbClr val="A88000"/>
                 </a:solidFill>
               </a:rPr>
-              <a:t>System </a:t>
+              <a:t>Sprint #1</a:t>
+            </a:r>
+            <a:endParaRPr lang="en-US" sz="1800" u="sng" dirty="0">
+              <a:solidFill>
+                <a:srgbClr val="A88000"/>
+              </a:solidFill>
+            </a:endParaRPr>
+          </a:p>
+          <a:p>
+            <a:r>
+              <a:rPr lang="en-US" sz="1800" dirty="0"/>
+              <a:t> </a:t>
+            </a:r>
+          </a:p>
+          <a:p>
+            <a:r>
+              <a:rPr lang="en-US" sz="1800" b="1" u="sng" dirty="0">
+                <a:solidFill>
+                  <a:srgbClr val="A88000"/>
+                </a:solidFill>
+              </a:rPr>
+              <a:t>Sprint #2</a:t>
+            </a:r>
+            <a:endParaRPr lang="en-US" sz="1800" u="sng" dirty="0">
+              <a:solidFill>
+                <a:srgbClr val="A88000"/>
+              </a:solidFill>
+            </a:endParaRPr>
+          </a:p>
+          <a:p>
+            <a:r>
+              <a:rPr lang="en-US" sz="1800" dirty="0"/>
+              <a:t> </a:t>
+            </a:r>
+          </a:p>
+          <a:p>
+            <a:r>
+              <a:rPr lang="en-US" sz="1800" b="1" u="sng" dirty="0">
+                <a:solidFill>
+                  <a:srgbClr val="A88000"/>
+                </a:solidFill>
+              </a:rPr>
+              <a:t>Sprint #</a:t>
             </a:r>
             <a:r>
-              <a:rPr lang="en" sz="2400" u="sng" dirty="0">
+              <a:rPr lang="en-US" sz="1800" b="1" u="sng" dirty="0" smtClean="0">
                 <a:solidFill>
                   <a:srgbClr val="A88000"/>
                 </a:solidFill>
               </a:rPr>
-              <a:t>Service</a:t>
+              <a:t>3</a:t>
             </a:r>
+            <a:endParaRPr lang="en-US" sz="1800" b="1" u="sng" dirty="0">
+              <a:solidFill>
+                <a:srgbClr val="A88000"/>
+              </a:solidFill>
+            </a:endParaRPr>
           </a:p>
         </p:txBody>
       </p:sp>
       <p:sp>
         <p:nvSpPr>
-          <p:cNvPr id="139" name="Shape 139"/>
-          <p:cNvSpPr txBox="1">
-            <a:spLocks noGrp="1"/>
-          </p:cNvSpPr>
-          <p:nvPr>
-            <p:ph type="body" idx="1"/>
-          </p:nvPr>
+          <p:cNvPr id="5" name="TextBox 4"/>
+          <p:cNvSpPr txBox="1"/>
+          <p:nvPr/>
         </p:nvSpPr>
         <p:spPr>
           <a:xfrm>
-            <a:off x="457200" y="1600200"/>
-            <a:ext cx="8229600" cy="4967700"/>
+            <a:off x="600661" y="152400"/>
+            <a:ext cx="3139001" cy="553998"/>
           </a:xfrm>
           <a:prstGeom prst="rect">
             <a:avLst/>
           </a:prstGeom>
+          <a:noFill/>
         </p:spPr>
         <p:txBody>
-          <a:bodyPr lIns="91425" tIns="91425" rIns="91425" bIns="91425" anchor="t" anchorCtr="0">
+          <a:bodyPr wrap="none" rtlCol="0">
             <a:spAutoFit/>
           </a:bodyPr>
           <a:lstStyle/>
           <a:p>
-            <a:pPr marL="457200" lvl="0" indent="-419100" rtl="0">
-              <a:buClr>
-                <a:schemeClr val="dk1"/>
-              </a:buClr>
-              <a:buSzPct val="166666"/>
-              <a:buFont typeface="Arial"/>
-              <a:buChar char="•"/>
-            </a:pPr>
             <a:r>
-              <a:rPr lang="en"/>
-              <a:t>Controls feature navigation</a:t>
+              <a:rPr lang="en-US" sz="3000" b="1" dirty="0" smtClean="0">
+                <a:solidFill>
+                  <a:srgbClr val="A88000"/>
+                </a:solidFill>
+              </a:rPr>
+              <a:t>Sprint Planning </a:t>
             </a:r>
-          </a:p>
-          <a:p>
-            <a:pPr marL="914400" lvl="1" indent="-381000" rtl="0">
-              <a:buClr>
-                <a:schemeClr val="dk1"/>
-              </a:buClr>
-              <a:buSzPct val="80000"/>
-              <a:buFont typeface="Courier New"/>
-              <a:buChar char="o"/>
-            </a:pPr>
-            <a:r>
-              <a:rPr lang="en"/>
-              <a:t>Features are aspects of the site that make the site feel more polished</a:t>
-            </a:r>
-          </a:p>
-          <a:p>
-            <a:pPr marL="914400" lvl="1" indent="-381000">
-              <a:buClr>
-                <a:schemeClr val="dk1"/>
-              </a:buClr>
-              <a:buSzPct val="80000"/>
-              <a:buFont typeface="Courier New"/>
-              <a:buChar char="o"/>
-            </a:pPr>
-            <a:r>
-              <a:rPr lang="en"/>
-              <a:t>If features become complex, a new service can be created for the specific feature</a:t>
-            </a:r>
+            <a:endParaRPr lang="en-US" sz="3000" b="1" dirty="0">
+              <a:solidFill>
+                <a:srgbClr val="A88000"/>
+              </a:solidFill>
+            </a:endParaRPr>
           </a:p>
         </p:txBody>
       </p:sp>
     </p:spTree>
+    <p:extLst>
+      <p:ext uri="{BB962C8B-B14F-4D97-AF65-F5344CB8AC3E}">
+        <p14:creationId xmlns:p14="http://schemas.microsoft.com/office/powerpoint/2010/main" val="2007122357"/>
+      </p:ext>
+    </p:extLst>
   </p:cSld>
   <p:clrMapOvr>
     <a:masterClrMapping/>
   </p:clrMapOvr>
-  <p:transition xmlns:p14="http://schemas.microsoft.com/office/powerpoint/2010/main" spd="slow">
-    <p:cut/>
-  </p:transition>
   <p:timing>
     <p:tnLst>
       <p:par>
-        <p:cTn xmlns:p14="http://schemas.microsoft.com/office/powerpoint/2010/main" id="1" dur="indefinite" restart="never" nodeType="tmRoot"/>
+        <p:cTn id="1" dur="indefinite" restart="never" nodeType="tmRoot"/>
       </p:par>
     </p:tnLst>
   </p:timing>

</xml_diff>

<commit_message>
Added system components for design one. added pros and cons for design one.
</commit_message>
<xml_diff>
--- a/DesignPlans.pptx
+++ b/DesignPlans.pptx
@@ -5222,7 +5222,7 @@
         <p:spPr>
           <a:xfrm>
             <a:off x="457200" y="1600200"/>
-            <a:ext cx="8229600" cy="492412"/>
+            <a:ext cx="8229600" cy="2954625"/>
           </a:xfrm>
           <a:prstGeom prst="rect">
             <a:avLst/>
@@ -5234,7 +5234,7 @@
           </a:bodyPr>
           <a:lstStyle/>
           <a:p>
-            <a:pPr marL="457200" lvl="0" indent="-419100" algn="l" rtl="0">
+            <a:pPr marL="457200" lvl="0" indent="-419100" algn="l">
               <a:buClr>
                 <a:schemeClr val="dk1"/>
               </a:buClr>
@@ -5242,6 +5242,97 @@
               <a:buFont typeface="Arial"/>
               <a:buChar char="•"/>
             </a:pPr>
+            <a:r>
+              <a:rPr lang="en" sz="2000" dirty="0">
+                <a:solidFill>
+                  <a:srgbClr val="A88000"/>
+                </a:solidFill>
+              </a:rPr>
+              <a:t>Client side UI</a:t>
+            </a:r>
+          </a:p>
+          <a:p>
+            <a:pPr marL="914400" lvl="1" indent="-381000" algn="l">
+              <a:buClr>
+                <a:schemeClr val="dk1"/>
+              </a:buClr>
+              <a:buSzPct val="80000"/>
+              <a:buFont typeface="Courier New"/>
+              <a:buChar char="o"/>
+            </a:pPr>
+            <a:r>
+              <a:rPr lang="en" sz="2000" dirty="0"/>
+              <a:t>Client side application for interacting with user events</a:t>
+            </a:r>
+          </a:p>
+          <a:p>
+            <a:pPr marL="457200" lvl="0" indent="-419100" algn="l">
+              <a:buClr>
+                <a:schemeClr val="dk1"/>
+              </a:buClr>
+              <a:buSzPct val="166666"/>
+              <a:buFont typeface="Arial"/>
+              <a:buChar char="•"/>
+            </a:pPr>
+            <a:r>
+              <a:rPr lang="en" sz="2000" dirty="0" smtClean="0">
+                <a:solidFill>
+                  <a:srgbClr val="A88000"/>
+                </a:solidFill>
+              </a:rPr>
+              <a:t>Client side data objects</a:t>
+            </a:r>
+            <a:endParaRPr lang="en" sz="2000" dirty="0">
+              <a:solidFill>
+                <a:srgbClr val="A88000"/>
+              </a:solidFill>
+            </a:endParaRPr>
+          </a:p>
+          <a:p>
+            <a:pPr marL="914400" lvl="1" indent="-381000" algn="l">
+              <a:buClr>
+                <a:schemeClr val="dk1"/>
+              </a:buClr>
+              <a:buSzPct val="80000"/>
+              <a:buFont typeface="Courier New"/>
+              <a:buChar char="o"/>
+            </a:pPr>
+            <a:r>
+              <a:rPr lang="en" sz="2000" dirty="0" smtClean="0"/>
+              <a:t>Holds data for display and use for the Client side UI. Requests can be made to the server for data or to perform set operations on the data.</a:t>
+            </a:r>
+          </a:p>
+          <a:p>
+            <a:pPr marL="457200" lvl="0" indent="-419100" algn="l">
+              <a:buClr>
+                <a:schemeClr val="dk1"/>
+              </a:buClr>
+              <a:buSzPct val="166666"/>
+              <a:buFont typeface="Arial"/>
+              <a:buChar char="•"/>
+            </a:pPr>
+            <a:r>
+              <a:rPr lang="en" sz="2000" dirty="0" smtClean="0">
+                <a:solidFill>
+                  <a:srgbClr val="A88000"/>
+                </a:solidFill>
+              </a:rPr>
+              <a:t>Data handlers</a:t>
+            </a:r>
+          </a:p>
+          <a:p>
+            <a:pPr marL="914400" lvl="1" indent="-381000" algn="l">
+              <a:buClr>
+                <a:schemeClr val="dk1"/>
+              </a:buClr>
+              <a:buSzPct val="80000"/>
+              <a:buFont typeface="Courier New"/>
+              <a:buChar char="o"/>
+            </a:pPr>
+            <a:r>
+              <a:rPr lang="en" sz="2000" dirty="0" smtClean="0"/>
+              <a:t>Handles all data manipulation and fills out client side data objects on request.</a:t>
+            </a:r>
             <a:endParaRPr lang="en" sz="2000" dirty="0"/>
           </a:p>
         </p:txBody>
@@ -5351,8 +5442,8 @@
         </p:nvSpPr>
         <p:spPr>
           <a:xfrm>
-            <a:off x="278311" y="262575"/>
-            <a:ext cx="8541900" cy="1661963"/>
+            <a:off x="304800" y="304800"/>
+            <a:ext cx="8541900" cy="4247286"/>
           </a:xfrm>
           <a:prstGeom prst="rect">
             <a:avLst/>
@@ -5365,7 +5456,81 @@
           </a:bodyPr>
           <a:lstStyle/>
           <a:p>
-            <a:pPr marL="457200" lvl="0" indent="-457200" rtl="0">
+            <a:pPr marL="457200" lvl="0" indent="-457200">
+              <a:buClr>
+                <a:srgbClr val="000000"/>
+              </a:buClr>
+              <a:buSzPct val="166666"/>
+              <a:buFont typeface="Arial"/>
+              <a:buChar char="•"/>
+            </a:pPr>
+            <a:r>
+              <a:rPr lang="en" sz="3600" dirty="0">
+                <a:solidFill>
+                  <a:srgbClr val="FF0000"/>
+                </a:solidFill>
+              </a:rPr>
+              <a:t>Pros of </a:t>
+            </a:r>
+            <a:r>
+              <a:rPr lang="en" sz="3600" dirty="0" smtClean="0">
+                <a:solidFill>
+                  <a:srgbClr val="FF0000"/>
+                </a:solidFill>
+              </a:rPr>
+              <a:t>Design One</a:t>
+            </a:r>
+            <a:endParaRPr lang="en" sz="3600" dirty="0">
+              <a:solidFill>
+                <a:srgbClr val="FF0000"/>
+              </a:solidFill>
+            </a:endParaRPr>
+          </a:p>
+          <a:p>
+            <a:pPr marL="914400" lvl="1" indent="-457200">
+              <a:buClr>
+                <a:srgbClr val="000000"/>
+              </a:buClr>
+              <a:buSzPct val="150000"/>
+              <a:buFont typeface="Courier New"/>
+              <a:buChar char="o"/>
+            </a:pPr>
+            <a:r>
+              <a:rPr lang="en" sz="2400" dirty="0" smtClean="0"/>
+              <a:t>Modular design allows for the easy addition of new components.</a:t>
+            </a:r>
+          </a:p>
+          <a:p>
+            <a:pPr marL="914400" lvl="1" indent="-457200">
+              <a:buClr>
+                <a:srgbClr val="000000"/>
+              </a:buClr>
+              <a:buSzPct val="150000"/>
+              <a:buFont typeface="Courier New"/>
+              <a:buChar char="o"/>
+            </a:pPr>
+            <a:r>
+              <a:rPr lang="en" sz="2400" dirty="0" smtClean="0"/>
+              <a:t>Much of the work is done on the safely on the server.</a:t>
+            </a:r>
+          </a:p>
+          <a:p>
+            <a:pPr marL="914400" lvl="1" indent="-457200">
+              <a:buClr>
+                <a:srgbClr val="000000"/>
+              </a:buClr>
+              <a:buSzPct val="150000"/>
+              <a:buFont typeface="Courier New"/>
+              <a:buChar char="o"/>
+            </a:pPr>
+            <a:r>
+              <a:rPr lang="en" sz="2400" dirty="0" smtClean="0"/>
+              <a:t>When a change is made to the server-side, old clients won’t stop working.</a:t>
+            </a:r>
+            <a:endParaRPr lang="en" sz="2400" dirty="0"/>
+          </a:p>
+          <a:p>
+            <a:pPr marL="457200" lvl="0" indent="-457200">
               <a:buClr>
                 <a:srgbClr val="000000"/>
               </a:buClr>
@@ -5379,34 +5544,30 @@
                   <a:srgbClr val="FF0000"/>
                 </a:solidFill>
               </a:rPr>
-              <a:t>Pros of Design One</a:t>
+              <a:t>Cons </a:t>
             </a:r>
-            <a:endParaRPr lang="en" sz="3600" dirty="0">
-              <a:solidFill>
-                <a:srgbClr val="FF0000"/>
-              </a:solidFill>
-            </a:endParaRPr>
-          </a:p>
-          <a:p>
-            <a:pPr marL="457200" lvl="0" indent="-457200" rtl="0">
+            <a:r>
+              <a:rPr lang="en" sz="3600" dirty="0">
+                <a:solidFill>
+                  <a:srgbClr val="FF0000"/>
+                </a:solidFill>
+              </a:rPr>
+              <a:t>of Design One</a:t>
+            </a:r>
+          </a:p>
+          <a:p>
+            <a:pPr marL="914400" lvl="1" indent="-457200">
               <a:buClr>
                 <a:srgbClr val="000000"/>
               </a:buClr>
-              <a:buSzPct val="166666"/>
-              <a:buFont typeface="Arial"/>
-              <a:buChar char="•"/>
+              <a:buSzPct val="150000"/>
+              <a:buFont typeface="Courier New"/>
+              <a:buChar char="o"/>
             </a:pPr>
             <a:r>
-              <a:rPr lang="en" sz="3600" dirty="0" smtClean="0">
-                <a:solidFill>
-                  <a:srgbClr val="FF0000"/>
-                </a:solidFill>
-              </a:rPr>
-              <a:t>Cons of Design One</a:t>
+              <a:rPr lang="en" sz="2400" dirty="0" smtClean="0"/>
+              <a:t>Portibility of server communication low due because of a lack of using a restfull interface or webservice structrure.</a:t>
             </a:r>
-          </a:p>
-          <a:p>
-            <a:endParaRPr lang="en" sz="2400" dirty="0"/>
           </a:p>
         </p:txBody>
       </p:sp>
@@ -5534,21 +5695,8 @@
                   <a:schemeClr val="bg1"/>
                 </a:solidFill>
               </a:rPr>
-              <a:t>Design </a:t>
+              <a:t>Design TWO</a:t>
             </a:r>
-            <a:r>
-              <a:rPr lang="en-US" sz="3200" b="1" dirty="0" smtClean="0">
-                <a:solidFill>
-                  <a:schemeClr val="bg1"/>
-                </a:solidFill>
-              </a:rPr>
-              <a:t>TWO</a:t>
-            </a:r>
-            <a:endParaRPr lang="en-US" sz="3200" b="1" dirty="0" smtClean="0">
-              <a:solidFill>
-                <a:schemeClr val="bg1"/>
-              </a:solidFill>
-            </a:endParaRPr>
           </a:p>
           <a:p>
             <a:endParaRPr lang="en-US" dirty="0"/>

</xml_diff>

<commit_message>
A likely finished PPT for our presentation
Email the group what you think.
</commit_message>
<xml_diff>
--- a/DesignPlans.pptx
+++ b/DesignPlans.pptx
@@ -3907,8 +3907,8 @@
         </p:nvSpPr>
         <p:spPr>
           <a:xfrm>
-            <a:off x="762000" y="1752600"/>
-            <a:ext cx="6705600" cy="2092881"/>
+            <a:off x="1371600" y="1066800"/>
+            <a:ext cx="6705600" cy="3631763"/>
           </a:xfrm>
           <a:prstGeom prst="rect">
             <a:avLst/>
@@ -3921,16 +3921,24 @@
           <a:lstStyle/>
           <a:p>
             <a:r>
-              <a:rPr lang="en-US" sz="3000" b="1" dirty="0">
+              <a:rPr lang="en-US" sz="3000" b="1" dirty="0" smtClean="0">
                 <a:solidFill>
                   <a:srgbClr val="A88000"/>
                 </a:solidFill>
               </a:rPr>
-              <a:t>Roles</a:t>
+              <a:t>	   </a:t>
+            </a:r>
+            <a:r>
+              <a:rPr lang="en-US" sz="3000" b="1" dirty="0" smtClean="0">
+                <a:solidFill>
+                  <a:srgbClr val="FF0000"/>
+                </a:solidFill>
+              </a:rPr>
+              <a:t>Member Roles</a:t>
             </a:r>
             <a:endParaRPr lang="en-US" sz="3000" dirty="0">
               <a:solidFill>
-                <a:srgbClr val="A88000"/>
+                <a:srgbClr val="FF0000"/>
               </a:solidFill>
             </a:endParaRPr>
           </a:p>
@@ -3938,32 +3946,72 @@
             <a:endParaRPr lang="en-US" sz="2000" b="1" dirty="0" smtClean="0"/>
           </a:p>
           <a:p>
+            <a:endParaRPr lang="en-US" sz="2000" b="1" dirty="0" smtClean="0"/>
+          </a:p>
+          <a:p>
             <a:r>
               <a:rPr lang="en-US" sz="2000" b="1" dirty="0" smtClean="0"/>
-              <a:t>Erik: </a:t>
-            </a:r>
+              <a:t>Member 1 (Erik): </a:t>
+            </a:r>
+            <a:r>
+              <a:rPr lang="en-US" sz="2000" dirty="0"/>
+              <a:t>user interface, </a:t>
+            </a:r>
+            <a:r>
+              <a:rPr lang="en-US" sz="2000" dirty="0" smtClean="0"/>
+              <a:t>programming</a:t>
+            </a:r>
+          </a:p>
+          <a:p>
+            <a:endParaRPr lang="en-US" sz="2000" dirty="0"/>
           </a:p>
           <a:p>
             <a:r>
               <a:rPr lang="en-US" sz="2000" b="1" dirty="0" smtClean="0"/>
-              <a:t>Jacob: </a:t>
-            </a:r>
+              <a:t>Member 2 (Jacob): </a:t>
+            </a:r>
+            <a:r>
+              <a:rPr lang="en-US" sz="2000" dirty="0"/>
+              <a:t>main </a:t>
+            </a:r>
+            <a:r>
+              <a:rPr lang="en-US" sz="2000" dirty="0" smtClean="0"/>
+              <a:t>engine, programming</a:t>
+            </a:r>
+            <a:endParaRPr lang="en-US" sz="2000" dirty="0"/>
+          </a:p>
+          <a:p>
+            <a:endParaRPr lang="en-US" sz="2000" b="1" dirty="0" smtClean="0"/>
           </a:p>
           <a:p>
             <a:r>
               <a:rPr lang="en-US" sz="2000" b="1" dirty="0" smtClean="0"/>
-              <a:t>Ken: </a:t>
-            </a:r>
+              <a:t>Member 3 (Ken: </a:t>
+            </a:r>
+            <a:r>
+              <a:rPr lang="en-US" sz="2000" dirty="0"/>
+              <a:t>database, interface layer, engine </a:t>
+            </a:r>
+          </a:p>
+          <a:p>
+            <a:endParaRPr lang="en-US" sz="2000" b="1" dirty="0" smtClean="0"/>
           </a:p>
           <a:p>
             <a:r>
               <a:rPr lang="en-US" sz="2000" b="1" dirty="0" smtClean="0"/>
-              <a:t>Thaddeus: </a:t>
-            </a:r>
-            <a:r>
-              <a:rPr lang="en-US" dirty="0"/>
+              <a:t>Member 4 (T.J.): </a:t>
+            </a:r>
+            <a:r>
+              <a:rPr lang="en-US" sz="2000" dirty="0"/>
+              <a:t>database creation and management </a:t>
+            </a:r>
+          </a:p>
+          <a:p>
+            <a:r>
+              <a:rPr lang="en-US" sz="2000" dirty="0"/>
               <a:t> </a:t>
             </a:r>
+            <a:endParaRPr lang="en-US" sz="2000" dirty="0"/>
           </a:p>
         </p:txBody>
       </p:sp>
@@ -4052,7 +4100,7 @@
         </p:nvCxnSpPr>
         <p:spPr>
           <a:xfrm flipH="1">
-            <a:off x="5363550" y="1606123"/>
+            <a:off x="5668350" y="1987123"/>
             <a:ext cx="186150" cy="1594277"/>
           </a:xfrm>
           <a:prstGeom prst="straightConnector1">
@@ -4078,7 +4126,7 @@
         </p:nvSpPr>
         <p:spPr>
           <a:xfrm>
-            <a:off x="3048000" y="3200400"/>
+            <a:off x="3352800" y="3581400"/>
             <a:ext cx="1345799" cy="400079"/>
           </a:xfrm>
           <a:prstGeom prst="rect">
@@ -4122,7 +4170,7 @@
         </p:nvSpPr>
         <p:spPr>
           <a:xfrm>
-            <a:off x="70354" y="3200400"/>
+            <a:off x="375154" y="3581400"/>
             <a:ext cx="1176300" cy="400079"/>
           </a:xfrm>
           <a:prstGeom prst="rect">
@@ -4166,7 +4214,7 @@
         </p:nvSpPr>
         <p:spPr>
           <a:xfrm>
-            <a:off x="1524000" y="3200400"/>
+            <a:off x="1828800" y="3581400"/>
             <a:ext cx="1253400" cy="400079"/>
           </a:xfrm>
           <a:prstGeom prst="rect">
@@ -4195,8 +4243,8 @@
               <a:buNone/>
             </a:pPr>
             <a:r>
-              <a:rPr lang="en-US" dirty="0" err="1" smtClean="0"/>
-              <a:t>WorkOrders</a:t>
+              <a:rPr lang="en-US" dirty="0" smtClean="0"/>
+              <a:t>Work Orders</a:t>
             </a:r>
             <a:endParaRPr lang="en" dirty="0"/>
           </a:p>
@@ -4210,7 +4258,7 @@
         </p:nvSpPr>
         <p:spPr>
           <a:xfrm>
-            <a:off x="7055645" y="794494"/>
+            <a:off x="7360445" y="1175494"/>
             <a:ext cx="1837199" cy="393299"/>
           </a:xfrm>
           <a:prstGeom prst="can">
@@ -4249,7 +4297,7 @@
         </p:nvSpPr>
         <p:spPr>
           <a:xfrm>
-            <a:off x="7086600" y="533400"/>
+            <a:off x="7391400" y="914400"/>
             <a:ext cx="1837199" cy="393299"/>
           </a:xfrm>
           <a:prstGeom prst="can">
@@ -4288,7 +4336,7 @@
         </p:nvSpPr>
         <p:spPr>
           <a:xfrm>
-            <a:off x="7086600" y="317907"/>
+            <a:off x="7391400" y="698907"/>
             <a:ext cx="1837199" cy="393299"/>
           </a:xfrm>
           <a:prstGeom prst="can">
@@ -4330,7 +4378,7 @@
         </p:nvCxnSpPr>
         <p:spPr>
           <a:xfrm>
-            <a:off x="70354" y="3400440"/>
+            <a:off x="375154" y="3781440"/>
             <a:ext cx="0" cy="0"/>
           </a:xfrm>
           <a:prstGeom prst="straightConnector1">
@@ -4353,13 +4401,12 @@
           <p:cNvPr id="36" name="Shape 36"/>
           <p:cNvCxnSpPr>
             <a:stCxn id="37" idx="0"/>
-            <a:endCxn id="88" idx="1"/>
           </p:cNvCxnSpPr>
           <p:nvPr/>
         </p:nvCxnSpPr>
         <p:spPr>
           <a:xfrm flipV="1">
-            <a:off x="740550" y="200040"/>
+            <a:off x="1045350" y="581040"/>
             <a:ext cx="2231250" cy="866760"/>
           </a:xfrm>
           <a:prstGeom prst="straightConnector1">
@@ -4380,16 +4427,13 @@
       <p:cxnSp>
         <p:nvCxnSpPr>
           <p:cNvPr id="39" name="Shape 39"/>
-          <p:cNvCxnSpPr>
-            <a:stCxn id="88" idx="2"/>
-            <a:endCxn id="40" idx="0"/>
-          </p:cNvCxnSpPr>
+          <p:cNvCxnSpPr/>
           <p:nvPr/>
         </p:nvCxnSpPr>
         <p:spPr>
           <a:xfrm flipH="1">
-            <a:off x="2303100" y="400079"/>
-            <a:ext cx="1341600" cy="648460"/>
+            <a:off x="2607900" y="664809"/>
+            <a:ext cx="1323095" cy="751627"/>
           </a:xfrm>
           <a:prstGeom prst="straightConnector1">
             <a:avLst/>
@@ -4417,8 +4461,8 @@
         </p:nvCxnSpPr>
         <p:spPr>
           <a:xfrm>
-            <a:off x="3644700" y="400079"/>
-            <a:ext cx="228600" cy="590521"/>
+            <a:off x="3984639" y="646139"/>
+            <a:ext cx="193461" cy="725461"/>
           </a:xfrm>
           <a:prstGeom prst="straightConnector1">
             <a:avLst/>
@@ -4443,7 +4487,7 @@
         </p:nvSpPr>
         <p:spPr>
           <a:xfrm>
-            <a:off x="7513499" y="402680"/>
+            <a:off x="7818299" y="783680"/>
             <a:ext cx="983400" cy="346799"/>
           </a:xfrm>
           <a:prstGeom prst="rect">
@@ -4471,14 +4515,13 @@
         <p:nvCxnSpPr>
           <p:cNvPr id="45" name="Shape 45"/>
           <p:cNvCxnSpPr>
-            <a:stCxn id="88" idx="3"/>
             <a:endCxn id="33" idx="2"/>
           </p:cNvCxnSpPr>
           <p:nvPr/>
         </p:nvCxnSpPr>
         <p:spPr>
           <a:xfrm>
-            <a:off x="4317599" y="200040"/>
+            <a:off x="4622399" y="581040"/>
             <a:ext cx="2769001" cy="530010"/>
           </a:xfrm>
           <a:prstGeom prst="straightConnector1">
@@ -4504,7 +4547,7 @@
         </p:nvSpPr>
         <p:spPr>
           <a:xfrm>
-            <a:off x="3200400" y="990600"/>
+            <a:off x="3505200" y="1371600"/>
             <a:ext cx="1345799" cy="615523"/>
           </a:xfrm>
           <a:prstGeom prst="rect">
@@ -4548,7 +4591,7 @@
         </p:nvSpPr>
         <p:spPr>
           <a:xfrm>
-            <a:off x="152400" y="1066800"/>
+            <a:off x="457200" y="1447800"/>
             <a:ext cx="1176300" cy="615523"/>
           </a:xfrm>
           <a:prstGeom prst="rect">
@@ -4601,7 +4644,7 @@
         </p:nvSpPr>
         <p:spPr>
           <a:xfrm>
-            <a:off x="1676400" y="1048539"/>
+            <a:off x="1981200" y="1429539"/>
             <a:ext cx="1253400" cy="615523"/>
           </a:xfrm>
           <a:prstGeom prst="rect">
@@ -4630,12 +4673,12 @@
               <a:buNone/>
             </a:pPr>
             <a:r>
-              <a:rPr lang="en-US" dirty="0" err="1" smtClean="0"/>
-              <a:t>WorkOrder</a:t>
-            </a:r>
-            <a:r>
               <a:rPr lang="en-US" dirty="0" smtClean="0"/>
-              <a:t> Resource</a:t>
+              <a:t>Work Order </a:t>
+            </a:r>
+            <a:r>
+              <a:rPr lang="en-US" dirty="0" smtClean="0"/>
+              <a:t>Resource</a:t>
             </a:r>
           </a:p>
         </p:txBody>
@@ -4651,7 +4694,7 @@
         </p:nvCxnSpPr>
         <p:spPr>
           <a:xfrm>
-            <a:off x="152400" y="1374562"/>
+            <a:off x="457200" y="1755562"/>
             <a:ext cx="0" cy="0"/>
           </a:xfrm>
           <a:prstGeom prst="straightConnector1">
@@ -4680,7 +4723,7 @@
         </p:nvCxnSpPr>
         <p:spPr>
           <a:xfrm flipH="1">
-            <a:off x="658504" y="1682323"/>
+            <a:off x="963304" y="2063323"/>
             <a:ext cx="82046" cy="1518077"/>
           </a:xfrm>
           <a:prstGeom prst="straightConnector1">
@@ -4709,7 +4752,7 @@
         </p:nvCxnSpPr>
         <p:spPr>
           <a:xfrm flipH="1">
-            <a:off x="2150700" y="1664062"/>
+            <a:off x="2455500" y="2045062"/>
             <a:ext cx="152400" cy="1536338"/>
           </a:xfrm>
           <a:prstGeom prst="straightConnector1">
@@ -4738,7 +4781,7 @@
         </p:nvCxnSpPr>
         <p:spPr>
           <a:xfrm flipH="1">
-            <a:off x="3720900" y="1606123"/>
+            <a:off x="4025700" y="1987123"/>
             <a:ext cx="152400" cy="1594277"/>
           </a:xfrm>
           <a:prstGeom prst="straightConnector1">
@@ -4764,7 +4807,7 @@
         </p:nvSpPr>
         <p:spPr>
           <a:xfrm>
-            <a:off x="0" y="2362200"/>
+            <a:off x="304800" y="2743200"/>
             <a:ext cx="6248400" cy="444650"/>
           </a:xfrm>
           <a:prstGeom prst="roundRect">
@@ -4809,7 +4852,7 @@
         </p:nvSpPr>
         <p:spPr>
           <a:xfrm>
-            <a:off x="2151640" y="4231100"/>
+            <a:off x="2456440" y="4612100"/>
             <a:ext cx="1278299" cy="631800"/>
           </a:xfrm>
           <a:prstGeom prst="rect">
@@ -4855,7 +4898,7 @@
         </p:nvCxnSpPr>
         <p:spPr>
           <a:xfrm flipH="1" flipV="1">
-            <a:off x="658504" y="3600479"/>
+            <a:off x="963304" y="3981479"/>
             <a:ext cx="1493136" cy="946521"/>
           </a:xfrm>
           <a:prstGeom prst="straightConnector1">
@@ -4884,7 +4927,7 @@
         </p:nvCxnSpPr>
         <p:spPr>
           <a:xfrm flipH="1" flipV="1">
-            <a:off x="2150700" y="3600479"/>
+            <a:off x="2455500" y="3981479"/>
             <a:ext cx="640090" cy="630621"/>
           </a:xfrm>
           <a:prstGeom prst="straightConnector1">
@@ -4912,7 +4955,7 @@
         </p:nvCxnSpPr>
         <p:spPr>
           <a:xfrm flipV="1">
-            <a:off x="2790790" y="3581401"/>
+            <a:off x="3095590" y="3962401"/>
             <a:ext cx="929171" cy="649699"/>
           </a:xfrm>
           <a:prstGeom prst="straightConnector1">
@@ -4938,7 +4981,7 @@
         </p:nvSpPr>
         <p:spPr>
           <a:xfrm>
-            <a:off x="4724400" y="3200400"/>
+            <a:off x="5029200" y="3581400"/>
             <a:ext cx="1278299" cy="400079"/>
           </a:xfrm>
           <a:prstGeom prst="rect">
@@ -4985,7 +5028,7 @@
         </p:nvCxnSpPr>
         <p:spPr>
           <a:xfrm flipV="1">
-            <a:off x="3429939" y="3600479"/>
+            <a:off x="3734739" y="3981479"/>
             <a:ext cx="1933611" cy="946521"/>
           </a:xfrm>
           <a:prstGeom prst="straightConnector1">
@@ -5011,7 +5054,7 @@
         </p:nvSpPr>
         <p:spPr>
           <a:xfrm>
-            <a:off x="4876800" y="990600"/>
+            <a:off x="5181600" y="1371600"/>
             <a:ext cx="1345799" cy="615523"/>
           </a:xfrm>
           <a:prstGeom prst="rect">
@@ -5057,8 +5100,8 @@
         </p:nvCxnSpPr>
         <p:spPr>
           <a:xfrm>
-            <a:off x="4114800" y="381000"/>
-            <a:ext cx="1434900" cy="609600"/>
+            <a:off x="4089845" y="698907"/>
+            <a:ext cx="1764655" cy="672693"/>
           </a:xfrm>
           <a:prstGeom prst="straightConnector1">
             <a:avLst/>
@@ -5083,7 +5126,7 @@
         </p:nvSpPr>
         <p:spPr>
           <a:xfrm>
-            <a:off x="2971800" y="0"/>
+            <a:off x="3311739" y="246060"/>
             <a:ext cx="1345799" cy="400079"/>
           </a:xfrm>
           <a:prstGeom prst="rect">
@@ -5127,7 +5170,7 @@
         </p:nvSpPr>
         <p:spPr>
           <a:xfrm>
-            <a:off x="4800600" y="5029200"/>
+            <a:off x="5105400" y="5410200"/>
             <a:ext cx="3810000" cy="800219"/>
           </a:xfrm>
           <a:prstGeom prst="rect">
@@ -7245,7 +7288,7 @@
         </p:nvSpPr>
         <p:spPr>
           <a:xfrm>
-            <a:off x="381000" y="485001"/>
+            <a:off x="1115339" y="762000"/>
             <a:ext cx="6470041" cy="553998"/>
           </a:xfrm>
           <a:prstGeom prst="rect">
@@ -7262,16 +7305,135 @@
             <a:r>
               <a:rPr lang="en-US" sz="3000" b="1" dirty="0" smtClean="0">
                 <a:solidFill>
-                  <a:srgbClr val="A88000"/>
+                  <a:srgbClr val="FF0000"/>
                 </a:solidFill>
               </a:rPr>
               <a:t>Reasons for Selecting Design One</a:t>
             </a:r>
             <a:endParaRPr lang="en-US" sz="3000" b="1" dirty="0">
               <a:solidFill>
-                <a:srgbClr val="A88000"/>
+                <a:srgbClr val="FF0000"/>
               </a:solidFill>
             </a:endParaRPr>
+          </a:p>
+        </p:txBody>
+      </p:sp>
+      <p:sp>
+        <p:nvSpPr>
+          <p:cNvPr id="3" name="Rectangle 2"/>
+          <p:cNvSpPr/>
+          <p:nvPr/>
+        </p:nvSpPr>
+        <p:spPr>
+          <a:xfrm>
+            <a:off x="914400" y="2057400"/>
+            <a:ext cx="7162800" cy="3785652"/>
+          </a:xfrm>
+          <a:prstGeom prst="rect">
+            <a:avLst/>
+          </a:prstGeom>
+        </p:spPr>
+        <p:txBody>
+          <a:bodyPr wrap="square">
+            <a:spAutoFit/>
+          </a:bodyPr>
+          <a:lstStyle/>
+          <a:p>
+            <a:pPr marL="914400" lvl="1" indent="-457200">
+              <a:buClr>
+                <a:srgbClr val="000000"/>
+              </a:buClr>
+              <a:buSzPct val="150000"/>
+              <a:buFont typeface="Courier New"/>
+              <a:buChar char="o"/>
+            </a:pPr>
+            <a:r>
+              <a:rPr lang="en" sz="2400" dirty="0" smtClean="0"/>
+              <a:t>Our Modular </a:t>
+            </a:r>
+            <a:r>
+              <a:rPr lang="en" sz="2400" dirty="0"/>
+              <a:t>design allows for the easy addition of new components</a:t>
+            </a:r>
+            <a:r>
+              <a:rPr lang="en" sz="2400" dirty="0" smtClean="0"/>
+              <a:t>.</a:t>
+            </a:r>
+          </a:p>
+          <a:p>
+            <a:pPr marL="457200" lvl="1">
+              <a:buClr>
+                <a:srgbClr val="000000"/>
+              </a:buClr>
+              <a:buSzPct val="150000"/>
+            </a:pPr>
+            <a:endParaRPr lang="en" sz="2400" dirty="0"/>
+          </a:p>
+          <a:p>
+            <a:pPr marL="914400" lvl="1" indent="-457200">
+              <a:buClr>
+                <a:srgbClr val="000000"/>
+              </a:buClr>
+              <a:buSzPct val="150000"/>
+              <a:buFont typeface="Courier New"/>
+              <a:buChar char="o"/>
+            </a:pPr>
+            <a:r>
+              <a:rPr lang="en-US" sz="2400" dirty="0" smtClean="0"/>
+              <a:t>T</a:t>
+            </a:r>
+            <a:r>
+              <a:rPr lang="en" sz="2400" dirty="0" smtClean="0"/>
+              <a:t>he majority of the work </a:t>
+            </a:r>
+            <a:r>
+              <a:rPr lang="en" sz="2400" dirty="0"/>
+              <a:t>is done on the safely on the server</a:t>
+            </a:r>
+            <a:r>
+              <a:rPr lang="en" sz="2400" dirty="0" smtClean="0"/>
+              <a:t>.</a:t>
+            </a:r>
+          </a:p>
+          <a:p>
+            <a:pPr marL="457200" lvl="1">
+              <a:buClr>
+                <a:srgbClr val="000000"/>
+              </a:buClr>
+              <a:buSzPct val="150000"/>
+            </a:pPr>
+            <a:endParaRPr lang="en" sz="2400" dirty="0"/>
+          </a:p>
+          <a:p>
+            <a:pPr marL="914400" lvl="1" indent="-457200">
+              <a:buClr>
+                <a:srgbClr val="000000"/>
+              </a:buClr>
+              <a:buSzPct val="150000"/>
+              <a:buFont typeface="Courier New"/>
+              <a:buChar char="o"/>
+            </a:pPr>
+            <a:r>
+              <a:rPr lang="en" sz="2400" dirty="0" smtClean="0"/>
+              <a:t>Because of our design choice, when </a:t>
+            </a:r>
+            <a:r>
+              <a:rPr lang="en" sz="2400" dirty="0"/>
+              <a:t>a change is made to the server-side, </a:t>
+            </a:r>
+            <a:r>
+              <a:rPr lang="en" sz="2400" dirty="0" smtClean="0"/>
+              <a:t>old/current </a:t>
+            </a:r>
+            <a:r>
+              <a:rPr lang="en" sz="2400" dirty="0"/>
+              <a:t>clients won’t </a:t>
+            </a:r>
+            <a:r>
+              <a:rPr lang="en" sz="2400" dirty="0" smtClean="0"/>
+              <a:t>come into issues with their work.</a:t>
+            </a:r>
+            <a:endParaRPr lang="en" sz="2400" dirty="0"/>
           </a:p>
         </p:txBody>
       </p:sp>
@@ -7311,8 +7473,8 @@
         </p:nvSpPr>
         <p:spPr>
           <a:xfrm>
-            <a:off x="914400" y="609600"/>
-            <a:ext cx="6019800" cy="1754326"/>
+            <a:off x="990600" y="914400"/>
+            <a:ext cx="6858000" cy="5355312"/>
           </a:xfrm>
           <a:prstGeom prst="rect">
             <a:avLst/>
@@ -7345,6 +7507,78 @@
             </a:endParaRPr>
           </a:p>
           <a:p>
+            <a:pPr marL="579438" lvl="2" indent="-285750">
+              <a:buFont typeface="Arial" panose="020B0604020202020204" pitchFamily="34" charset="0"/>
+              <a:buChar char="•"/>
+            </a:pPr>
+            <a:r>
+              <a:rPr lang="en-US" sz="1800" dirty="0"/>
+              <a:t>Register </a:t>
+            </a:r>
+            <a:r>
+              <a:rPr lang="en-US" sz="1800" dirty="0" smtClean="0"/>
+              <a:t>User/Manager </a:t>
+            </a:r>
+            <a:r>
+              <a:rPr lang="en-US" sz="1800" dirty="0"/>
+              <a:t>accounts</a:t>
+            </a:r>
+          </a:p>
+          <a:p>
+            <a:pPr marL="579438" lvl="2" indent="-285750">
+              <a:buFont typeface="Arial" panose="020B0604020202020204" pitchFamily="34" charset="0"/>
+              <a:buChar char="•"/>
+            </a:pPr>
+            <a:r>
+              <a:rPr lang="en-US" sz="1800" dirty="0"/>
+              <a:t>Log </a:t>
+            </a:r>
+            <a:r>
+              <a:rPr lang="en-US" sz="1800" dirty="0" smtClean="0"/>
+              <a:t>into system as User account</a:t>
+            </a:r>
+          </a:p>
+          <a:p>
+            <a:pPr marL="579438" lvl="2" indent="-285750">
+              <a:buFont typeface="Arial" panose="020B0604020202020204" pitchFamily="34" charset="0"/>
+              <a:buChar char="•"/>
+            </a:pPr>
+            <a:r>
+              <a:rPr lang="en-US" sz="1800" dirty="0" smtClean="0"/>
+              <a:t>Log into system as Manager account </a:t>
+            </a:r>
+            <a:endParaRPr lang="en-US" sz="1800" dirty="0"/>
+          </a:p>
+          <a:p>
+            <a:pPr marL="579438" lvl="2" indent="-285750">
+              <a:buFont typeface="Arial" panose="020B0604020202020204" pitchFamily="34" charset="0"/>
+              <a:buChar char="•"/>
+            </a:pPr>
+            <a:r>
+              <a:rPr lang="en-US" sz="1800" dirty="0"/>
+              <a:t>Manage U</a:t>
+            </a:r>
+            <a:r>
+              <a:rPr lang="en-US" sz="1800" dirty="0" smtClean="0"/>
+              <a:t>ser/Manager account</a:t>
+            </a:r>
+            <a:endParaRPr lang="en-US" sz="1800" dirty="0"/>
+          </a:p>
+          <a:p>
+            <a:pPr marL="579438" lvl="2" indent="-285750">
+              <a:buFont typeface="Arial" panose="020B0604020202020204" pitchFamily="34" charset="0"/>
+              <a:buChar char="•"/>
+            </a:pPr>
+            <a:r>
+              <a:rPr lang="en-US" sz="1800" dirty="0" smtClean="0"/>
+              <a:t>Navigate between </a:t>
+            </a:r>
+            <a:r>
+              <a:rPr lang="en-US" sz="1800" dirty="0"/>
+              <a:t>application components</a:t>
+            </a:r>
+          </a:p>
+          <a:p>
             <a:r>
               <a:rPr lang="en-US" sz="1800" dirty="0"/>
               <a:t> </a:t>
@@ -7366,6 +7600,38 @@
             </a:endParaRPr>
           </a:p>
           <a:p>
+            <a:pPr marL="579438" lvl="2" indent="-285750">
+              <a:buFont typeface="Arial" panose="020B0604020202020204" pitchFamily="34" charset="0"/>
+              <a:buChar char="•"/>
+            </a:pPr>
+            <a:r>
+              <a:rPr lang="en-US" sz="1800" dirty="0"/>
+              <a:t>Create, update, and delete work orders</a:t>
+            </a:r>
+          </a:p>
+          <a:p>
+            <a:pPr marL="579438" lvl="0" indent="-285750">
+              <a:buFont typeface="Arial" panose="020B0604020202020204" pitchFamily="34" charset="0"/>
+              <a:buChar char="•"/>
+            </a:pPr>
+            <a:r>
+              <a:rPr lang="en-US" sz="1800" dirty="0" smtClean="0"/>
+              <a:t>Property record system </a:t>
+            </a:r>
+            <a:endParaRPr lang="en-US" sz="1800" dirty="0"/>
+          </a:p>
+          <a:p>
+            <a:pPr marL="579438" lvl="0" indent="-285750">
+              <a:buFont typeface="Arial" panose="020B0604020202020204" pitchFamily="34" charset="0"/>
+              <a:buChar char="•"/>
+            </a:pPr>
+            <a:r>
+              <a:rPr lang="en-US" sz="1800" dirty="0" smtClean="0"/>
+              <a:t>Property management functionality </a:t>
+            </a:r>
+            <a:endParaRPr lang="en-US" sz="1800" dirty="0"/>
+          </a:p>
+          <a:p>
             <a:r>
               <a:rPr lang="en-US" sz="1800" dirty="0"/>
               <a:t> </a:t>
@@ -7378,21 +7644,53 @@
                   <a:srgbClr val="A88000"/>
                 </a:solidFill>
               </a:rPr>
-              <a:t>Sprint #</a:t>
-            </a:r>
-            <a:r>
-              <a:rPr lang="en-US" sz="1800" b="1" u="sng" dirty="0" smtClean="0">
-                <a:solidFill>
-                  <a:srgbClr val="A88000"/>
-                </a:solidFill>
-              </a:rPr>
-              <a:t>3</a:t>
-            </a:r>
-            <a:endParaRPr lang="en-US" sz="1800" b="1" u="sng" dirty="0">
-              <a:solidFill>
-                <a:srgbClr val="A88000"/>
-              </a:solidFill>
-            </a:endParaRPr>
+              <a:t>Sprint #3</a:t>
+            </a:r>
+          </a:p>
+          <a:p>
+            <a:pPr marL="579438" lvl="0" indent="-285750">
+              <a:buFont typeface="Arial" panose="020B0604020202020204" pitchFamily="34" charset="0"/>
+              <a:buChar char="•"/>
+            </a:pPr>
+            <a:r>
+              <a:rPr lang="en-US" sz="1800" dirty="0" smtClean="0"/>
+              <a:t>Contact management system</a:t>
+            </a:r>
+          </a:p>
+          <a:p>
+            <a:pPr marL="579438" lvl="0" indent="-285750">
+              <a:buFont typeface="Arial" panose="020B0604020202020204" pitchFamily="34" charset="0"/>
+              <a:buChar char="•"/>
+            </a:pPr>
+            <a:r>
+              <a:rPr lang="en-US" sz="1800" dirty="0" smtClean="0"/>
+              <a:t>SMS text message functionality</a:t>
+            </a:r>
+          </a:p>
+          <a:p>
+            <a:pPr marL="579438" lvl="0" indent="-285750">
+              <a:buFont typeface="Arial" panose="020B0604020202020204" pitchFamily="34" charset="0"/>
+              <a:buChar char="•"/>
+            </a:pPr>
+            <a:r>
+              <a:rPr lang="en-US" sz="1800" dirty="0" smtClean="0"/>
+              <a:t>Reporting directory and functionality </a:t>
+            </a:r>
+            <a:endParaRPr lang="en-US" sz="1800" dirty="0"/>
+          </a:p>
+          <a:p>
+            <a:pPr marL="579438" lvl="0" indent="-285750">
+              <a:buFont typeface="Arial" panose="020B0604020202020204" pitchFamily="34" charset="0"/>
+              <a:buChar char="•"/>
+            </a:pPr>
+            <a:r>
+              <a:rPr lang="en-US" sz="1800" dirty="0"/>
+              <a:t>Look and feel</a:t>
+            </a:r>
+          </a:p>
+          <a:p>
+            <a:pPr marL="293688" lvl="0"/>
+            <a:endParaRPr lang="en-US" sz="1800" dirty="0"/>
           </a:p>
         </p:txBody>
       </p:sp>
@@ -7404,7 +7702,7 @@
         </p:nvSpPr>
         <p:spPr>
           <a:xfrm>
-            <a:off x="600661" y="152400"/>
+            <a:off x="1143000" y="360402"/>
             <a:ext cx="3139001" cy="553998"/>
           </a:xfrm>
           <a:prstGeom prst="rect">

</xml_diff>

<commit_message>
Added additional reason for choosing design one. Minutes
</commit_message>
<xml_diff>
--- a/DesignPlans.pptx
+++ b/DesignPlans.pptx
@@ -7322,7 +7322,7 @@
         <p:spPr>
           <a:xfrm>
             <a:off x="914400" y="2057400"/>
-            <a:ext cx="7162800" cy="3785652"/>
+            <a:ext cx="7162800" cy="4524315"/>
           </a:xfrm>
           <a:prstGeom prst="rect">
             <a:avLst/>
@@ -7426,7 +7426,36 @@
             </a:r>
             <a:r>
               <a:rPr lang="en" sz="2400" dirty="0" smtClean="0"/>
-              <a:t>come into issues with their work.</a:t>
+              <a:t>come into issues with their work</a:t>
+            </a:r>
+            <a:r>
+              <a:rPr lang="en" sz="2400" dirty="0" smtClean="0"/>
+              <a:t>.</a:t>
+            </a:r>
+          </a:p>
+          <a:p>
+            <a:pPr marL="914400" lvl="1" indent="-457200">
+              <a:buClr>
+                <a:srgbClr val="000000"/>
+              </a:buClr>
+              <a:buSzPct val="150000"/>
+              <a:buFont typeface="Courier New"/>
+              <a:buChar char="o"/>
+            </a:pPr>
+            <a:endParaRPr lang="en" sz="2400" dirty="0" smtClean="0"/>
+          </a:p>
+          <a:p>
+            <a:pPr marL="914400" lvl="1" indent="-457200">
+              <a:buClr>
+                <a:srgbClr val="000000"/>
+              </a:buClr>
+              <a:buSzPct val="150000"/>
+              <a:buFont typeface="Courier New"/>
+              <a:buChar char="o"/>
+            </a:pPr>
+            <a:r>
+              <a:rPr lang="en" sz="2400" dirty="0" smtClean="0"/>
+              <a:t>Doesn’t rely on synchronization of all clients.</a:t>
             </a:r>
             <a:endParaRPr lang="en" sz="2400" dirty="0"/>
           </a:p>

</xml_diff>